<commit_message>
Uploading altered files - SEVENTH ROUND DOESNT WORK AND WAS REMOVED FROM LIST OF SCRIPTS
</commit_message>
<xml_diff>
--- a/Presentation_Matching.pptx
+++ b/Presentation_Matching.pptx
@@ -5,7 +5,7 @@
     <p:sldMasterId id="2147483660" r:id="rId4"/>
   </p:sldMasterIdLst>
   <p:notesMasterIdLst>
-    <p:notesMasterId r:id="rId18"/>
+    <p:notesMasterId r:id="rId19"/>
   </p:notesMasterIdLst>
   <p:sldIdLst>
     <p:sldId id="256" r:id="rId5"/>
@@ -18,9 +18,10 @@
     <p:sldId id="291" r:id="rId12"/>
     <p:sldId id="292" r:id="rId13"/>
     <p:sldId id="295" r:id="rId14"/>
-    <p:sldId id="293" r:id="rId15"/>
-    <p:sldId id="294" r:id="rId16"/>
-    <p:sldId id="272" r:id="rId17"/>
+    <p:sldId id="296" r:id="rId15"/>
+    <p:sldId id="293" r:id="rId16"/>
+    <p:sldId id="294" r:id="rId17"/>
+    <p:sldId id="272" r:id="rId18"/>
   </p:sldIdLst>
   <p:sldSz cx="12192000" cy="6858000"/>
   <p:notesSz cx="6858000" cy="9144000"/>
@@ -209,7 +210,7 @@
           <a:p>
             <a:fld id="{D9492CFB-E4E2-4671-84C9-9231D204B1B9}" type="datetimeFigureOut">
               <a:rPr lang="en-US" smtClean="0"/>
-              <a:t>8/9/2024</a:t>
+              <a:t>8/13/2024</a:t>
             </a:fld>
             <a:endParaRPr lang="en-US"/>
           </a:p>
@@ -596,6 +597,90 @@
 </p:notes>
 </file>
 
+<file path=ppt/notesSlides/notesSlide10.xml><?xml version="1.0" encoding="utf-8"?>
+<p:notes xmlns:a="http://schemas.openxmlformats.org/drawingml/2006/main" xmlns:r="http://schemas.openxmlformats.org/officeDocument/2006/relationships" xmlns:p="http://schemas.openxmlformats.org/presentationml/2006/main">
+  <p:cSld>
+    <p:spTree>
+      <p:nvGrpSpPr>
+        <p:cNvPr id="1" name=""/>
+        <p:cNvGrpSpPr/>
+        <p:nvPr/>
+      </p:nvGrpSpPr>
+      <p:grpSpPr>
+        <a:xfrm>
+          <a:off x="0" y="0"/>
+          <a:ext cx="0" cy="0"/>
+          <a:chOff x="0" y="0"/>
+          <a:chExt cx="0" cy="0"/>
+        </a:xfrm>
+      </p:grpSpPr>
+      <p:sp>
+        <p:nvSpPr>
+          <p:cNvPr id="2" name="Slide Image Placeholder 1"/>
+          <p:cNvSpPr>
+            <a:spLocks noGrp="1" noRot="1" noChangeAspect="1"/>
+          </p:cNvSpPr>
+          <p:nvPr>
+            <p:ph type="sldImg"/>
+          </p:nvPr>
+        </p:nvSpPr>
+        <p:spPr/>
+      </p:sp>
+      <p:sp>
+        <p:nvSpPr>
+          <p:cNvPr id="3" name="Notes Placeholder 2"/>
+          <p:cNvSpPr>
+            <a:spLocks noGrp="1"/>
+          </p:cNvSpPr>
+          <p:nvPr>
+            <p:ph type="body" idx="1"/>
+          </p:nvPr>
+        </p:nvSpPr>
+        <p:spPr/>
+        <p:txBody>
+          <a:bodyPr/>
+          <a:lstStyle/>
+          <a:p>
+            <a:endParaRPr lang="en-US" dirty="0"/>
+          </a:p>
+        </p:txBody>
+      </p:sp>
+      <p:sp>
+        <p:nvSpPr>
+          <p:cNvPr id="4" name="Slide Number Placeholder 3"/>
+          <p:cNvSpPr>
+            <a:spLocks noGrp="1"/>
+          </p:cNvSpPr>
+          <p:nvPr>
+            <p:ph type="sldNum" sz="quarter" idx="5"/>
+          </p:nvPr>
+        </p:nvSpPr>
+        <p:spPr/>
+        <p:txBody>
+          <a:bodyPr/>
+          <a:lstStyle/>
+          <a:p>
+            <a:fld id="{D62F91BE-0B5C-4DB9-8EF4-A5A81C125A9B}" type="slidenum">
+              <a:rPr lang="en-US" smtClean="0"/>
+              <a:t>13</a:t>
+            </a:fld>
+            <a:endParaRPr lang="en-US"/>
+          </a:p>
+        </p:txBody>
+      </p:sp>
+    </p:spTree>
+    <p:extLst>
+      <p:ext uri="{BB962C8B-B14F-4D97-AF65-F5344CB8AC3E}">
+        <p14:creationId xmlns:p14="http://schemas.microsoft.com/office/powerpoint/2010/main" val="4159920013"/>
+      </p:ext>
+    </p:extLst>
+  </p:cSld>
+  <p:clrMapOvr>
+    <a:masterClrMapping/>
+  </p:clrMapOvr>
+</p:notes>
+</file>
+
 <file path=ppt/notesSlides/notesSlide2.xml><?xml version="1.0" encoding="utf-8"?>
 <p:notes xmlns:a="http://schemas.openxmlformats.org/drawingml/2006/main" xmlns:r="http://schemas.openxmlformats.org/officeDocument/2006/relationships" xmlns:p="http://schemas.openxmlformats.org/presentationml/2006/main">
   <p:cSld>
@@ -1223,7 +1308,7 @@
     </p:spTree>
     <p:extLst>
       <p:ext uri="{BB962C8B-B14F-4D97-AF65-F5344CB8AC3E}">
-        <p14:creationId xmlns:p14="http://schemas.microsoft.com/office/powerpoint/2010/main" val="3311370257"/>
+        <p14:creationId xmlns:p14="http://schemas.microsoft.com/office/powerpoint/2010/main" val="2945349900"/>
       </p:ext>
     </p:extLst>
   </p:cSld>
@@ -1307,7 +1392,7 @@
     </p:spTree>
     <p:extLst>
       <p:ext uri="{BB962C8B-B14F-4D97-AF65-F5344CB8AC3E}">
-        <p14:creationId xmlns:p14="http://schemas.microsoft.com/office/powerpoint/2010/main" val="4159920013"/>
+        <p14:creationId xmlns:p14="http://schemas.microsoft.com/office/powerpoint/2010/main" val="3311370257"/>
       </p:ext>
     </p:extLst>
   </p:cSld>
@@ -1446,7 +1531,7 @@
           <a:p>
             <a:fld id="{846CE7D5-CF57-46EF-B807-FDD0502418D4}" type="datetimeFigureOut">
               <a:rPr lang="en-US" smtClean="0"/>
-              <a:t>8/9/2024</a:t>
+              <a:t>8/13/2024</a:t>
             </a:fld>
             <a:endParaRPr lang="en-US"/>
           </a:p>
@@ -1614,7 +1699,7 @@
           <a:p>
             <a:fld id="{846CE7D5-CF57-46EF-B807-FDD0502418D4}" type="datetimeFigureOut">
               <a:rPr lang="en-US" smtClean="0"/>
-              <a:t>8/9/2024</a:t>
+              <a:t>8/13/2024</a:t>
             </a:fld>
             <a:endParaRPr lang="en-US"/>
           </a:p>
@@ -1792,7 +1877,7 @@
           <a:p>
             <a:fld id="{846CE7D5-CF57-46EF-B807-FDD0502418D4}" type="datetimeFigureOut">
               <a:rPr lang="en-US" smtClean="0"/>
-              <a:t>8/9/2024</a:t>
+              <a:t>8/13/2024</a:t>
             </a:fld>
             <a:endParaRPr lang="en-US"/>
           </a:p>
@@ -1960,7 +2045,7 @@
           <a:p>
             <a:fld id="{846CE7D5-CF57-46EF-B807-FDD0502418D4}" type="datetimeFigureOut">
               <a:rPr lang="en-US" smtClean="0"/>
-              <a:t>8/9/2024</a:t>
+              <a:t>8/13/2024</a:t>
             </a:fld>
             <a:endParaRPr lang="en-US"/>
           </a:p>
@@ -2205,7 +2290,7 @@
           <a:p>
             <a:fld id="{846CE7D5-CF57-46EF-B807-FDD0502418D4}" type="datetimeFigureOut">
               <a:rPr lang="en-US" smtClean="0"/>
-              <a:t>8/9/2024</a:t>
+              <a:t>8/13/2024</a:t>
             </a:fld>
             <a:endParaRPr lang="en-US"/>
           </a:p>
@@ -2434,7 +2519,7 @@
           <a:p>
             <a:fld id="{846CE7D5-CF57-46EF-B807-FDD0502418D4}" type="datetimeFigureOut">
               <a:rPr lang="en-US" smtClean="0"/>
-              <a:t>8/9/2024</a:t>
+              <a:t>8/13/2024</a:t>
             </a:fld>
             <a:endParaRPr lang="en-US"/>
           </a:p>
@@ -2798,7 +2883,7 @@
           <a:p>
             <a:fld id="{846CE7D5-CF57-46EF-B807-FDD0502418D4}" type="datetimeFigureOut">
               <a:rPr lang="en-US" smtClean="0"/>
-              <a:t>8/9/2024</a:t>
+              <a:t>8/13/2024</a:t>
             </a:fld>
             <a:endParaRPr lang="en-US"/>
           </a:p>
@@ -2915,7 +3000,7 @@
           <a:p>
             <a:fld id="{846CE7D5-CF57-46EF-B807-FDD0502418D4}" type="datetimeFigureOut">
               <a:rPr lang="en-US" smtClean="0"/>
-              <a:t>8/9/2024</a:t>
+              <a:t>8/13/2024</a:t>
             </a:fld>
             <a:endParaRPr lang="en-US"/>
           </a:p>
@@ -3010,7 +3095,7 @@
           <a:p>
             <a:fld id="{846CE7D5-CF57-46EF-B807-FDD0502418D4}" type="datetimeFigureOut">
               <a:rPr lang="en-US" smtClean="0"/>
-              <a:t>8/9/2024</a:t>
+              <a:t>8/13/2024</a:t>
             </a:fld>
             <a:endParaRPr lang="en-US"/>
           </a:p>
@@ -3285,7 +3370,7 @@
           <a:p>
             <a:fld id="{846CE7D5-CF57-46EF-B807-FDD0502418D4}" type="datetimeFigureOut">
               <a:rPr lang="en-US" smtClean="0"/>
-              <a:t>8/9/2024</a:t>
+              <a:t>8/13/2024</a:t>
             </a:fld>
             <a:endParaRPr lang="en-US"/>
           </a:p>
@@ -3540,7 +3625,7 @@
           <a:p>
             <a:fld id="{846CE7D5-CF57-46EF-B807-FDD0502418D4}" type="datetimeFigureOut">
               <a:rPr lang="en-US" smtClean="0"/>
-              <a:t>8/9/2024</a:t>
+              <a:t>8/13/2024</a:t>
             </a:fld>
             <a:endParaRPr lang="en-US"/>
           </a:p>
@@ -3766,7 +3851,7 @@
           <a:p>
             <a:fld id="{846CE7D5-CF57-46EF-B807-FDD0502418D4}" type="datetimeFigureOut">
               <a:rPr lang="en-US" smtClean="0"/>
-              <a:t>8/9/2024</a:t>
+              <a:t>8/13/2024</a:t>
             </a:fld>
             <a:endParaRPr lang="en-US"/>
           </a:p>
@@ -4999,7 +5084,7 @@
           <a:p>
             <a:r>
               <a:rPr lang="en-US" sz="3200" dirty="0"/>
-              <a:t>Fourth round match percentage = 50% for WB, 25% for TRF</a:t>
+              <a:t>Fourth round match percentage = 20% for WB, 25% for TRF</a:t>
             </a:r>
           </a:p>
           <a:p>
@@ -5045,10 +5130,10 @@
       </p:pic>
       <p:sp>
         <p:nvSpPr>
-          <p:cNvPr id="15" name="TextBox 14">
-            <a:extLst>
-              <a:ext uri="{FF2B5EF4-FFF2-40B4-BE49-F238E27FC236}">
-                <a16:creationId xmlns:a16="http://schemas.microsoft.com/office/drawing/2014/main" id="{F897CE10-A84B-0423-FF50-F20400A6CCBF}"/>
+          <p:cNvPr id="3" name="TextBox 2">
+            <a:extLst>
+              <a:ext uri="{FF2B5EF4-FFF2-40B4-BE49-F238E27FC236}">
+                <a16:creationId xmlns:a16="http://schemas.microsoft.com/office/drawing/2014/main" id="{44AC52A0-3BF9-A9A3-DC6F-4935533AC599}"/>
               </a:ext>
             </a:extLst>
           </p:cNvPr>
@@ -5057,45 +5142,7 @@
         </p:nvSpPr>
         <p:spPr>
           <a:xfrm>
-            <a:off x="1494031" y="4718473"/>
-            <a:ext cx="10287000" cy="1631216"/>
-          </a:xfrm>
-          <a:prstGeom prst="rect">
-            <a:avLst/>
-          </a:prstGeom>
-          <a:noFill/>
-        </p:spPr>
-        <p:txBody>
-          <a:bodyPr wrap="square" lIns="91440" tIns="45720" rIns="91440" bIns="45720" rtlCol="0" anchor="t">
-            <a:spAutoFit/>
-          </a:bodyPr>
-          <a:lstStyle/>
-          <a:p>
-            <a:r>
-              <a:rPr lang="en-US" sz="3200" dirty="0"/>
-              <a:t>Outputs csv files – wb_matching_v5, trf_matching_v5, wb_not_matching_v5, trf_not_matching_v5</a:t>
-            </a:r>
-          </a:p>
-          <a:p>
-            <a:endParaRPr lang="en-US" sz="3600" dirty="0"/>
-          </a:p>
-        </p:txBody>
-      </p:sp>
-      <p:sp>
-        <p:nvSpPr>
-          <p:cNvPr id="3" name="TextBox 2">
-            <a:extLst>
-              <a:ext uri="{FF2B5EF4-FFF2-40B4-BE49-F238E27FC236}">
-                <a16:creationId xmlns:a16="http://schemas.microsoft.com/office/drawing/2014/main" id="{44AC52A0-3BF9-A9A3-DC6F-4935533AC599}"/>
-              </a:ext>
-            </a:extLst>
-          </p:cNvPr>
-          <p:cNvSpPr txBox="1"/>
-          <p:nvPr/>
-        </p:nvSpPr>
-        <p:spPr>
-          <a:xfrm>
-            <a:off x="2485016" y="5803024"/>
+            <a:off x="3308694" y="4506885"/>
             <a:ext cx="738909" cy="307777"/>
           </a:xfrm>
           <a:prstGeom prst="rect">
@@ -5130,7 +5177,7 @@
         </p:nvSpPr>
         <p:spPr>
           <a:xfrm>
-            <a:off x="8598622" y="5803023"/>
+            <a:off x="8809638" y="4506885"/>
             <a:ext cx="738909" cy="307777"/>
           </a:xfrm>
           <a:prstGeom prst="rect">
@@ -5179,7 +5226,7 @@
         </p:blipFill>
         <p:spPr>
           <a:xfrm>
-            <a:off x="670353" y="6158522"/>
+            <a:off x="1494031" y="4862383"/>
             <a:ext cx="4896533" cy="638264"/>
           </a:xfrm>
           <a:prstGeom prst="rect">
@@ -5215,7 +5262,7 @@
         </p:blipFill>
         <p:spPr>
           <a:xfrm>
-            <a:off x="6810362" y="6259284"/>
+            <a:off x="7021378" y="4963146"/>
             <a:ext cx="4315427" cy="419158"/>
           </a:xfrm>
           <a:prstGeom prst="rect">
@@ -5315,7 +5362,7 @@
               <a:rPr lang="en-US" b="1" dirty="0">
                 <a:cs typeface="Arial" panose="020B0604020202020204" pitchFamily="34" charset="0"/>
               </a:rPr>
-              <a:t>Summary </a:t>
+              <a:t>Sixth Round Match </a:t>
             </a:r>
           </a:p>
         </p:txBody>
@@ -5421,7 +5468,7 @@
         <p:spPr>
           <a:xfrm>
             <a:off x="1494031" y="1488142"/>
-            <a:ext cx="10287000" cy="1138773"/>
+            <a:ext cx="10287000" cy="1631216"/>
           </a:xfrm>
           <a:prstGeom prst="rect">
             <a:avLst/>
@@ -5441,16 +5488,16 @@
                 </a:solidFill>
                 <a:effectLst/>
               </a:rPr>
-              <a:t>Total Matching = ~ 97% for </a:t>
-            </a:r>
-            <a:r>
-              <a:rPr lang="en-US" sz="3200" b="0" i="0" dirty="0" err="1">
+              <a:t>Repeat first round match – exact match between broker, symbol, quantity, but </a:t>
+            </a:r>
+            <a:r>
+              <a:rPr lang="en-US" sz="3200" b="1" i="0" dirty="0">
                 <a:solidFill>
                   <a:srgbClr val="000000"/>
                 </a:solidFill>
                 <a:effectLst/>
               </a:rPr>
-              <a:t>Webull</a:t>
+              <a:t>NOT</a:t>
             </a:r>
             <a:r>
               <a:rPr lang="en-US" sz="3200" b="0" i="0" dirty="0">
@@ -5459,7 +5506,7 @@
                 </a:solidFill>
                 <a:effectLst/>
               </a:rPr>
-              <a:t> files, ~80% for TRF files</a:t>
+              <a:t> price</a:t>
             </a:r>
             <a:endParaRPr lang="en-US" sz="3200" dirty="0"/>
           </a:p>
@@ -5518,8 +5565,8 @@
         </p:nvSpPr>
         <p:spPr>
           <a:xfrm>
-            <a:off x="1494031" y="2987398"/>
-            <a:ext cx="10287000" cy="1631216"/>
+            <a:off x="1494031" y="3188846"/>
+            <a:ext cx="10287000" cy="1138773"/>
           </a:xfrm>
           <a:prstGeom prst="rect">
             <a:avLst/>
@@ -5534,90 +5581,20 @@
           <a:p>
             <a:r>
               <a:rPr lang="en-US" sz="3200" dirty="0"/>
-              <a:t>Issues: runtime of round 5 is a bit long  and randomly matches orders</a:t>
+              <a:t>First round match percentage = 8% for WB, 5% for TRF</a:t>
             </a:r>
           </a:p>
           <a:p>
             <a:endParaRPr lang="en-US" sz="3600" dirty="0"/>
-          </a:p>
-        </p:txBody>
-      </p:sp>
-      <p:sp>
-        <p:nvSpPr>
-          <p:cNvPr id="3" name="TextBox 2">
-            <a:extLst>
-              <a:ext uri="{FF2B5EF4-FFF2-40B4-BE49-F238E27FC236}">
-                <a16:creationId xmlns:a16="http://schemas.microsoft.com/office/drawing/2014/main" id="{44AC52A0-3BF9-A9A3-DC6F-4935533AC599}"/>
-              </a:ext>
-            </a:extLst>
-          </p:cNvPr>
-          <p:cNvSpPr txBox="1"/>
-          <p:nvPr/>
-        </p:nvSpPr>
-        <p:spPr>
-          <a:xfrm>
-            <a:off x="2965307" y="4512285"/>
-            <a:ext cx="738909" cy="307777"/>
-          </a:xfrm>
-          <a:prstGeom prst="rect">
-            <a:avLst/>
-          </a:prstGeom>
-          <a:noFill/>
-        </p:spPr>
-        <p:txBody>
-          <a:bodyPr wrap="square" rtlCol="0">
-            <a:spAutoFit/>
-          </a:bodyPr>
-          <a:lstStyle/>
-          <a:p>
-            <a:r>
-              <a:rPr lang="en-US" sz="1400" dirty="0"/>
-              <a:t>TRF</a:t>
-            </a:r>
-          </a:p>
-        </p:txBody>
-      </p:sp>
-      <p:sp>
-        <p:nvSpPr>
-          <p:cNvPr id="4" name="TextBox 3">
-            <a:extLst>
-              <a:ext uri="{FF2B5EF4-FFF2-40B4-BE49-F238E27FC236}">
-                <a16:creationId xmlns:a16="http://schemas.microsoft.com/office/drawing/2014/main" id="{89FEC1A5-AB29-239B-DB62-97DFADDD90AE}"/>
-              </a:ext>
-            </a:extLst>
-          </p:cNvPr>
-          <p:cNvSpPr txBox="1"/>
-          <p:nvPr/>
-        </p:nvSpPr>
-        <p:spPr>
-          <a:xfrm>
-            <a:off x="8558556" y="4512285"/>
-            <a:ext cx="738909" cy="307777"/>
-          </a:xfrm>
-          <a:prstGeom prst="rect">
-            <a:avLst/>
-          </a:prstGeom>
-          <a:noFill/>
-        </p:spPr>
-        <p:txBody>
-          <a:bodyPr wrap="square" rtlCol="0">
-            <a:spAutoFit/>
-          </a:bodyPr>
-          <a:lstStyle/>
-          <a:p>
-            <a:r>
-              <a:rPr lang="en-US" sz="1400" dirty="0"/>
-              <a:t>WB</a:t>
-            </a:r>
           </a:p>
         </p:txBody>
       </p:sp>
       <p:pic>
         <p:nvPicPr>
-          <p:cNvPr id="10" name="Picture 9">
-            <a:extLst>
-              <a:ext uri="{FF2B5EF4-FFF2-40B4-BE49-F238E27FC236}">
-                <a16:creationId xmlns:a16="http://schemas.microsoft.com/office/drawing/2014/main" id="{1E72E8A1-7817-BFAE-0A9F-FFEA1F987E1E}"/>
+          <p:cNvPr id="14" name="Graphic 13" descr="Badge 3 with solid fill">
+            <a:extLst>
+              <a:ext uri="{FF2B5EF4-FFF2-40B4-BE49-F238E27FC236}">
+                <a16:creationId xmlns:a16="http://schemas.microsoft.com/office/drawing/2014/main" id="{AA8F4E38-A67F-5329-FCDD-927C67F47C4B}"/>
               </a:ext>
             </a:extLst>
           </p:cNvPr>
@@ -5629,8 +5606,8 @@
         <p:blipFill>
           <a:blip r:embed="rId8">
             <a:extLst>
-              <a:ext uri="{28A0092B-C50C-407E-A947-70E740481C1C}">
-                <a14:useLocalDpi xmlns:a14="http://schemas.microsoft.com/office/drawing/2010/main" val="0"/>
+              <a:ext uri="{96DAC541-7B7A-43D3-8B79-37D633B846F1}">
+                <asvg:svgBlip xmlns:asvg="http://schemas.microsoft.com/office/drawing/2016/SVG/main" r:embed="rId9"/>
               </a:ext>
             </a:extLst>
           </a:blip>
@@ -5640,20 +5617,90 @@
         </p:blipFill>
         <p:spPr>
           <a:xfrm>
-            <a:off x="1241660" y="4967829"/>
-            <a:ext cx="4925112" cy="438211"/>
+            <a:off x="410969" y="4718473"/>
+            <a:ext cx="914400" cy="914400"/>
           </a:xfrm>
           <a:prstGeom prst="rect">
             <a:avLst/>
           </a:prstGeom>
         </p:spPr>
       </p:pic>
+      <p:sp>
+        <p:nvSpPr>
+          <p:cNvPr id="11" name="TextBox 10">
+            <a:extLst>
+              <a:ext uri="{FF2B5EF4-FFF2-40B4-BE49-F238E27FC236}">
+                <a16:creationId xmlns:a16="http://schemas.microsoft.com/office/drawing/2014/main" id="{54CB189A-A4D8-5872-2C61-6DF9B2D8023A}"/>
+              </a:ext>
+            </a:extLst>
+          </p:cNvPr>
+          <p:cNvSpPr txBox="1"/>
+          <p:nvPr/>
+        </p:nvSpPr>
+        <p:spPr>
+          <a:xfrm>
+            <a:off x="3824572" y="4521805"/>
+            <a:ext cx="738909" cy="307777"/>
+          </a:xfrm>
+          <a:prstGeom prst="rect">
+            <a:avLst/>
+          </a:prstGeom>
+          <a:noFill/>
+        </p:spPr>
+        <p:txBody>
+          <a:bodyPr wrap="square" rtlCol="0">
+            <a:spAutoFit/>
+          </a:bodyPr>
+          <a:lstStyle/>
+          <a:p>
+            <a:r>
+              <a:rPr lang="en-US" sz="1400" dirty="0"/>
+              <a:t>TRF</a:t>
+            </a:r>
+          </a:p>
+        </p:txBody>
+      </p:sp>
+      <p:sp>
+        <p:nvSpPr>
+          <p:cNvPr id="12" name="TextBox 11">
+            <a:extLst>
+              <a:ext uri="{FF2B5EF4-FFF2-40B4-BE49-F238E27FC236}">
+                <a16:creationId xmlns:a16="http://schemas.microsoft.com/office/drawing/2014/main" id="{82FAD950-890C-EFB5-ACD9-8DB8E9D78455}"/>
+              </a:ext>
+            </a:extLst>
+          </p:cNvPr>
+          <p:cNvSpPr txBox="1"/>
+          <p:nvPr/>
+        </p:nvSpPr>
+        <p:spPr>
+          <a:xfrm>
+            <a:off x="8968072" y="4564584"/>
+            <a:ext cx="738909" cy="307777"/>
+          </a:xfrm>
+          <a:prstGeom prst="rect">
+            <a:avLst/>
+          </a:prstGeom>
+          <a:noFill/>
+        </p:spPr>
+        <p:txBody>
+          <a:bodyPr wrap="square" rtlCol="0">
+            <a:spAutoFit/>
+          </a:bodyPr>
+          <a:lstStyle/>
+          <a:p>
+            <a:r>
+              <a:rPr lang="en-US" sz="1400" dirty="0"/>
+              <a:t>WB</a:t>
+            </a:r>
+          </a:p>
+        </p:txBody>
+      </p:sp>
       <p:pic>
         <p:nvPicPr>
-          <p:cNvPr id="13" name="Picture 12">
-            <a:extLst>
-              <a:ext uri="{FF2B5EF4-FFF2-40B4-BE49-F238E27FC236}">
-                <a16:creationId xmlns:a16="http://schemas.microsoft.com/office/drawing/2014/main" id="{7CFC2FCB-BE84-A0CC-0067-D1E2A7BC5AFE}"/>
+          <p:cNvPr id="15" name="Picture 14">
+            <a:extLst>
+              <a:ext uri="{FF2B5EF4-FFF2-40B4-BE49-F238E27FC236}">
+                <a16:creationId xmlns:a16="http://schemas.microsoft.com/office/drawing/2014/main" id="{21C71667-E4EA-E9D7-BA38-C893A84CF6CF}"/>
               </a:ext>
             </a:extLst>
           </p:cNvPr>
@@ -5663,21 +5710,15 @@
           <p:nvPr/>
         </p:nvPicPr>
         <p:blipFill>
-          <a:blip r:embed="rId9">
-            <a:extLst>
-              <a:ext uri="{28A0092B-C50C-407E-A947-70E740481C1C}">
-                <a14:useLocalDpi xmlns:a14="http://schemas.microsoft.com/office/drawing/2010/main" val="0"/>
-              </a:ext>
-            </a:extLst>
-          </a:blip>
+          <a:blip r:embed="rId10"/>
           <a:stretch>
             <a:fillRect/>
           </a:stretch>
         </p:blipFill>
         <p:spPr>
           <a:xfrm>
-            <a:off x="6784586" y="4996408"/>
-            <a:ext cx="4286848" cy="409632"/>
+            <a:off x="1820995" y="4988805"/>
+            <a:ext cx="4887007" cy="381053"/>
           </a:xfrm>
           <a:prstGeom prst="rect">
             <a:avLst/>
@@ -5686,10 +5727,10 @@
       </p:pic>
       <p:pic>
         <p:nvPicPr>
-          <p:cNvPr id="18" name="Picture 17">
-            <a:extLst>
-              <a:ext uri="{FF2B5EF4-FFF2-40B4-BE49-F238E27FC236}">
-                <a16:creationId xmlns:a16="http://schemas.microsoft.com/office/drawing/2014/main" id="{625DF1C7-31C2-BFF0-643C-CD111E12C757}"/>
+          <p:cNvPr id="17" name="Picture 16">
+            <a:extLst>
+              <a:ext uri="{FF2B5EF4-FFF2-40B4-BE49-F238E27FC236}">
+                <a16:creationId xmlns:a16="http://schemas.microsoft.com/office/drawing/2014/main" id="{16AD8AB0-6876-31A0-CD5A-6D655A0A628A}"/>
               </a:ext>
             </a:extLst>
           </p:cNvPr>
@@ -5699,149 +5740,38 @@
           <p:nvPr/>
         </p:nvPicPr>
         <p:blipFill>
-          <a:blip r:embed="rId10">
-            <a:extLst>
-              <a:ext uri="{28A0092B-C50C-407E-A947-70E740481C1C}">
-                <a14:useLocalDpi xmlns:a14="http://schemas.microsoft.com/office/drawing/2010/main" val="0"/>
-              </a:ext>
-            </a:extLst>
-          </a:blip>
+          <a:blip r:embed="rId11"/>
           <a:stretch>
             <a:fillRect/>
           </a:stretch>
         </p:blipFill>
         <p:spPr>
           <a:xfrm>
-            <a:off x="1232133" y="5800576"/>
-            <a:ext cx="4934639" cy="228632"/>
+            <a:off x="7203628" y="4988805"/>
+            <a:ext cx="4267796" cy="381053"/>
           </a:xfrm>
           <a:prstGeom prst="rect">
             <a:avLst/>
           </a:prstGeom>
         </p:spPr>
       </p:pic>
-      <p:pic>
-        <p:nvPicPr>
-          <p:cNvPr id="20" name="Picture 19">
-            <a:extLst>
-              <a:ext uri="{FF2B5EF4-FFF2-40B4-BE49-F238E27FC236}">
-                <a16:creationId xmlns:a16="http://schemas.microsoft.com/office/drawing/2014/main" id="{BDF0F840-3238-ED09-8D2B-F0105DFE85EA}"/>
-              </a:ext>
-            </a:extLst>
-          </p:cNvPr>
-          <p:cNvPicPr>
-            <a:picLocks noChangeAspect="1"/>
-          </p:cNvPicPr>
-          <p:nvPr/>
-        </p:nvPicPr>
-        <p:blipFill rotWithShape="1">
-          <a:blip r:embed="rId11">
-            <a:extLst>
-              <a:ext uri="{28A0092B-C50C-407E-A947-70E740481C1C}">
-                <a14:useLocalDpi xmlns:a14="http://schemas.microsoft.com/office/drawing/2010/main" val="0"/>
-              </a:ext>
-            </a:extLst>
-          </a:blip>
-          <a:srcRect r="13294"/>
-          <a:stretch/>
-        </p:blipFill>
-        <p:spPr>
-          <a:xfrm>
-            <a:off x="6784587" y="5800576"/>
-            <a:ext cx="4286848" cy="228632"/>
-          </a:xfrm>
-          <a:prstGeom prst="rect">
-            <a:avLst/>
-          </a:prstGeom>
-        </p:spPr>
-      </p:pic>
-      <p:sp>
-        <p:nvSpPr>
-          <p:cNvPr id="21" name="TextBox 20">
-            <a:extLst>
-              <a:ext uri="{FF2B5EF4-FFF2-40B4-BE49-F238E27FC236}">
-                <a16:creationId xmlns:a16="http://schemas.microsoft.com/office/drawing/2014/main" id="{8D941CD9-FF40-6F9D-7EC2-116B397C2775}"/>
-              </a:ext>
-            </a:extLst>
-          </p:cNvPr>
-          <p:cNvSpPr txBox="1"/>
-          <p:nvPr/>
-        </p:nvSpPr>
-        <p:spPr>
-          <a:xfrm>
-            <a:off x="78901" y="4996408"/>
-            <a:ext cx="914399" cy="307777"/>
-          </a:xfrm>
-          <a:prstGeom prst="rect">
-            <a:avLst/>
-          </a:prstGeom>
-          <a:noFill/>
-        </p:spPr>
-        <p:txBody>
-          <a:bodyPr wrap="square" rtlCol="0">
-            <a:spAutoFit/>
-          </a:bodyPr>
-          <a:lstStyle/>
-          <a:p>
-            <a:r>
-              <a:rPr lang="en-US" sz="1400" dirty="0"/>
-              <a:t>Quantity</a:t>
-            </a:r>
-          </a:p>
-        </p:txBody>
-      </p:sp>
-      <p:sp>
-        <p:nvSpPr>
-          <p:cNvPr id="22" name="TextBox 21">
-            <a:extLst>
-              <a:ext uri="{FF2B5EF4-FFF2-40B4-BE49-F238E27FC236}">
-                <a16:creationId xmlns:a16="http://schemas.microsoft.com/office/drawing/2014/main" id="{0A789175-8E96-301E-81CA-7E90F48F5517}"/>
-              </a:ext>
-            </a:extLst>
-          </p:cNvPr>
-          <p:cNvSpPr txBox="1"/>
-          <p:nvPr/>
-        </p:nvSpPr>
-        <p:spPr>
-          <a:xfrm>
-            <a:off x="166645" y="5721431"/>
-            <a:ext cx="738909" cy="307777"/>
-          </a:xfrm>
-          <a:prstGeom prst="rect">
-            <a:avLst/>
-          </a:prstGeom>
-          <a:noFill/>
-        </p:spPr>
-        <p:txBody>
-          <a:bodyPr wrap="square" rtlCol="0">
-            <a:spAutoFit/>
-          </a:bodyPr>
-          <a:lstStyle/>
-          <a:p>
-            <a:r>
-              <a:rPr lang="en-US" sz="1400" dirty="0"/>
-              <a:t>Price</a:t>
-            </a:r>
-          </a:p>
-        </p:txBody>
-      </p:sp>
     </p:spTree>
     <p:extLst>
       <p:ext uri="{BB962C8B-B14F-4D97-AF65-F5344CB8AC3E}">
-        <p14:creationId xmlns:p14="http://schemas.microsoft.com/office/powerpoint/2010/main" val="467652972"/>
+        <p14:creationId xmlns:p14="http://schemas.microsoft.com/office/powerpoint/2010/main" val="3693234926"/>
       </p:ext>
     </p:extLst>
   </p:cSld>
   <p:clrMapOvr>
     <a:masterClrMapping/>
   </p:clrMapOvr>
-  <mc:AlternateContent xmlns:mc="http://schemas.openxmlformats.org/markup-compatibility/2006" xmlns:p15="http://schemas.microsoft.com/office/powerpoint/2012/main">
-    <mc:Choice Requires="p15">
+  <mc:AlternateContent xmlns:mc="http://schemas.openxmlformats.org/markup-compatibility/2006">
+    <mc:Choice xmlns:p15="http://schemas.microsoft.com/office/powerpoint/2012/main" Requires="p15">
       <p:transition xmlns:p14="http://schemas.microsoft.com/office/powerpoint/2010/main" spd="slow" p14:dur="3250">
         <p15:prstTrans prst="origami"/>
       </p:transition>
     </mc:Choice>
-    <mc:Fallback xmlns="">
+    <mc:Fallback>
       <p:transition spd="slow">
         <p:fade/>
       </p:transition>
@@ -5917,6 +5847,625 @@
               <a:rPr lang="en-US" b="1" dirty="0">
                 <a:cs typeface="Arial" panose="020B0604020202020204" pitchFamily="34" charset="0"/>
               </a:rPr>
+              <a:t>Summary </a:t>
+            </a:r>
+          </a:p>
+        </p:txBody>
+      </p:sp>
+      <p:pic>
+        <p:nvPicPr>
+          <p:cNvPr id="2050" name="Picture 2" descr="Introduction to OpenAPI | Webull API">
+            <a:extLst>
+              <a:ext uri="{FF2B5EF4-FFF2-40B4-BE49-F238E27FC236}">
+                <a16:creationId xmlns:a16="http://schemas.microsoft.com/office/drawing/2014/main" id="{5D4D8DD1-C214-0790-8530-0AD19EBDA1EE}"/>
+              </a:ext>
+            </a:extLst>
+          </p:cNvPr>
+          <p:cNvPicPr>
+            <a:picLocks noChangeAspect="1" noChangeArrowheads="1"/>
+          </p:cNvPicPr>
+          <p:nvPr/>
+        </p:nvPicPr>
+        <p:blipFill>
+          <a:blip r:embed="rId3" cstate="print">
+            <a:extLst>
+              <a:ext uri="{28A0092B-C50C-407E-A947-70E740481C1C}">
+                <a14:useLocalDpi xmlns:a14="http://schemas.microsoft.com/office/drawing/2010/main" val="0"/>
+              </a:ext>
+            </a:extLst>
+          </a:blip>
+          <a:srcRect/>
+          <a:stretch>
+            <a:fillRect/>
+          </a:stretch>
+        </p:blipFill>
+        <p:spPr bwMode="auto">
+          <a:xfrm>
+            <a:off x="11037673" y="0"/>
+            <a:ext cx="1044147" cy="1002958"/>
+          </a:xfrm>
+          <a:prstGeom prst="rect">
+            <a:avLst/>
+          </a:prstGeom>
+          <a:noFill/>
+          <a:extLst>
+            <a:ext uri="{909E8E84-426E-40DD-AFC4-6F175D3DCCD1}">
+              <a14:hiddenFill xmlns:a14="http://schemas.microsoft.com/office/drawing/2010/main">
+                <a:solidFill>
+                  <a:srgbClr val="FFFFFF"/>
+                </a:solidFill>
+              </a14:hiddenFill>
+            </a:ext>
+          </a:extLst>
+        </p:spPr>
+      </p:pic>
+      <p:pic>
+        <p:nvPicPr>
+          <p:cNvPr id="5" name="Graphic 4" descr="Badge 1 with solid fill">
+            <a:extLst>
+              <a:ext uri="{FF2B5EF4-FFF2-40B4-BE49-F238E27FC236}">
+                <a16:creationId xmlns:a16="http://schemas.microsoft.com/office/drawing/2014/main" id="{601513C2-3A92-51BB-08E6-9AAFC39B91C7}"/>
+              </a:ext>
+            </a:extLst>
+          </p:cNvPr>
+          <p:cNvPicPr>
+            <a:picLocks noChangeAspect="1"/>
+          </p:cNvPicPr>
+          <p:nvPr/>
+        </p:nvPicPr>
+        <p:blipFill>
+          <a:blip r:embed="rId4">
+            <a:extLst>
+              <a:ext uri="{28A0092B-C50C-407E-A947-70E740481C1C}">
+                <a14:useLocalDpi xmlns:a14="http://schemas.microsoft.com/office/drawing/2010/main" val="0"/>
+              </a:ext>
+              <a:ext uri="{96DAC541-7B7A-43D3-8B79-37D633B846F1}">
+                <asvg:svgBlip xmlns:asvg="http://schemas.microsoft.com/office/drawing/2016/SVG/main" r:embed="rId5"/>
+              </a:ext>
+            </a:extLst>
+          </a:blip>
+          <a:stretch>
+            <a:fillRect/>
+          </a:stretch>
+        </p:blipFill>
+        <p:spPr>
+          <a:xfrm>
+            <a:off x="410969" y="1450905"/>
+            <a:ext cx="914400" cy="914400"/>
+          </a:xfrm>
+          <a:prstGeom prst="rect">
+            <a:avLst/>
+          </a:prstGeom>
+        </p:spPr>
+      </p:pic>
+      <p:sp>
+        <p:nvSpPr>
+          <p:cNvPr id="6" name="TextBox 5">
+            <a:extLst>
+              <a:ext uri="{FF2B5EF4-FFF2-40B4-BE49-F238E27FC236}">
+                <a16:creationId xmlns:a16="http://schemas.microsoft.com/office/drawing/2014/main" id="{52602A6F-75C7-66B4-5D66-DFE71028C695}"/>
+              </a:ext>
+            </a:extLst>
+          </p:cNvPr>
+          <p:cNvSpPr txBox="1"/>
+          <p:nvPr/>
+        </p:nvSpPr>
+        <p:spPr>
+          <a:xfrm>
+            <a:off x="1494031" y="1488142"/>
+            <a:ext cx="10287000" cy="1138773"/>
+          </a:xfrm>
+          <a:prstGeom prst="rect">
+            <a:avLst/>
+          </a:prstGeom>
+          <a:noFill/>
+        </p:spPr>
+        <p:txBody>
+          <a:bodyPr wrap="square" lIns="91440" tIns="45720" rIns="91440" bIns="45720" rtlCol="0" anchor="t">
+            <a:spAutoFit/>
+          </a:bodyPr>
+          <a:lstStyle/>
+          <a:p>
+            <a:r>
+              <a:rPr lang="en-US" sz="3200" b="0" i="0" dirty="0">
+                <a:solidFill>
+                  <a:srgbClr val="000000"/>
+                </a:solidFill>
+                <a:effectLst/>
+              </a:rPr>
+              <a:t>Total Matching = ~ </a:t>
+            </a:r>
+            <a:r>
+              <a:rPr lang="en-US" sz="3200" dirty="0">
+                <a:solidFill>
+                  <a:srgbClr val="000000"/>
+                </a:solidFill>
+              </a:rPr>
+              <a:t>90</a:t>
+            </a:r>
+            <a:r>
+              <a:rPr lang="en-US" sz="3200" b="0" i="0" dirty="0">
+                <a:solidFill>
+                  <a:srgbClr val="000000"/>
+                </a:solidFill>
+                <a:effectLst/>
+              </a:rPr>
+              <a:t>% for </a:t>
+            </a:r>
+            <a:r>
+              <a:rPr lang="en-US" sz="3200" b="0" i="0" dirty="0" err="1">
+                <a:solidFill>
+                  <a:srgbClr val="000000"/>
+                </a:solidFill>
+                <a:effectLst/>
+              </a:rPr>
+              <a:t>Webull</a:t>
+            </a:r>
+            <a:r>
+              <a:rPr lang="en-US" sz="3200" b="0" i="0" dirty="0">
+                <a:solidFill>
+                  <a:srgbClr val="000000"/>
+                </a:solidFill>
+                <a:effectLst/>
+              </a:rPr>
+              <a:t> files, ~90% for TRF files</a:t>
+            </a:r>
+            <a:endParaRPr lang="en-US" sz="3200" dirty="0"/>
+          </a:p>
+          <a:p>
+            <a:endParaRPr lang="en-US" sz="3600" dirty="0"/>
+          </a:p>
+        </p:txBody>
+      </p:sp>
+      <p:pic>
+        <p:nvPicPr>
+          <p:cNvPr id="7" name="Graphic 6" descr="Badge with solid fill">
+            <a:extLst>
+              <a:ext uri="{FF2B5EF4-FFF2-40B4-BE49-F238E27FC236}">
+                <a16:creationId xmlns:a16="http://schemas.microsoft.com/office/drawing/2014/main" id="{0F54D45B-9F7C-0AE9-F410-6B51FFD152E6}"/>
+              </a:ext>
+            </a:extLst>
+          </p:cNvPr>
+          <p:cNvPicPr>
+            <a:picLocks noChangeAspect="1"/>
+          </p:cNvPicPr>
+          <p:nvPr/>
+        </p:nvPicPr>
+        <p:blipFill>
+          <a:blip r:embed="rId6">
+            <a:extLst>
+              <a:ext uri="{96DAC541-7B7A-43D3-8B79-37D633B846F1}">
+                <asvg:svgBlip xmlns:asvg="http://schemas.microsoft.com/office/drawing/2016/SVG/main" r:embed="rId7"/>
+              </a:ext>
+            </a:extLst>
+          </a:blip>
+          <a:stretch>
+            <a:fillRect/>
+          </a:stretch>
+        </p:blipFill>
+        <p:spPr>
+          <a:xfrm>
+            <a:off x="410969" y="3084689"/>
+            <a:ext cx="914400" cy="914400"/>
+          </a:xfrm>
+          <a:prstGeom prst="rect">
+            <a:avLst/>
+          </a:prstGeom>
+        </p:spPr>
+      </p:pic>
+      <p:sp>
+        <p:nvSpPr>
+          <p:cNvPr id="8" name="TextBox 7">
+            <a:extLst>
+              <a:ext uri="{FF2B5EF4-FFF2-40B4-BE49-F238E27FC236}">
+                <a16:creationId xmlns:a16="http://schemas.microsoft.com/office/drawing/2014/main" id="{0AC5DFBB-8526-248D-B4EB-BEC2021AA40A}"/>
+              </a:ext>
+            </a:extLst>
+          </p:cNvPr>
+          <p:cNvSpPr txBox="1"/>
+          <p:nvPr/>
+        </p:nvSpPr>
+        <p:spPr>
+          <a:xfrm>
+            <a:off x="1494031" y="2987398"/>
+            <a:ext cx="10287000" cy="1631216"/>
+          </a:xfrm>
+          <a:prstGeom prst="rect">
+            <a:avLst/>
+          </a:prstGeom>
+          <a:noFill/>
+        </p:spPr>
+        <p:txBody>
+          <a:bodyPr wrap="square" lIns="91440" tIns="45720" rIns="91440" bIns="45720" rtlCol="0" anchor="t">
+            <a:spAutoFit/>
+          </a:bodyPr>
+          <a:lstStyle/>
+          <a:p>
+            <a:r>
+              <a:rPr lang="en-US" sz="3200" dirty="0"/>
+              <a:t>Issues: runtime of round 5 is a bit long  and randomly matches orders</a:t>
+            </a:r>
+          </a:p>
+          <a:p>
+            <a:endParaRPr lang="en-US" sz="3600" dirty="0"/>
+          </a:p>
+        </p:txBody>
+      </p:sp>
+      <p:sp>
+        <p:nvSpPr>
+          <p:cNvPr id="3" name="TextBox 2">
+            <a:extLst>
+              <a:ext uri="{FF2B5EF4-FFF2-40B4-BE49-F238E27FC236}">
+                <a16:creationId xmlns:a16="http://schemas.microsoft.com/office/drawing/2014/main" id="{44AC52A0-3BF9-A9A3-DC6F-4935533AC599}"/>
+              </a:ext>
+            </a:extLst>
+          </p:cNvPr>
+          <p:cNvSpPr txBox="1"/>
+          <p:nvPr/>
+        </p:nvSpPr>
+        <p:spPr>
+          <a:xfrm>
+            <a:off x="2965307" y="4512285"/>
+            <a:ext cx="738909" cy="307777"/>
+          </a:xfrm>
+          <a:prstGeom prst="rect">
+            <a:avLst/>
+          </a:prstGeom>
+          <a:noFill/>
+        </p:spPr>
+        <p:txBody>
+          <a:bodyPr wrap="square" rtlCol="0">
+            <a:spAutoFit/>
+          </a:bodyPr>
+          <a:lstStyle/>
+          <a:p>
+            <a:r>
+              <a:rPr lang="en-US" sz="1400" dirty="0"/>
+              <a:t>TRF</a:t>
+            </a:r>
+          </a:p>
+        </p:txBody>
+      </p:sp>
+      <p:sp>
+        <p:nvSpPr>
+          <p:cNvPr id="4" name="TextBox 3">
+            <a:extLst>
+              <a:ext uri="{FF2B5EF4-FFF2-40B4-BE49-F238E27FC236}">
+                <a16:creationId xmlns:a16="http://schemas.microsoft.com/office/drawing/2014/main" id="{89FEC1A5-AB29-239B-DB62-97DFADDD90AE}"/>
+              </a:ext>
+            </a:extLst>
+          </p:cNvPr>
+          <p:cNvSpPr txBox="1"/>
+          <p:nvPr/>
+        </p:nvSpPr>
+        <p:spPr>
+          <a:xfrm>
+            <a:off x="8558556" y="4512285"/>
+            <a:ext cx="738909" cy="307777"/>
+          </a:xfrm>
+          <a:prstGeom prst="rect">
+            <a:avLst/>
+          </a:prstGeom>
+          <a:noFill/>
+        </p:spPr>
+        <p:txBody>
+          <a:bodyPr wrap="square" rtlCol="0">
+            <a:spAutoFit/>
+          </a:bodyPr>
+          <a:lstStyle/>
+          <a:p>
+            <a:r>
+              <a:rPr lang="en-US" sz="1400" dirty="0"/>
+              <a:t>WB</a:t>
+            </a:r>
+          </a:p>
+        </p:txBody>
+      </p:sp>
+      <p:pic>
+        <p:nvPicPr>
+          <p:cNvPr id="10" name="Picture 9">
+            <a:extLst>
+              <a:ext uri="{FF2B5EF4-FFF2-40B4-BE49-F238E27FC236}">
+                <a16:creationId xmlns:a16="http://schemas.microsoft.com/office/drawing/2014/main" id="{1E72E8A1-7817-BFAE-0A9F-FFEA1F987E1E}"/>
+              </a:ext>
+            </a:extLst>
+          </p:cNvPr>
+          <p:cNvPicPr>
+            <a:picLocks noChangeAspect="1"/>
+          </p:cNvPicPr>
+          <p:nvPr/>
+        </p:nvPicPr>
+        <p:blipFill>
+          <a:blip r:embed="rId8">
+            <a:extLst>
+              <a:ext uri="{28A0092B-C50C-407E-A947-70E740481C1C}">
+                <a14:useLocalDpi xmlns:a14="http://schemas.microsoft.com/office/drawing/2010/main" val="0"/>
+              </a:ext>
+            </a:extLst>
+          </a:blip>
+          <a:stretch>
+            <a:fillRect/>
+          </a:stretch>
+        </p:blipFill>
+        <p:spPr>
+          <a:xfrm>
+            <a:off x="1241660" y="4967829"/>
+            <a:ext cx="4925112" cy="438211"/>
+          </a:xfrm>
+          <a:prstGeom prst="rect">
+            <a:avLst/>
+          </a:prstGeom>
+        </p:spPr>
+      </p:pic>
+      <p:pic>
+        <p:nvPicPr>
+          <p:cNvPr id="13" name="Picture 12">
+            <a:extLst>
+              <a:ext uri="{FF2B5EF4-FFF2-40B4-BE49-F238E27FC236}">
+                <a16:creationId xmlns:a16="http://schemas.microsoft.com/office/drawing/2014/main" id="{7CFC2FCB-BE84-A0CC-0067-D1E2A7BC5AFE}"/>
+              </a:ext>
+            </a:extLst>
+          </p:cNvPr>
+          <p:cNvPicPr>
+            <a:picLocks noChangeAspect="1"/>
+          </p:cNvPicPr>
+          <p:nvPr/>
+        </p:nvPicPr>
+        <p:blipFill>
+          <a:blip r:embed="rId9">
+            <a:extLst>
+              <a:ext uri="{28A0092B-C50C-407E-A947-70E740481C1C}">
+                <a14:useLocalDpi xmlns:a14="http://schemas.microsoft.com/office/drawing/2010/main" val="0"/>
+              </a:ext>
+            </a:extLst>
+          </a:blip>
+          <a:stretch>
+            <a:fillRect/>
+          </a:stretch>
+        </p:blipFill>
+        <p:spPr>
+          <a:xfrm>
+            <a:off x="6784586" y="4996408"/>
+            <a:ext cx="4286848" cy="409632"/>
+          </a:xfrm>
+          <a:prstGeom prst="rect">
+            <a:avLst/>
+          </a:prstGeom>
+        </p:spPr>
+      </p:pic>
+      <p:pic>
+        <p:nvPicPr>
+          <p:cNvPr id="18" name="Picture 17">
+            <a:extLst>
+              <a:ext uri="{FF2B5EF4-FFF2-40B4-BE49-F238E27FC236}">
+                <a16:creationId xmlns:a16="http://schemas.microsoft.com/office/drawing/2014/main" id="{625DF1C7-31C2-BFF0-643C-CD111E12C757}"/>
+              </a:ext>
+            </a:extLst>
+          </p:cNvPr>
+          <p:cNvPicPr>
+            <a:picLocks noChangeAspect="1"/>
+          </p:cNvPicPr>
+          <p:nvPr/>
+        </p:nvPicPr>
+        <p:blipFill>
+          <a:blip r:embed="rId10">
+            <a:extLst>
+              <a:ext uri="{28A0092B-C50C-407E-A947-70E740481C1C}">
+                <a14:useLocalDpi xmlns:a14="http://schemas.microsoft.com/office/drawing/2010/main" val="0"/>
+              </a:ext>
+            </a:extLst>
+          </a:blip>
+          <a:stretch>
+            <a:fillRect/>
+          </a:stretch>
+        </p:blipFill>
+        <p:spPr>
+          <a:xfrm>
+            <a:off x="1232133" y="5800576"/>
+            <a:ext cx="4934639" cy="228632"/>
+          </a:xfrm>
+          <a:prstGeom prst="rect">
+            <a:avLst/>
+          </a:prstGeom>
+        </p:spPr>
+      </p:pic>
+      <p:pic>
+        <p:nvPicPr>
+          <p:cNvPr id="20" name="Picture 19">
+            <a:extLst>
+              <a:ext uri="{FF2B5EF4-FFF2-40B4-BE49-F238E27FC236}">
+                <a16:creationId xmlns:a16="http://schemas.microsoft.com/office/drawing/2014/main" id="{BDF0F840-3238-ED09-8D2B-F0105DFE85EA}"/>
+              </a:ext>
+            </a:extLst>
+          </p:cNvPr>
+          <p:cNvPicPr>
+            <a:picLocks noChangeAspect="1"/>
+          </p:cNvPicPr>
+          <p:nvPr/>
+        </p:nvPicPr>
+        <p:blipFill rotWithShape="1">
+          <a:blip r:embed="rId11">
+            <a:extLst>
+              <a:ext uri="{28A0092B-C50C-407E-A947-70E740481C1C}">
+                <a14:useLocalDpi xmlns:a14="http://schemas.microsoft.com/office/drawing/2010/main" val="0"/>
+              </a:ext>
+            </a:extLst>
+          </a:blip>
+          <a:srcRect r="13294"/>
+          <a:stretch/>
+        </p:blipFill>
+        <p:spPr>
+          <a:xfrm>
+            <a:off x="6784587" y="5800576"/>
+            <a:ext cx="4286848" cy="228632"/>
+          </a:xfrm>
+          <a:prstGeom prst="rect">
+            <a:avLst/>
+          </a:prstGeom>
+        </p:spPr>
+      </p:pic>
+      <p:sp>
+        <p:nvSpPr>
+          <p:cNvPr id="21" name="TextBox 20">
+            <a:extLst>
+              <a:ext uri="{FF2B5EF4-FFF2-40B4-BE49-F238E27FC236}">
+                <a16:creationId xmlns:a16="http://schemas.microsoft.com/office/drawing/2014/main" id="{8D941CD9-FF40-6F9D-7EC2-116B397C2775}"/>
+              </a:ext>
+            </a:extLst>
+          </p:cNvPr>
+          <p:cNvSpPr txBox="1"/>
+          <p:nvPr/>
+        </p:nvSpPr>
+        <p:spPr>
+          <a:xfrm>
+            <a:off x="78901" y="4996408"/>
+            <a:ext cx="914399" cy="307777"/>
+          </a:xfrm>
+          <a:prstGeom prst="rect">
+            <a:avLst/>
+          </a:prstGeom>
+          <a:noFill/>
+        </p:spPr>
+        <p:txBody>
+          <a:bodyPr wrap="square" rtlCol="0">
+            <a:spAutoFit/>
+          </a:bodyPr>
+          <a:lstStyle/>
+          <a:p>
+            <a:r>
+              <a:rPr lang="en-US" sz="1400" dirty="0"/>
+              <a:t>Quantity</a:t>
+            </a:r>
+          </a:p>
+        </p:txBody>
+      </p:sp>
+      <p:sp>
+        <p:nvSpPr>
+          <p:cNvPr id="22" name="TextBox 21">
+            <a:extLst>
+              <a:ext uri="{FF2B5EF4-FFF2-40B4-BE49-F238E27FC236}">
+                <a16:creationId xmlns:a16="http://schemas.microsoft.com/office/drawing/2014/main" id="{0A789175-8E96-301E-81CA-7E90F48F5517}"/>
+              </a:ext>
+            </a:extLst>
+          </p:cNvPr>
+          <p:cNvSpPr txBox="1"/>
+          <p:nvPr/>
+        </p:nvSpPr>
+        <p:spPr>
+          <a:xfrm>
+            <a:off x="166645" y="5721431"/>
+            <a:ext cx="738909" cy="307777"/>
+          </a:xfrm>
+          <a:prstGeom prst="rect">
+            <a:avLst/>
+          </a:prstGeom>
+          <a:noFill/>
+        </p:spPr>
+        <p:txBody>
+          <a:bodyPr wrap="square" rtlCol="0">
+            <a:spAutoFit/>
+          </a:bodyPr>
+          <a:lstStyle/>
+          <a:p>
+            <a:r>
+              <a:rPr lang="en-US" sz="1400" dirty="0"/>
+              <a:t>Price</a:t>
+            </a:r>
+          </a:p>
+        </p:txBody>
+      </p:sp>
+    </p:spTree>
+    <p:extLst>
+      <p:ext uri="{BB962C8B-B14F-4D97-AF65-F5344CB8AC3E}">
+        <p14:creationId xmlns:p14="http://schemas.microsoft.com/office/powerpoint/2010/main" val="467652972"/>
+      </p:ext>
+    </p:extLst>
+  </p:cSld>
+  <p:clrMapOvr>
+    <a:masterClrMapping/>
+  </p:clrMapOvr>
+  <mc:AlternateContent xmlns:mc="http://schemas.openxmlformats.org/markup-compatibility/2006" xmlns:p15="http://schemas.microsoft.com/office/powerpoint/2012/main">
+    <mc:Choice Requires="p15">
+      <p:transition xmlns:p14="http://schemas.microsoft.com/office/powerpoint/2010/main" spd="slow" p14:dur="3250">
+        <p15:prstTrans prst="origami"/>
+      </p:transition>
+    </mc:Choice>
+    <mc:Fallback xmlns="">
+      <p:transition spd="slow">
+        <p:fade/>
+      </p:transition>
+    </mc:Fallback>
+  </mc:AlternateContent>
+</p:sld>
+</file>
+
+<file path=ppt/slides/slide13.xml><?xml version="1.0" encoding="utf-8"?>
+<p:sld xmlns:a="http://schemas.openxmlformats.org/drawingml/2006/main" xmlns:r="http://schemas.openxmlformats.org/officeDocument/2006/relationships" xmlns:p="http://schemas.openxmlformats.org/presentationml/2006/main">
+  <p:cSld>
+    <p:bg>
+      <p:bgPr>
+        <a:gradFill flip="none" rotWithShape="1">
+          <a:gsLst>
+            <a:gs pos="15000">
+              <a:schemeClr val="bg1"/>
+            </a:gs>
+            <a:gs pos="0">
+              <a:srgbClr val="0043E9">
+                <a:lumMod val="19000"/>
+                <a:lumOff val="81000"/>
+              </a:srgbClr>
+            </a:gs>
+          </a:gsLst>
+          <a:lin ang="5400000" scaled="1"/>
+          <a:tileRect/>
+        </a:gradFill>
+        <a:effectLst/>
+      </p:bgPr>
+    </p:bg>
+    <p:spTree>
+      <p:nvGrpSpPr>
+        <p:cNvPr id="1" name=""/>
+        <p:cNvGrpSpPr/>
+        <p:nvPr/>
+      </p:nvGrpSpPr>
+      <p:grpSpPr>
+        <a:xfrm>
+          <a:off x="0" y="0"/>
+          <a:ext cx="0" cy="0"/>
+          <a:chOff x="0" y="0"/>
+          <a:chExt cx="0" cy="0"/>
+        </a:xfrm>
+      </p:grpSpPr>
+      <p:sp>
+        <p:nvSpPr>
+          <p:cNvPr id="2" name="Title 1">
+            <a:extLst>
+              <a:ext uri="{FF2B5EF4-FFF2-40B4-BE49-F238E27FC236}">
+                <a16:creationId xmlns:a16="http://schemas.microsoft.com/office/drawing/2014/main" id="{DD079097-250B-1755-9E96-EA28080BDEAF}"/>
+              </a:ext>
+            </a:extLst>
+          </p:cNvPr>
+          <p:cNvSpPr>
+            <a:spLocks noGrp="1"/>
+          </p:cNvSpPr>
+          <p:nvPr>
+            <p:ph type="title"/>
+          </p:nvPr>
+        </p:nvSpPr>
+        <p:spPr>
+          <a:xfrm>
+            <a:off x="670353" y="179558"/>
+            <a:ext cx="10515600" cy="1002958"/>
+          </a:xfrm>
+        </p:spPr>
+        <p:txBody>
+          <a:bodyPr/>
+          <a:lstStyle/>
+          <a:p>
+            <a:r>
+              <a:rPr lang="en-US" b="1" dirty="0">
+                <a:cs typeface="Arial" panose="020B0604020202020204" pitchFamily="34" charset="0"/>
+              </a:rPr>
               <a:t>Potential Solutions </a:t>
             </a:r>
           </a:p>
@@ -6293,7 +6842,7 @@
 </p:sld>
 </file>
 
-<file path=ppt/slides/slide13.xml><?xml version="1.0" encoding="utf-8"?>
+<file path=ppt/slides/slide14.xml><?xml version="1.0" encoding="utf-8"?>
 <p:sld xmlns:a="http://schemas.openxmlformats.org/drawingml/2006/main" xmlns:r="http://schemas.openxmlformats.org/officeDocument/2006/relationships" xmlns:p="http://schemas.openxmlformats.org/presentationml/2006/main">
   <p:cSld>
     <p:spTree>
@@ -9445,73 +9994,6 @@
           </a:prstGeom>
         </p:spPr>
       </p:pic>
-      <p:sp>
-        <p:nvSpPr>
-          <p:cNvPr id="15" name="TextBox 14">
-            <a:extLst>
-              <a:ext uri="{FF2B5EF4-FFF2-40B4-BE49-F238E27FC236}">
-                <a16:creationId xmlns:a16="http://schemas.microsoft.com/office/drawing/2014/main" id="{F897CE10-A84B-0423-FF50-F20400A6CCBF}"/>
-              </a:ext>
-            </a:extLst>
-          </p:cNvPr>
-          <p:cNvSpPr txBox="1"/>
-          <p:nvPr/>
-        </p:nvSpPr>
-        <p:spPr>
-          <a:xfrm>
-            <a:off x="1494031" y="4603784"/>
-            <a:ext cx="10287000" cy="1631216"/>
-          </a:xfrm>
-          <a:prstGeom prst="rect">
-            <a:avLst/>
-          </a:prstGeom>
-          <a:noFill/>
-        </p:spPr>
-        <p:txBody>
-          <a:bodyPr wrap="square" lIns="91440" tIns="45720" rIns="91440" bIns="45720" rtlCol="0" anchor="t">
-            <a:spAutoFit/>
-          </a:bodyPr>
-          <a:lstStyle/>
-          <a:p>
-            <a:r>
-              <a:rPr lang="en-US" sz="3200" dirty="0"/>
-              <a:t>Outputs csv files – </a:t>
-            </a:r>
-            <a:r>
-              <a:rPr lang="en-US" sz="3200" dirty="0" err="1"/>
-              <a:t>wb_matching</a:t>
-            </a:r>
-            <a:r>
-              <a:rPr lang="en-US" sz="3200" dirty="0"/>
-              <a:t>, </a:t>
-            </a:r>
-            <a:r>
-              <a:rPr lang="en-US" sz="3200" dirty="0" err="1"/>
-              <a:t>trf_matching</a:t>
-            </a:r>
-            <a:r>
-              <a:rPr lang="en-US" sz="3200" dirty="0"/>
-              <a:t>, </a:t>
-            </a:r>
-            <a:r>
-              <a:rPr lang="en-US" sz="3200" dirty="0" err="1"/>
-              <a:t>wb_not_matching</a:t>
-            </a:r>
-            <a:r>
-              <a:rPr lang="en-US" sz="3200" dirty="0"/>
-              <a:t>, </a:t>
-            </a:r>
-            <a:r>
-              <a:rPr lang="en-US" sz="3200" dirty="0" err="1"/>
-              <a:t>trf_not_matching</a:t>
-            </a:r>
-            <a:endParaRPr lang="en-US" sz="3200" dirty="0"/>
-          </a:p>
-          <a:p>
-            <a:endParaRPr lang="en-US" sz="3600" dirty="0"/>
-          </a:p>
-        </p:txBody>
-      </p:sp>
       <p:pic>
         <p:nvPicPr>
           <p:cNvPr id="4" name="Picture 3" descr="A white sheet with black text&#10;&#10;Description automatically generated">
@@ -9540,7 +10022,7 @@
         </p:blipFill>
         <p:spPr>
           <a:xfrm>
-            <a:off x="6894027" y="6079189"/>
+            <a:off x="7217584" y="4673273"/>
             <a:ext cx="4258269" cy="790685"/>
           </a:xfrm>
           <a:prstGeom prst="rect">
@@ -9576,7 +10058,7 @@
         </p:blipFill>
         <p:spPr>
           <a:xfrm>
-            <a:off x="410968" y="6079189"/>
+            <a:off x="1750524" y="4669978"/>
             <a:ext cx="4887007" cy="790685"/>
           </a:xfrm>
           <a:prstGeom prst="rect">
@@ -9598,7 +10080,7 @@
         </p:nvSpPr>
         <p:spPr>
           <a:xfrm>
-            <a:off x="2485016" y="5803024"/>
+            <a:off x="3824572" y="4327619"/>
             <a:ext cx="738909" cy="307777"/>
           </a:xfrm>
           <a:prstGeom prst="rect">
@@ -9633,7 +10115,7 @@
         </p:nvSpPr>
         <p:spPr>
           <a:xfrm>
-            <a:off x="8653706" y="5803023"/>
+            <a:off x="8968072" y="4349674"/>
             <a:ext cx="738909" cy="307777"/>
           </a:xfrm>
           <a:prstGeom prst="rect">
@@ -9915,7 +10397,7 @@
                 </a:solidFill>
                 <a:effectLst/>
               </a:rPr>
-              <a:t>broker and </a:t>
+              <a:t>broker, </a:t>
             </a:r>
             <a:r>
               <a:rPr lang="en-US" sz="3200" dirty="0">
@@ -9923,7 +10405,7 @@
                   <a:srgbClr val="000000"/>
                 </a:solidFill>
               </a:rPr>
-              <a:t> symbol </a:t>
+              <a:t>symbol and price </a:t>
             </a:r>
             <a:endParaRPr lang="en-US" sz="3200" dirty="0"/>
           </a:p>
@@ -10044,10 +10526,10 @@
       </p:pic>
       <p:sp>
         <p:nvSpPr>
-          <p:cNvPr id="15" name="TextBox 14">
-            <a:extLst>
-              <a:ext uri="{FF2B5EF4-FFF2-40B4-BE49-F238E27FC236}">
-                <a16:creationId xmlns:a16="http://schemas.microsoft.com/office/drawing/2014/main" id="{F897CE10-A84B-0423-FF50-F20400A6CCBF}"/>
+          <p:cNvPr id="9" name="TextBox 8">
+            <a:extLst>
+              <a:ext uri="{FF2B5EF4-FFF2-40B4-BE49-F238E27FC236}">
+                <a16:creationId xmlns:a16="http://schemas.microsoft.com/office/drawing/2014/main" id="{73F190AE-4FA1-5764-F34E-6C5C5D49E708}"/>
               </a:ext>
             </a:extLst>
           </p:cNvPr>
@@ -10056,45 +10538,7 @@
         </p:nvSpPr>
         <p:spPr>
           <a:xfrm>
-            <a:off x="1494031" y="4695441"/>
-            <a:ext cx="10287000" cy="1631216"/>
-          </a:xfrm>
-          <a:prstGeom prst="rect">
-            <a:avLst/>
-          </a:prstGeom>
-          <a:noFill/>
-        </p:spPr>
-        <p:txBody>
-          <a:bodyPr wrap="square" lIns="91440" tIns="45720" rIns="91440" bIns="45720" rtlCol="0" anchor="t">
-            <a:spAutoFit/>
-          </a:bodyPr>
-          <a:lstStyle/>
-          <a:p>
-            <a:r>
-              <a:rPr lang="en-US" sz="3200" dirty="0"/>
-              <a:t>Outputs csv files – wb_matching_v2, trf_matching_v2, wb_not_matching_v2, trf_not_matching_v2</a:t>
-            </a:r>
-          </a:p>
-          <a:p>
-            <a:endParaRPr lang="en-US" sz="3600" dirty="0"/>
-          </a:p>
-        </p:txBody>
-      </p:sp>
-      <p:sp>
-        <p:nvSpPr>
-          <p:cNvPr id="9" name="TextBox 8">
-            <a:extLst>
-              <a:ext uri="{FF2B5EF4-FFF2-40B4-BE49-F238E27FC236}">
-                <a16:creationId xmlns:a16="http://schemas.microsoft.com/office/drawing/2014/main" id="{73F190AE-4FA1-5764-F34E-6C5C5D49E708}"/>
-              </a:ext>
-            </a:extLst>
-          </p:cNvPr>
-          <p:cNvSpPr txBox="1"/>
-          <p:nvPr/>
-        </p:nvSpPr>
-        <p:spPr>
-          <a:xfrm>
-            <a:off x="2485016" y="5803024"/>
+            <a:off x="3572842" y="4386811"/>
             <a:ext cx="738909" cy="307777"/>
           </a:xfrm>
           <a:prstGeom prst="rect">
@@ -10129,7 +10573,7 @@
         </p:nvSpPr>
         <p:spPr>
           <a:xfrm>
-            <a:off x="8653706" y="5803023"/>
+            <a:off x="8471327" y="4410696"/>
             <a:ext cx="738909" cy="307777"/>
           </a:xfrm>
           <a:prstGeom prst="rect">
@@ -10178,7 +10622,7 @@
         </p:blipFill>
         <p:spPr>
           <a:xfrm>
-            <a:off x="6390564" y="6110800"/>
+            <a:off x="6559226" y="4817089"/>
             <a:ext cx="4563112" cy="419158"/>
           </a:xfrm>
           <a:prstGeom prst="rect">
@@ -10214,7 +10658,7 @@
         </p:blipFill>
         <p:spPr>
           <a:xfrm>
-            <a:off x="572024" y="6057788"/>
+            <a:off x="1494031" y="4764076"/>
             <a:ext cx="4896533" cy="800212"/>
           </a:xfrm>
           <a:prstGeom prst="rect">
@@ -10561,10 +11005,10 @@
       </p:pic>
       <p:sp>
         <p:nvSpPr>
-          <p:cNvPr id="15" name="TextBox 14">
-            <a:extLst>
-              <a:ext uri="{FF2B5EF4-FFF2-40B4-BE49-F238E27FC236}">
-                <a16:creationId xmlns:a16="http://schemas.microsoft.com/office/drawing/2014/main" id="{F897CE10-A84B-0423-FF50-F20400A6CCBF}"/>
+          <p:cNvPr id="3" name="TextBox 2">
+            <a:extLst>
+              <a:ext uri="{FF2B5EF4-FFF2-40B4-BE49-F238E27FC236}">
+                <a16:creationId xmlns:a16="http://schemas.microsoft.com/office/drawing/2014/main" id="{C206AB3D-B075-F63A-3484-DEB2D68BD254}"/>
               </a:ext>
             </a:extLst>
           </p:cNvPr>
@@ -10573,45 +11017,7 @@
         </p:nvSpPr>
         <p:spPr>
           <a:xfrm>
-            <a:off x="1494031" y="4651011"/>
-            <a:ext cx="10287000" cy="1631216"/>
-          </a:xfrm>
-          <a:prstGeom prst="rect">
-            <a:avLst/>
-          </a:prstGeom>
-          <a:noFill/>
-        </p:spPr>
-        <p:txBody>
-          <a:bodyPr wrap="square" lIns="91440" tIns="45720" rIns="91440" bIns="45720" rtlCol="0" anchor="t">
-            <a:spAutoFit/>
-          </a:bodyPr>
-          <a:lstStyle/>
-          <a:p>
-            <a:r>
-              <a:rPr lang="en-US" sz="3200" dirty="0"/>
-              <a:t>Outputs csv files – wb_matching_v3, trf_matching_v3, wb_not_matching_v3, trf_not_matching_v3</a:t>
-            </a:r>
-          </a:p>
-          <a:p>
-            <a:endParaRPr lang="en-US" sz="3600" dirty="0"/>
-          </a:p>
-        </p:txBody>
-      </p:sp>
-      <p:sp>
-        <p:nvSpPr>
-          <p:cNvPr id="3" name="TextBox 2">
-            <a:extLst>
-              <a:ext uri="{FF2B5EF4-FFF2-40B4-BE49-F238E27FC236}">
-                <a16:creationId xmlns:a16="http://schemas.microsoft.com/office/drawing/2014/main" id="{C206AB3D-B075-F63A-3484-DEB2D68BD254}"/>
-              </a:ext>
-            </a:extLst>
-          </p:cNvPr>
-          <p:cNvSpPr txBox="1"/>
-          <p:nvPr/>
-        </p:nvSpPr>
-        <p:spPr>
-          <a:xfrm>
-            <a:off x="2485016" y="5803024"/>
+            <a:off x="3272765" y="4552751"/>
             <a:ext cx="738909" cy="307777"/>
           </a:xfrm>
           <a:prstGeom prst="rect">
@@ -10646,7 +11052,7 @@
         </p:nvSpPr>
         <p:spPr>
           <a:xfrm>
-            <a:off x="8598622" y="5803023"/>
+            <a:off x="8612690" y="4552751"/>
             <a:ext cx="738909" cy="307777"/>
           </a:xfrm>
           <a:prstGeom prst="rect">
@@ -10695,7 +11101,7 @@
         </p:blipFill>
         <p:spPr>
           <a:xfrm>
-            <a:off x="6505520" y="6176934"/>
+            <a:off x="6519588" y="4926662"/>
             <a:ext cx="4925112" cy="428685"/>
           </a:xfrm>
           <a:prstGeom prst="rect">
@@ -10731,7 +11137,7 @@
         </p:blipFill>
         <p:spPr>
           <a:xfrm>
-            <a:off x="706282" y="6282227"/>
+            <a:off x="1494031" y="5031954"/>
             <a:ext cx="4296375" cy="238158"/>
           </a:xfrm>
           <a:prstGeom prst="rect">
@@ -11096,10 +11502,10 @@
       </p:pic>
       <p:sp>
         <p:nvSpPr>
-          <p:cNvPr id="15" name="TextBox 14">
-            <a:extLst>
-              <a:ext uri="{FF2B5EF4-FFF2-40B4-BE49-F238E27FC236}">
-                <a16:creationId xmlns:a16="http://schemas.microsoft.com/office/drawing/2014/main" id="{F897CE10-A84B-0423-FF50-F20400A6CCBF}"/>
+          <p:cNvPr id="3" name="TextBox 2">
+            <a:extLst>
+              <a:ext uri="{FF2B5EF4-FFF2-40B4-BE49-F238E27FC236}">
+                <a16:creationId xmlns:a16="http://schemas.microsoft.com/office/drawing/2014/main" id="{44AC52A0-3BF9-A9A3-DC6F-4935533AC599}"/>
               </a:ext>
             </a:extLst>
           </p:cNvPr>
@@ -11108,45 +11514,7 @@
         </p:nvSpPr>
         <p:spPr>
           <a:xfrm>
-            <a:off x="1494031" y="4718473"/>
-            <a:ext cx="10287000" cy="1631216"/>
-          </a:xfrm>
-          <a:prstGeom prst="rect">
-            <a:avLst/>
-          </a:prstGeom>
-          <a:noFill/>
-        </p:spPr>
-        <p:txBody>
-          <a:bodyPr wrap="square" lIns="91440" tIns="45720" rIns="91440" bIns="45720" rtlCol="0" anchor="t">
-            <a:spAutoFit/>
-          </a:bodyPr>
-          <a:lstStyle/>
-          <a:p>
-            <a:r>
-              <a:rPr lang="en-US" sz="3200" dirty="0"/>
-              <a:t>Outputs csv files – wb_matching_v4, trf_matching_v4, wb_not_matching_v4, trf_not_matching_v4</a:t>
-            </a:r>
-          </a:p>
-          <a:p>
-            <a:endParaRPr lang="en-US" sz="3600" dirty="0"/>
-          </a:p>
-        </p:txBody>
-      </p:sp>
-      <p:sp>
-        <p:nvSpPr>
-          <p:cNvPr id="3" name="TextBox 2">
-            <a:extLst>
-              <a:ext uri="{FF2B5EF4-FFF2-40B4-BE49-F238E27FC236}">
-                <a16:creationId xmlns:a16="http://schemas.microsoft.com/office/drawing/2014/main" id="{44AC52A0-3BF9-A9A3-DC6F-4935533AC599}"/>
-              </a:ext>
-            </a:extLst>
-          </p:cNvPr>
-          <p:cNvSpPr txBox="1"/>
-          <p:nvPr/>
-        </p:nvSpPr>
-        <p:spPr>
-          <a:xfrm>
-            <a:off x="2485016" y="5803024"/>
+            <a:off x="3308694" y="4488793"/>
             <a:ext cx="738909" cy="307777"/>
           </a:xfrm>
           <a:prstGeom prst="rect">
@@ -11181,7 +11549,7 @@
         </p:nvSpPr>
         <p:spPr>
           <a:xfrm>
-            <a:off x="8598622" y="5803023"/>
+            <a:off x="8658786" y="4488793"/>
             <a:ext cx="738909" cy="307777"/>
           </a:xfrm>
           <a:prstGeom prst="rect">
@@ -11230,7 +11598,7 @@
         </p:blipFill>
         <p:spPr>
           <a:xfrm>
-            <a:off x="670353" y="6158522"/>
+            <a:off x="1494031" y="4844291"/>
             <a:ext cx="4896533" cy="638264"/>
           </a:xfrm>
           <a:prstGeom prst="rect">
@@ -11266,7 +11634,7 @@
         </p:blipFill>
         <p:spPr>
           <a:xfrm>
-            <a:off x="6810362" y="6259284"/>
+            <a:off x="6870526" y="4945054"/>
             <a:ext cx="4315427" cy="419158"/>
           </a:xfrm>
           <a:prstGeom prst="rect">
@@ -11876,6 +12244,23 @@
 </file>
 
 <file path=customXml/item1.xml><?xml version="1.0" encoding="utf-8"?>
+<p:properties xmlns:p="http://schemas.microsoft.com/office/2006/metadata/properties" xmlns:xsi="http://www.w3.org/2001/XMLSchema-instance" xmlns:pc="http://schemas.microsoft.com/office/infopath/2007/PartnerControls">
+  <documentManagement>
+    <_activity xmlns="04634fbf-cba0-4f2c-b64b-bfe5786ed74a" xsi:nil="true"/>
+  </documentManagement>
+</p:properties>
+</file>
+
+<file path=customXml/item2.xml><?xml version="1.0" encoding="utf-8"?>
+<?mso-contentType ?>
+<FormTemplates xmlns="http://schemas.microsoft.com/sharepoint/v3/contenttype/forms">
+  <Display>DocumentLibraryForm</Display>
+  <Edit>DocumentLibraryForm</Edit>
+  <New>DocumentLibraryForm</New>
+</FormTemplates>
+</file>
+
+<file path=customXml/item3.xml><?xml version="1.0" encoding="utf-8"?>
 <ct:contentTypeSchema xmlns:ct="http://schemas.microsoft.com/office/2006/metadata/contentType" xmlns:ma="http://schemas.microsoft.com/office/2006/metadata/properties/metaAttributes" ct:_="" ma:_="" ma:contentTypeName="文档" ma:contentTypeID="0x01010091704C4F4458AD4799CA30A1424640A8" ma:contentTypeVersion="10" ma:contentTypeDescription="新建文档。" ma:contentTypeScope="" ma:versionID="603888007cbb681a3473a2397bc01e52">
   <xsd:schema xmlns:xsd="http://www.w3.org/2001/XMLSchema" xmlns:xs="http://www.w3.org/2001/XMLSchema" xmlns:p="http://schemas.microsoft.com/office/2006/metadata/properties" xmlns:ns3="04634fbf-cba0-4f2c-b64b-bfe5786ed74a" targetNamespace="http://schemas.microsoft.com/office/2006/metadata/properties" ma:root="true" ma:fieldsID="3e2da1342de8abc2c9ddcd8cd30c6802" ns3:_="">
     <xsd:import namespace="04634fbf-cba0-4f2c-b64b-bfe5786ed74a"/>
@@ -12057,24 +12442,31 @@
 </ct:contentTypeSchema>
 </file>
 
-<file path=customXml/item2.xml><?xml version="1.0" encoding="utf-8"?>
-<?mso-contentType ?>
-<FormTemplates xmlns="http://schemas.microsoft.com/sharepoint/v3/contenttype/forms">
-  <Display>DocumentLibraryForm</Display>
-  <Edit>DocumentLibraryForm</Edit>
-  <New>DocumentLibraryForm</New>
-</FormTemplates>
+<file path=customXml/itemProps1.xml><?xml version="1.0" encoding="utf-8"?>
+<ds:datastoreItem xmlns:ds="http://schemas.openxmlformats.org/officeDocument/2006/customXml" ds:itemID="{943027CA-153C-43A2-9067-346C0FB0C7E1}">
+  <ds:schemaRefs>
+    <ds:schemaRef ds:uri="http://purl.org/dc/elements/1.1/"/>
+    <ds:schemaRef ds:uri="http://www.w3.org/XML/1998/namespace"/>
+    <ds:schemaRef ds:uri="http://purl.org/dc/dcmitype/"/>
+    <ds:schemaRef ds:uri="http://purl.org/dc/terms/"/>
+    <ds:schemaRef ds:uri="http://schemas.openxmlformats.org/package/2006/metadata/core-properties"/>
+    <ds:schemaRef ds:uri="http://schemas.microsoft.com/office/2006/documentManagement/types"/>
+    <ds:schemaRef ds:uri="http://schemas.microsoft.com/office/infopath/2007/PartnerControls"/>
+    <ds:schemaRef ds:uri="04634fbf-cba0-4f2c-b64b-bfe5786ed74a"/>
+    <ds:schemaRef ds:uri="http://schemas.microsoft.com/office/2006/metadata/properties"/>
+  </ds:schemaRefs>
+</ds:datastoreItem>
 </file>
 
-<file path=customXml/item3.xml><?xml version="1.0" encoding="utf-8"?>
-<p:properties xmlns:p="http://schemas.microsoft.com/office/2006/metadata/properties" xmlns:xsi="http://www.w3.org/2001/XMLSchema-instance" xmlns:pc="http://schemas.microsoft.com/office/infopath/2007/PartnerControls">
-  <documentManagement>
-    <_activity xmlns="04634fbf-cba0-4f2c-b64b-bfe5786ed74a" xsi:nil="true"/>
-  </documentManagement>
-</p:properties>
+<file path=customXml/itemProps2.xml><?xml version="1.0" encoding="utf-8"?>
+<ds:datastoreItem xmlns:ds="http://schemas.openxmlformats.org/officeDocument/2006/customXml" ds:itemID="{C87C4A66-61EC-4D03-9A42-DCBF8752D11E}">
+  <ds:schemaRefs>
+    <ds:schemaRef ds:uri="http://schemas.microsoft.com/sharepoint/v3/contenttype/forms"/>
+  </ds:schemaRefs>
+</ds:datastoreItem>
 </file>
 
-<file path=customXml/itemProps1.xml><?xml version="1.0" encoding="utf-8"?>
+<file path=customXml/itemProps3.xml><?xml version="1.0" encoding="utf-8"?>
 <ds:datastoreItem xmlns:ds="http://schemas.openxmlformats.org/officeDocument/2006/customXml" ds:itemID="{C71712F0-88DD-463B-AD23-6E1917D892F7}">
   <ds:schemaRefs>
     <ds:schemaRef ds:uri="http://schemas.microsoft.com/office/2006/metadata/contentType"/>
@@ -12090,28 +12482,4 @@
     <ds:schemaRef ds:uri="http://schemas.microsoft.com/internal/obd"/>
   </ds:schemaRefs>
 </ds:datastoreItem>
-</file>
-
-<file path=customXml/itemProps2.xml><?xml version="1.0" encoding="utf-8"?>
-<ds:datastoreItem xmlns:ds="http://schemas.openxmlformats.org/officeDocument/2006/customXml" ds:itemID="{C87C4A66-61EC-4D03-9A42-DCBF8752D11E}">
-  <ds:schemaRefs>
-    <ds:schemaRef ds:uri="http://schemas.microsoft.com/sharepoint/v3/contenttype/forms"/>
-  </ds:schemaRefs>
-</ds:datastoreItem>
-</file>
-
-<file path=customXml/itemProps3.xml><?xml version="1.0" encoding="utf-8"?>
-<ds:datastoreItem xmlns:ds="http://schemas.openxmlformats.org/officeDocument/2006/customXml" ds:itemID="{943027CA-153C-43A2-9067-346C0FB0C7E1}">
-  <ds:schemaRefs>
-    <ds:schemaRef ds:uri="http://purl.org/dc/elements/1.1/"/>
-    <ds:schemaRef ds:uri="http://www.w3.org/XML/1998/namespace"/>
-    <ds:schemaRef ds:uri="http://purl.org/dc/dcmitype/"/>
-    <ds:schemaRef ds:uri="http://purl.org/dc/terms/"/>
-    <ds:schemaRef ds:uri="http://schemas.openxmlformats.org/package/2006/metadata/core-properties"/>
-    <ds:schemaRef ds:uri="http://schemas.microsoft.com/office/2006/documentManagement/types"/>
-    <ds:schemaRef ds:uri="http://schemas.microsoft.com/office/infopath/2007/PartnerControls"/>
-    <ds:schemaRef ds:uri="04634fbf-cba0-4f2c-b64b-bfe5786ed74a"/>
-    <ds:schemaRef ds:uri="http://schemas.microsoft.com/office/2006/metadata/properties"/>
-  </ds:schemaRefs>
-</ds:datastoreItem>
 </file>
</xml_diff>

<commit_message>
Make changes according to Grayman's instructions
</commit_message>
<xml_diff>
--- a/Presentation_Matching.pptx
+++ b/Presentation_Matching.pptx
@@ -5,7 +5,7 @@
     <p:sldMasterId id="2147483660" r:id="rId4"/>
   </p:sldMasterIdLst>
   <p:notesMasterIdLst>
-    <p:notesMasterId r:id="rId19"/>
+    <p:notesMasterId r:id="rId20"/>
   </p:notesMasterIdLst>
   <p:sldIdLst>
     <p:sldId id="256" r:id="rId5"/>
@@ -16,12 +16,13 @@
     <p:sldId id="277" r:id="rId10"/>
     <p:sldId id="290" r:id="rId11"/>
     <p:sldId id="291" r:id="rId12"/>
-    <p:sldId id="292" r:id="rId13"/>
-    <p:sldId id="295" r:id="rId14"/>
-    <p:sldId id="296" r:id="rId15"/>
-    <p:sldId id="293" r:id="rId16"/>
-    <p:sldId id="294" r:id="rId17"/>
-    <p:sldId id="272" r:id="rId18"/>
+    <p:sldId id="295" r:id="rId13"/>
+    <p:sldId id="296" r:id="rId14"/>
+    <p:sldId id="297" r:id="rId15"/>
+    <p:sldId id="298" r:id="rId16"/>
+    <p:sldId id="293" r:id="rId17"/>
+    <p:sldId id="294" r:id="rId18"/>
+    <p:sldId id="272" r:id="rId19"/>
   </p:sldIdLst>
   <p:sldSz cx="12192000" cy="6858000"/>
   <p:notesSz cx="6858000" cy="9144000"/>
@@ -210,7 +211,7 @@
           <a:p>
             <a:fld id="{D9492CFB-E4E2-4671-84C9-9231D204B1B9}" type="datetimeFigureOut">
               <a:rPr lang="en-US" smtClean="0"/>
-              <a:t>8/13/2024</a:t>
+              <a:t>8/14/2024</a:t>
             </a:fld>
             <a:endParaRPr lang="en-US"/>
           </a:p>
@@ -671,6 +672,90 @@
     </p:spTree>
     <p:extLst>
       <p:ext uri="{BB962C8B-B14F-4D97-AF65-F5344CB8AC3E}">
+        <p14:creationId xmlns:p14="http://schemas.microsoft.com/office/powerpoint/2010/main" val="3311370257"/>
+      </p:ext>
+    </p:extLst>
+  </p:cSld>
+  <p:clrMapOvr>
+    <a:masterClrMapping/>
+  </p:clrMapOvr>
+</p:notes>
+</file>
+
+<file path=ppt/notesSlides/notesSlide11.xml><?xml version="1.0" encoding="utf-8"?>
+<p:notes xmlns:a="http://schemas.openxmlformats.org/drawingml/2006/main" xmlns:r="http://schemas.openxmlformats.org/officeDocument/2006/relationships" xmlns:p="http://schemas.openxmlformats.org/presentationml/2006/main">
+  <p:cSld>
+    <p:spTree>
+      <p:nvGrpSpPr>
+        <p:cNvPr id="1" name=""/>
+        <p:cNvGrpSpPr/>
+        <p:nvPr/>
+      </p:nvGrpSpPr>
+      <p:grpSpPr>
+        <a:xfrm>
+          <a:off x="0" y="0"/>
+          <a:ext cx="0" cy="0"/>
+          <a:chOff x="0" y="0"/>
+          <a:chExt cx="0" cy="0"/>
+        </a:xfrm>
+      </p:grpSpPr>
+      <p:sp>
+        <p:nvSpPr>
+          <p:cNvPr id="2" name="Slide Image Placeholder 1"/>
+          <p:cNvSpPr>
+            <a:spLocks noGrp="1" noRot="1" noChangeAspect="1"/>
+          </p:cNvSpPr>
+          <p:nvPr>
+            <p:ph type="sldImg"/>
+          </p:nvPr>
+        </p:nvSpPr>
+        <p:spPr/>
+      </p:sp>
+      <p:sp>
+        <p:nvSpPr>
+          <p:cNvPr id="3" name="Notes Placeholder 2"/>
+          <p:cNvSpPr>
+            <a:spLocks noGrp="1"/>
+          </p:cNvSpPr>
+          <p:nvPr>
+            <p:ph type="body" idx="1"/>
+          </p:nvPr>
+        </p:nvSpPr>
+        <p:spPr/>
+        <p:txBody>
+          <a:bodyPr/>
+          <a:lstStyle/>
+          <a:p>
+            <a:endParaRPr lang="en-US" dirty="0"/>
+          </a:p>
+        </p:txBody>
+      </p:sp>
+      <p:sp>
+        <p:nvSpPr>
+          <p:cNvPr id="4" name="Slide Number Placeholder 3"/>
+          <p:cNvSpPr>
+            <a:spLocks noGrp="1"/>
+          </p:cNvSpPr>
+          <p:nvPr>
+            <p:ph type="sldNum" sz="quarter" idx="5"/>
+          </p:nvPr>
+        </p:nvSpPr>
+        <p:spPr/>
+        <p:txBody>
+          <a:bodyPr/>
+          <a:lstStyle/>
+          <a:p>
+            <a:fld id="{D62F91BE-0B5C-4DB9-8EF4-A5A81C125A9B}" type="slidenum">
+              <a:rPr lang="en-US" smtClean="0"/>
+              <a:t>14</a:t>
+            </a:fld>
+            <a:endParaRPr lang="en-US"/>
+          </a:p>
+        </p:txBody>
+      </p:sp>
+    </p:spTree>
+    <p:extLst>
+      <p:ext uri="{BB962C8B-B14F-4D97-AF65-F5344CB8AC3E}">
         <p14:creationId xmlns:p14="http://schemas.microsoft.com/office/powerpoint/2010/main" val="4159920013"/>
       </p:ext>
     </p:extLst>
@@ -726,53 +811,53 @@
           <a:lstStyle/>
           <a:p>
             <a:r>
-              <a:rPr lang="en-US"/>
+              <a:rPr lang="en-US" dirty="0"/>
               <a:t>Anthony	</a:t>
             </a:r>
           </a:p>
           <a:p>
             <a:r>
-              <a:rPr lang="en-US"/>
+              <a:rPr lang="en-US" dirty="0"/>
               <a:t>Moving on, our first observation is that the UI/UX of the app is intimidating for new users. Starting off on the left, this is a slide from </a:t>
             </a:r>
             <a:r>
-              <a:rPr lang="en-US" err="1"/>
+              <a:rPr lang="en-US" dirty="0" err="1"/>
               <a:t>webull’s</a:t>
             </a:r>
             <a:r>
-              <a:rPr lang="en-US"/>
+              <a:rPr lang="en-US" dirty="0"/>
               <a:t> investor presentation deck that we found on the SEC’s website. From the beginning </a:t>
             </a:r>
             <a:r>
-              <a:rPr lang="en-US" err="1"/>
+              <a:rPr lang="en-US" dirty="0" err="1"/>
               <a:t>webull</a:t>
             </a:r>
             <a:r>
-              <a:rPr lang="en-US"/>
+              <a:rPr lang="en-US" dirty="0"/>
               <a:t> has been catered towards more experienced traders. This means that a lot of the design in the app is very intimidating for new traders and their first experience on </a:t>
             </a:r>
             <a:r>
-              <a:rPr lang="en-US" err="1"/>
+              <a:rPr lang="en-US" dirty="0" err="1"/>
               <a:t>brockerage</a:t>
             </a:r>
             <a:r>
-              <a:rPr lang="en-US"/>
+              <a:rPr lang="en-US" dirty="0"/>
               <a:t> apps. We can see this in the examples when we compare the difference between </a:t>
             </a:r>
             <a:r>
-              <a:rPr lang="en-US" err="1"/>
+              <a:rPr lang="en-US" dirty="0" err="1"/>
               <a:t>webull’s</a:t>
             </a:r>
             <a:r>
-              <a:rPr lang="en-US"/>
+              <a:rPr lang="en-US" dirty="0"/>
               <a:t> watch list page and </a:t>
             </a:r>
             <a:r>
-              <a:rPr lang="en-US" err="1"/>
+              <a:rPr lang="en-US" dirty="0" err="1"/>
               <a:t>robinhood’s</a:t>
             </a:r>
             <a:r>
-              <a:rPr lang="en-US"/>
+              <a:rPr lang="en-US" dirty="0"/>
               <a:t> watch list page. While it might objectively be helpful for investors to have more information, most of this information is inaccessible to new traders, whose main objective is to get a simple and fast interface to buy stocks </a:t>
             </a:r>
           </a:p>
@@ -1140,7 +1225,7 @@
     </p:spTree>
     <p:extLst>
       <p:ext uri="{BB962C8B-B14F-4D97-AF65-F5344CB8AC3E}">
-        <p14:creationId xmlns:p14="http://schemas.microsoft.com/office/powerpoint/2010/main" val="1247580666"/>
+        <p14:creationId xmlns:p14="http://schemas.microsoft.com/office/powerpoint/2010/main" val="3985976894"/>
       </p:ext>
     </p:extLst>
   </p:cSld>
@@ -1224,7 +1309,7 @@
     </p:spTree>
     <p:extLst>
       <p:ext uri="{BB962C8B-B14F-4D97-AF65-F5344CB8AC3E}">
-        <p14:creationId xmlns:p14="http://schemas.microsoft.com/office/powerpoint/2010/main" val="3985976894"/>
+        <p14:creationId xmlns:p14="http://schemas.microsoft.com/office/powerpoint/2010/main" val="303647321"/>
       </p:ext>
     </p:extLst>
   </p:cSld>
@@ -1308,7 +1393,7 @@
     </p:spTree>
     <p:extLst>
       <p:ext uri="{BB962C8B-B14F-4D97-AF65-F5344CB8AC3E}">
-        <p14:creationId xmlns:p14="http://schemas.microsoft.com/office/powerpoint/2010/main" val="2945349900"/>
+        <p14:creationId xmlns:p14="http://schemas.microsoft.com/office/powerpoint/2010/main" val="2991939583"/>
       </p:ext>
     </p:extLst>
   </p:cSld>
@@ -1392,7 +1477,7 @@
     </p:spTree>
     <p:extLst>
       <p:ext uri="{BB962C8B-B14F-4D97-AF65-F5344CB8AC3E}">
-        <p14:creationId xmlns:p14="http://schemas.microsoft.com/office/powerpoint/2010/main" val="3311370257"/>
+        <p14:creationId xmlns:p14="http://schemas.microsoft.com/office/powerpoint/2010/main" val="1425487679"/>
       </p:ext>
     </p:extLst>
   </p:cSld>
@@ -1531,7 +1616,7 @@
           <a:p>
             <a:fld id="{846CE7D5-CF57-46EF-B807-FDD0502418D4}" type="datetimeFigureOut">
               <a:rPr lang="en-US" smtClean="0"/>
-              <a:t>8/13/2024</a:t>
+              <a:t>8/14/2024</a:t>
             </a:fld>
             <a:endParaRPr lang="en-US"/>
           </a:p>
@@ -1699,7 +1784,7 @@
           <a:p>
             <a:fld id="{846CE7D5-CF57-46EF-B807-FDD0502418D4}" type="datetimeFigureOut">
               <a:rPr lang="en-US" smtClean="0"/>
-              <a:t>8/13/2024</a:t>
+              <a:t>8/14/2024</a:t>
             </a:fld>
             <a:endParaRPr lang="en-US"/>
           </a:p>
@@ -1877,7 +1962,7 @@
           <a:p>
             <a:fld id="{846CE7D5-CF57-46EF-B807-FDD0502418D4}" type="datetimeFigureOut">
               <a:rPr lang="en-US" smtClean="0"/>
-              <a:t>8/13/2024</a:t>
+              <a:t>8/14/2024</a:t>
             </a:fld>
             <a:endParaRPr lang="en-US"/>
           </a:p>
@@ -2045,7 +2130,7 @@
           <a:p>
             <a:fld id="{846CE7D5-CF57-46EF-B807-FDD0502418D4}" type="datetimeFigureOut">
               <a:rPr lang="en-US" smtClean="0"/>
-              <a:t>8/13/2024</a:t>
+              <a:t>8/14/2024</a:t>
             </a:fld>
             <a:endParaRPr lang="en-US"/>
           </a:p>
@@ -2290,7 +2375,7 @@
           <a:p>
             <a:fld id="{846CE7D5-CF57-46EF-B807-FDD0502418D4}" type="datetimeFigureOut">
               <a:rPr lang="en-US" smtClean="0"/>
-              <a:t>8/13/2024</a:t>
+              <a:t>8/14/2024</a:t>
             </a:fld>
             <a:endParaRPr lang="en-US"/>
           </a:p>
@@ -2519,7 +2604,7 @@
           <a:p>
             <a:fld id="{846CE7D5-CF57-46EF-B807-FDD0502418D4}" type="datetimeFigureOut">
               <a:rPr lang="en-US" smtClean="0"/>
-              <a:t>8/13/2024</a:t>
+              <a:t>8/14/2024</a:t>
             </a:fld>
             <a:endParaRPr lang="en-US"/>
           </a:p>
@@ -2883,7 +2968,7 @@
           <a:p>
             <a:fld id="{846CE7D5-CF57-46EF-B807-FDD0502418D4}" type="datetimeFigureOut">
               <a:rPr lang="en-US" smtClean="0"/>
-              <a:t>8/13/2024</a:t>
+              <a:t>8/14/2024</a:t>
             </a:fld>
             <a:endParaRPr lang="en-US"/>
           </a:p>
@@ -3000,7 +3085,7 @@
           <a:p>
             <a:fld id="{846CE7D5-CF57-46EF-B807-FDD0502418D4}" type="datetimeFigureOut">
               <a:rPr lang="en-US" smtClean="0"/>
-              <a:t>8/13/2024</a:t>
+              <a:t>8/14/2024</a:t>
             </a:fld>
             <a:endParaRPr lang="en-US"/>
           </a:p>
@@ -3095,7 +3180,7 @@
           <a:p>
             <a:fld id="{846CE7D5-CF57-46EF-B807-FDD0502418D4}" type="datetimeFigureOut">
               <a:rPr lang="en-US" smtClean="0"/>
-              <a:t>8/13/2024</a:t>
+              <a:t>8/14/2024</a:t>
             </a:fld>
             <a:endParaRPr lang="en-US"/>
           </a:p>
@@ -3370,7 +3455,7 @@
           <a:p>
             <a:fld id="{846CE7D5-CF57-46EF-B807-FDD0502418D4}" type="datetimeFigureOut">
               <a:rPr lang="en-US" smtClean="0"/>
-              <a:t>8/13/2024</a:t>
+              <a:t>8/14/2024</a:t>
             </a:fld>
             <a:endParaRPr lang="en-US"/>
           </a:p>
@@ -3625,7 +3710,7 @@
           <a:p>
             <a:fld id="{846CE7D5-CF57-46EF-B807-FDD0502418D4}" type="datetimeFigureOut">
               <a:rPr lang="en-US" smtClean="0"/>
-              <a:t>8/13/2024</a:t>
+              <a:t>8/14/2024</a:t>
             </a:fld>
             <a:endParaRPr lang="en-US"/>
           </a:p>
@@ -3851,7 +3936,7 @@
           <a:p>
             <a:fld id="{846CE7D5-CF57-46EF-B807-FDD0502418D4}" type="datetimeFigureOut">
               <a:rPr lang="en-US" smtClean="0"/>
-              <a:t>8/13/2024</a:t>
+              <a:t>8/14/2024</a:t>
             </a:fld>
             <a:endParaRPr lang="en-US"/>
           </a:p>
@@ -4865,7 +4950,7 @@
               <a:rPr lang="en-US" b="1" dirty="0">
                 <a:cs typeface="Arial" panose="020B0604020202020204" pitchFamily="34" charset="0"/>
               </a:rPr>
-              <a:t>Fifth Round Match </a:t>
+              <a:t>Fourth Round Match Algorithm </a:t>
             </a:r>
           </a:p>
         </p:txBody>
@@ -4948,7 +5033,7 @@
         </p:blipFill>
         <p:spPr>
           <a:xfrm>
-            <a:off x="410969" y="1450905"/>
+            <a:off x="410969" y="1566815"/>
             <a:ext cx="914400" cy="914400"/>
           </a:xfrm>
           <a:prstGeom prst="rect">
@@ -4956,68 +5041,6 @@
           </a:prstGeom>
         </p:spPr>
       </p:pic>
-      <p:sp>
-        <p:nvSpPr>
-          <p:cNvPr id="6" name="TextBox 5">
-            <a:extLst>
-              <a:ext uri="{FF2B5EF4-FFF2-40B4-BE49-F238E27FC236}">
-                <a16:creationId xmlns:a16="http://schemas.microsoft.com/office/drawing/2014/main" id="{52602A6F-75C7-66B4-5D66-DFE71028C695}"/>
-              </a:ext>
-            </a:extLst>
-          </p:cNvPr>
-          <p:cNvSpPr txBox="1"/>
-          <p:nvPr/>
-        </p:nvSpPr>
-        <p:spPr>
-          <a:xfrm>
-            <a:off x="1494031" y="1270162"/>
-            <a:ext cx="10287000" cy="2123658"/>
-          </a:xfrm>
-          <a:prstGeom prst="rect">
-            <a:avLst/>
-          </a:prstGeom>
-          <a:noFill/>
-        </p:spPr>
-        <p:txBody>
-          <a:bodyPr wrap="square" lIns="91440" tIns="45720" rIns="91440" bIns="45720" rtlCol="0" anchor="t">
-            <a:spAutoFit/>
-          </a:bodyPr>
-          <a:lstStyle/>
-          <a:p>
-            <a:r>
-              <a:rPr lang="en-US" sz="3200" b="0" i="0" dirty="0">
-                <a:solidFill>
-                  <a:srgbClr val="000000"/>
-                </a:solidFill>
-                <a:effectLst/>
-              </a:rPr>
-              <a:t>Use DP to calculate if it’s possible to sum up to cumulative value, then append </a:t>
-            </a:r>
-            <a:r>
-              <a:rPr lang="en-US" sz="3200" b="1" i="0" dirty="0">
-                <a:solidFill>
-                  <a:srgbClr val="000000"/>
-                </a:solidFill>
-                <a:effectLst/>
-              </a:rPr>
-              <a:t>random</a:t>
-            </a:r>
-            <a:r>
-              <a:rPr lang="en-US" sz="3200" b="0" i="0" dirty="0">
-                <a:solidFill>
-                  <a:srgbClr val="000000"/>
-                </a:solidFill>
-                <a:effectLst/>
-              </a:rPr>
-              <a:t> combination to matching list</a:t>
-            </a:r>
-            <a:endParaRPr lang="en-US" sz="3200" dirty="0"/>
-          </a:p>
-          <a:p>
-            <a:endParaRPr lang="en-US" sz="3600" dirty="0"/>
-          </a:p>
-        </p:txBody>
-      </p:sp>
       <p:pic>
         <p:nvPicPr>
           <p:cNvPr id="7" name="Graphic 6" descr="Badge with solid fill">
@@ -5046,7 +5069,7 @@
         </p:blipFill>
         <p:spPr>
           <a:xfrm>
-            <a:off x="410969" y="3084689"/>
+            <a:off x="410969" y="3469348"/>
             <a:ext cx="914400" cy="914400"/>
           </a:xfrm>
           <a:prstGeom prst="rect">
@@ -5056,10 +5079,10 @@
       </p:pic>
       <p:sp>
         <p:nvSpPr>
-          <p:cNvPr id="8" name="TextBox 7">
-            <a:extLst>
-              <a:ext uri="{FF2B5EF4-FFF2-40B4-BE49-F238E27FC236}">
-                <a16:creationId xmlns:a16="http://schemas.microsoft.com/office/drawing/2014/main" id="{0AC5DFBB-8526-248D-B4EB-BEC2021AA40A}"/>
+          <p:cNvPr id="13" name="TextBox 12">
+            <a:extLst>
+              <a:ext uri="{FF2B5EF4-FFF2-40B4-BE49-F238E27FC236}">
+                <a16:creationId xmlns:a16="http://schemas.microsoft.com/office/drawing/2014/main" id="{DA0B79F0-E038-9243-6B05-AAFF092EFC4A}"/>
               </a:ext>
             </a:extLst>
           </p:cNvPr>
@@ -5068,8 +5091,8 @@
         </p:nvSpPr>
         <p:spPr>
           <a:xfrm>
-            <a:off x="1494031" y="3188846"/>
-            <a:ext cx="10287000" cy="1631216"/>
+            <a:off x="1603717" y="1450905"/>
+            <a:ext cx="5823826" cy="1477328"/>
           </a:xfrm>
           <a:prstGeom prst="rect">
             <a:avLst/>
@@ -5077,27 +5100,107 @@
           <a:noFill/>
         </p:spPr>
         <p:txBody>
-          <a:bodyPr wrap="square" lIns="91440" tIns="45720" rIns="91440" bIns="45720" rtlCol="0" anchor="t">
+          <a:bodyPr wrap="square" rtlCol="0">
             <a:spAutoFit/>
           </a:bodyPr>
           <a:lstStyle/>
           <a:p>
             <a:r>
-              <a:rPr lang="en-US" sz="3200" dirty="0"/>
-              <a:t>Fourth round match percentage = 20% for WB, 25% for TRF</a:t>
-            </a:r>
-          </a:p>
-          <a:p>
-            <a:endParaRPr lang="en-US" sz="3600" dirty="0"/>
+              <a:rPr lang="en-US" b="1" dirty="0"/>
+              <a:t>Based on similar problem: </a:t>
+            </a:r>
+            <a:endParaRPr lang="en-US" dirty="0"/>
+          </a:p>
+          <a:p>
+            <a:r>
+              <a:rPr lang="en-US" dirty="0">
+                <a:hlinkClick r:id="rId8"/>
+              </a:rPr>
+              <a:t>Combination Sum II – </a:t>
+            </a:r>
+            <a:r>
+              <a:rPr lang="en-US" dirty="0" err="1">
+                <a:hlinkClick r:id="rId8"/>
+              </a:rPr>
+              <a:t>LeetCode</a:t>
+            </a:r>
+            <a:endParaRPr lang="en-US" dirty="0"/>
+          </a:p>
+          <a:p>
+            <a:r>
+              <a:rPr lang="en-US" dirty="0"/>
+              <a:t>“Given a collection of candidate numbers and a target number, find all unique combinations in candidates where the candidate numbers sum to target”</a:t>
+            </a:r>
+          </a:p>
+        </p:txBody>
+      </p:sp>
+      <p:sp>
+        <p:nvSpPr>
+          <p:cNvPr id="15" name="TextBox 14">
+            <a:extLst>
+              <a:ext uri="{FF2B5EF4-FFF2-40B4-BE49-F238E27FC236}">
+                <a16:creationId xmlns:a16="http://schemas.microsoft.com/office/drawing/2014/main" id="{3A9CA746-1208-A36B-9DF5-F8BB6202DF55}"/>
+              </a:ext>
+            </a:extLst>
+          </p:cNvPr>
+          <p:cNvSpPr txBox="1"/>
+          <p:nvPr/>
+        </p:nvSpPr>
+        <p:spPr>
+          <a:xfrm>
+            <a:off x="1603717" y="3281928"/>
+            <a:ext cx="3882683" cy="2862322"/>
+          </a:xfrm>
+          <a:prstGeom prst="rect">
+            <a:avLst/>
+          </a:prstGeom>
+          <a:noFill/>
+        </p:spPr>
+        <p:txBody>
+          <a:bodyPr wrap="square" rtlCol="0">
+            <a:spAutoFit/>
+          </a:bodyPr>
+          <a:lstStyle/>
+          <a:p>
+            <a:r>
+              <a:rPr lang="en-US" b="1" dirty="0"/>
+              <a:t>Two functions:</a:t>
+            </a:r>
+          </a:p>
+          <a:p>
+            <a:pPr marL="342900" indent="-342900">
+              <a:buAutoNum type="arabicParenR"/>
+            </a:pPr>
+            <a:r>
+              <a:rPr lang="en-US" dirty="0" err="1"/>
+              <a:t>can_sum</a:t>
+            </a:r>
+            <a:r>
+              <a:rPr lang="en-US" dirty="0"/>
+              <a:t>: use dynamic programming to calculate if a list of numbers can sum up to a target number</a:t>
+            </a:r>
+          </a:p>
+          <a:p>
+            <a:pPr marL="342900" indent="-342900">
+              <a:buAutoNum type="arabicParenR"/>
+            </a:pPr>
+            <a:r>
+              <a:rPr lang="en-US" dirty="0" err="1"/>
+              <a:t>combination_sum</a:t>
+            </a:r>
+            <a:r>
+              <a:rPr lang="en-US" dirty="0"/>
+              <a:t>: use stack-based depth first search to calculate a possible combination that sums up to the target – capped at 100,000 attempts </a:t>
+            </a:r>
           </a:p>
         </p:txBody>
       </p:sp>
       <p:pic>
         <p:nvPicPr>
-          <p:cNvPr id="14" name="Graphic 13" descr="Badge 3 with solid fill">
-            <a:extLst>
-              <a:ext uri="{FF2B5EF4-FFF2-40B4-BE49-F238E27FC236}">
-                <a16:creationId xmlns:a16="http://schemas.microsoft.com/office/drawing/2014/main" id="{AA8F4E38-A67F-5329-FCDD-927C67F47C4B}"/>
+          <p:cNvPr id="23" name="Picture 22">
+            <a:extLst>
+              <a:ext uri="{FF2B5EF4-FFF2-40B4-BE49-F238E27FC236}">
+                <a16:creationId xmlns:a16="http://schemas.microsoft.com/office/drawing/2014/main" id="{2E0A52A6-BA49-6E90-52FD-179D83B4F195}"/>
               </a:ext>
             </a:extLst>
           </p:cNvPr>
@@ -5107,163 +5210,15 @@
           <p:nvPr/>
         </p:nvPicPr>
         <p:blipFill>
-          <a:blip r:embed="rId8">
-            <a:extLst>
-              <a:ext uri="{96DAC541-7B7A-43D3-8B79-37D633B846F1}">
-                <asvg:svgBlip xmlns:asvg="http://schemas.microsoft.com/office/drawing/2016/SVG/main" r:embed="rId9"/>
-              </a:ext>
-            </a:extLst>
-          </a:blip>
+          <a:blip r:embed="rId9"/>
           <a:stretch>
             <a:fillRect/>
           </a:stretch>
         </p:blipFill>
         <p:spPr>
           <a:xfrm>
-            <a:off x="410969" y="4718473"/>
-            <a:ext cx="914400" cy="914400"/>
-          </a:xfrm>
-          <a:prstGeom prst="rect">
-            <a:avLst/>
-          </a:prstGeom>
-        </p:spPr>
-      </p:pic>
-      <p:sp>
-        <p:nvSpPr>
-          <p:cNvPr id="3" name="TextBox 2">
-            <a:extLst>
-              <a:ext uri="{FF2B5EF4-FFF2-40B4-BE49-F238E27FC236}">
-                <a16:creationId xmlns:a16="http://schemas.microsoft.com/office/drawing/2014/main" id="{44AC52A0-3BF9-A9A3-DC6F-4935533AC599}"/>
-              </a:ext>
-            </a:extLst>
-          </p:cNvPr>
-          <p:cNvSpPr txBox="1"/>
-          <p:nvPr/>
-        </p:nvSpPr>
-        <p:spPr>
-          <a:xfrm>
-            <a:off x="3308694" y="4506885"/>
-            <a:ext cx="738909" cy="307777"/>
-          </a:xfrm>
-          <a:prstGeom prst="rect">
-            <a:avLst/>
-          </a:prstGeom>
-          <a:noFill/>
-        </p:spPr>
-        <p:txBody>
-          <a:bodyPr wrap="square" rtlCol="0">
-            <a:spAutoFit/>
-          </a:bodyPr>
-          <a:lstStyle/>
-          <a:p>
-            <a:r>
-              <a:rPr lang="en-US" sz="1400" dirty="0"/>
-              <a:t>TRF</a:t>
-            </a:r>
-          </a:p>
-        </p:txBody>
-      </p:sp>
-      <p:sp>
-        <p:nvSpPr>
-          <p:cNvPr id="4" name="TextBox 3">
-            <a:extLst>
-              <a:ext uri="{FF2B5EF4-FFF2-40B4-BE49-F238E27FC236}">
-                <a16:creationId xmlns:a16="http://schemas.microsoft.com/office/drawing/2014/main" id="{89FEC1A5-AB29-239B-DB62-97DFADDD90AE}"/>
-              </a:ext>
-            </a:extLst>
-          </p:cNvPr>
-          <p:cNvSpPr txBox="1"/>
-          <p:nvPr/>
-        </p:nvSpPr>
-        <p:spPr>
-          <a:xfrm>
-            <a:off x="8809638" y="4506885"/>
-            <a:ext cx="738909" cy="307777"/>
-          </a:xfrm>
-          <a:prstGeom prst="rect">
-            <a:avLst/>
-          </a:prstGeom>
-          <a:noFill/>
-        </p:spPr>
-        <p:txBody>
-          <a:bodyPr wrap="square" rtlCol="0">
-            <a:spAutoFit/>
-          </a:bodyPr>
-          <a:lstStyle/>
-          <a:p>
-            <a:r>
-              <a:rPr lang="en-US" sz="1400" dirty="0"/>
-              <a:t>WB</a:t>
-            </a:r>
-          </a:p>
-        </p:txBody>
-      </p:sp>
-      <p:pic>
-        <p:nvPicPr>
-          <p:cNvPr id="12" name="Picture 11" descr="A grid of numbers with black numbers&#10;&#10;Description automatically generated with medium confidence">
-            <a:extLst>
-              <a:ext uri="{FF2B5EF4-FFF2-40B4-BE49-F238E27FC236}">
-                <a16:creationId xmlns:a16="http://schemas.microsoft.com/office/drawing/2014/main" id="{F499EF57-4B73-0C89-EC69-AC74FC2045A4}"/>
-              </a:ext>
-            </a:extLst>
-          </p:cNvPr>
-          <p:cNvPicPr>
-            <a:picLocks noChangeAspect="1"/>
-          </p:cNvPicPr>
-          <p:nvPr/>
-        </p:nvPicPr>
-        <p:blipFill>
-          <a:blip r:embed="rId10">
-            <a:extLst>
-              <a:ext uri="{28A0092B-C50C-407E-A947-70E740481C1C}">
-                <a14:useLocalDpi xmlns:a14="http://schemas.microsoft.com/office/drawing/2010/main" val="0"/>
-              </a:ext>
-            </a:extLst>
-          </a:blip>
-          <a:stretch>
-            <a:fillRect/>
-          </a:stretch>
-        </p:blipFill>
-        <p:spPr>
-          <a:xfrm>
-            <a:off x="1494031" y="4862383"/>
-            <a:ext cx="4896533" cy="638264"/>
-          </a:xfrm>
-          <a:prstGeom prst="rect">
-            <a:avLst/>
-          </a:prstGeom>
-        </p:spPr>
-      </p:pic>
-      <p:pic>
-        <p:nvPicPr>
-          <p:cNvPr id="16" name="Picture 15">
-            <a:extLst>
-              <a:ext uri="{FF2B5EF4-FFF2-40B4-BE49-F238E27FC236}">
-                <a16:creationId xmlns:a16="http://schemas.microsoft.com/office/drawing/2014/main" id="{8CBD449B-140B-55CC-7A45-76B78ED8B9D3}"/>
-              </a:ext>
-            </a:extLst>
-          </p:cNvPr>
-          <p:cNvPicPr>
-            <a:picLocks noChangeAspect="1"/>
-          </p:cNvPicPr>
-          <p:nvPr/>
-        </p:nvPicPr>
-        <p:blipFill>
-          <a:blip r:embed="rId11">
-            <a:extLst>
-              <a:ext uri="{28A0092B-C50C-407E-A947-70E740481C1C}">
-                <a14:useLocalDpi xmlns:a14="http://schemas.microsoft.com/office/drawing/2010/main" val="0"/>
-              </a:ext>
-            </a:extLst>
-          </a:blip>
-          <a:stretch>
-            <a:fillRect/>
-          </a:stretch>
-        </p:blipFill>
-        <p:spPr>
-          <a:xfrm>
-            <a:off x="7021378" y="4963146"/>
-            <a:ext cx="4315427" cy="419158"/>
+            <a:off x="7107758" y="1230841"/>
+            <a:ext cx="4078195" cy="4913409"/>
           </a:xfrm>
           <a:prstGeom prst="rect">
             <a:avLst/>
@@ -5273,20 +5228,20 @@
     </p:spTree>
     <p:extLst>
       <p:ext uri="{BB962C8B-B14F-4D97-AF65-F5344CB8AC3E}">
-        <p14:creationId xmlns:p14="http://schemas.microsoft.com/office/powerpoint/2010/main" val="822355705"/>
+        <p14:creationId xmlns:p14="http://schemas.microsoft.com/office/powerpoint/2010/main" val="2431640826"/>
       </p:ext>
     </p:extLst>
   </p:cSld>
   <p:clrMapOvr>
     <a:masterClrMapping/>
   </p:clrMapOvr>
-  <mc:AlternateContent xmlns:mc="http://schemas.openxmlformats.org/markup-compatibility/2006" xmlns:p15="http://schemas.microsoft.com/office/powerpoint/2012/main">
-    <mc:Choice Requires="p15">
+  <mc:AlternateContent xmlns:mc="http://schemas.openxmlformats.org/markup-compatibility/2006">
+    <mc:Choice xmlns:p15="http://schemas.microsoft.com/office/powerpoint/2012/main" Requires="p15">
       <p:transition xmlns:p14="http://schemas.microsoft.com/office/powerpoint/2010/main" spd="slow" p14:dur="3250">
         <p15:prstTrans prst="origami"/>
       </p:transition>
     </mc:Choice>
-    <mc:Fallback xmlns="">
+    <mc:Fallback>
       <p:transition spd="slow">
         <p:fade/>
       </p:transition>
@@ -5359,11 +5314,14 @@
           <a:lstStyle/>
           <a:p>
             <a:r>
-              <a:rPr lang="en-US" b="1" dirty="0">
+              <a:rPr lang="en-US" b="1" dirty="0" err="1">
                 <a:cs typeface="Arial" panose="020B0604020202020204" pitchFamily="34" charset="0"/>
               </a:rPr>
-              <a:t>Sixth Round Match </a:t>
-            </a:r>
+              <a:t>can_sum</a:t>
+            </a:r>
+            <a:endParaRPr lang="en-US" b="1" dirty="0">
+              <a:cs typeface="Arial" panose="020B0604020202020204" pitchFamily="34" charset="0"/>
+            </a:endParaRPr>
           </a:p>
         </p:txBody>
       </p:sp>
@@ -5453,68 +5411,6 @@
           </a:prstGeom>
         </p:spPr>
       </p:pic>
-      <p:sp>
-        <p:nvSpPr>
-          <p:cNvPr id="6" name="TextBox 5">
-            <a:extLst>
-              <a:ext uri="{FF2B5EF4-FFF2-40B4-BE49-F238E27FC236}">
-                <a16:creationId xmlns:a16="http://schemas.microsoft.com/office/drawing/2014/main" id="{52602A6F-75C7-66B4-5D66-DFE71028C695}"/>
-              </a:ext>
-            </a:extLst>
-          </p:cNvPr>
-          <p:cNvSpPr txBox="1"/>
-          <p:nvPr/>
-        </p:nvSpPr>
-        <p:spPr>
-          <a:xfrm>
-            <a:off x="1494031" y="1488142"/>
-            <a:ext cx="10287000" cy="1631216"/>
-          </a:xfrm>
-          <a:prstGeom prst="rect">
-            <a:avLst/>
-          </a:prstGeom>
-          <a:noFill/>
-        </p:spPr>
-        <p:txBody>
-          <a:bodyPr wrap="square" lIns="91440" tIns="45720" rIns="91440" bIns="45720" rtlCol="0" anchor="t">
-            <a:spAutoFit/>
-          </a:bodyPr>
-          <a:lstStyle/>
-          <a:p>
-            <a:r>
-              <a:rPr lang="en-US" sz="3200" b="0" i="0" dirty="0">
-                <a:solidFill>
-                  <a:srgbClr val="000000"/>
-                </a:solidFill>
-                <a:effectLst/>
-              </a:rPr>
-              <a:t>Repeat first round match – exact match between broker, symbol, quantity, but </a:t>
-            </a:r>
-            <a:r>
-              <a:rPr lang="en-US" sz="3200" b="1" i="0" dirty="0">
-                <a:solidFill>
-                  <a:srgbClr val="000000"/>
-                </a:solidFill>
-                <a:effectLst/>
-              </a:rPr>
-              <a:t>NOT</a:t>
-            </a:r>
-            <a:r>
-              <a:rPr lang="en-US" sz="3200" b="0" i="0" dirty="0">
-                <a:solidFill>
-                  <a:srgbClr val="000000"/>
-                </a:solidFill>
-                <a:effectLst/>
-              </a:rPr>
-              <a:t> price</a:t>
-            </a:r>
-            <a:endParaRPr lang="en-US" sz="3200" dirty="0"/>
-          </a:p>
-          <a:p>
-            <a:endParaRPr lang="en-US" sz="3600" dirty="0"/>
-          </a:p>
-        </p:txBody>
-      </p:sp>
       <p:pic>
         <p:nvPicPr>
           <p:cNvPr id="7" name="Graphic 6" descr="Badge with solid fill">
@@ -5551,50 +5447,12 @@
           </a:prstGeom>
         </p:spPr>
       </p:pic>
-      <p:sp>
-        <p:nvSpPr>
-          <p:cNvPr id="8" name="TextBox 7">
-            <a:extLst>
-              <a:ext uri="{FF2B5EF4-FFF2-40B4-BE49-F238E27FC236}">
-                <a16:creationId xmlns:a16="http://schemas.microsoft.com/office/drawing/2014/main" id="{0AC5DFBB-8526-248D-B4EB-BEC2021AA40A}"/>
-              </a:ext>
-            </a:extLst>
-          </p:cNvPr>
-          <p:cNvSpPr txBox="1"/>
-          <p:nvPr/>
-        </p:nvSpPr>
-        <p:spPr>
-          <a:xfrm>
-            <a:off x="1494031" y="3188846"/>
-            <a:ext cx="10287000" cy="1138773"/>
-          </a:xfrm>
-          <a:prstGeom prst="rect">
-            <a:avLst/>
-          </a:prstGeom>
-          <a:noFill/>
-        </p:spPr>
-        <p:txBody>
-          <a:bodyPr wrap="square" lIns="91440" tIns="45720" rIns="91440" bIns="45720" rtlCol="0" anchor="t">
-            <a:spAutoFit/>
-          </a:bodyPr>
-          <a:lstStyle/>
-          <a:p>
-            <a:r>
-              <a:rPr lang="en-US" sz="3200" dirty="0"/>
-              <a:t>First round match percentage = 8% for WB, 5% for TRF</a:t>
-            </a:r>
-          </a:p>
-          <a:p>
-            <a:endParaRPr lang="en-US" sz="3600" dirty="0"/>
-          </a:p>
-        </p:txBody>
-      </p:sp>
       <p:pic>
         <p:nvPicPr>
-          <p:cNvPr id="14" name="Graphic 13" descr="Badge 3 with solid fill">
-            <a:extLst>
-              <a:ext uri="{FF2B5EF4-FFF2-40B4-BE49-F238E27FC236}">
-                <a16:creationId xmlns:a16="http://schemas.microsoft.com/office/drawing/2014/main" id="{AA8F4E38-A67F-5329-FCDD-927C67F47C4B}"/>
+          <p:cNvPr id="4" name="Picture 3">
+            <a:extLst>
+              <a:ext uri="{FF2B5EF4-FFF2-40B4-BE49-F238E27FC236}">
+                <a16:creationId xmlns:a16="http://schemas.microsoft.com/office/drawing/2014/main" id="{9F52C84B-ADE9-F7FA-8E08-FFA3EF958C0B}"/>
               </a:ext>
             </a:extLst>
           </p:cNvPr>
@@ -5604,21 +5462,15 @@
           <p:nvPr/>
         </p:nvPicPr>
         <p:blipFill>
-          <a:blip r:embed="rId8">
-            <a:extLst>
-              <a:ext uri="{96DAC541-7B7A-43D3-8B79-37D633B846F1}">
-                <asvg:svgBlip xmlns:asvg="http://schemas.microsoft.com/office/drawing/2016/SVG/main" r:embed="rId9"/>
-              </a:ext>
-            </a:extLst>
-          </a:blip>
+          <a:blip r:embed="rId8"/>
           <a:stretch>
             <a:fillRect/>
           </a:stretch>
         </p:blipFill>
         <p:spPr>
           <a:xfrm>
-            <a:off x="410969" y="4718473"/>
-            <a:ext cx="914400" cy="914400"/>
+            <a:off x="5788970" y="1373831"/>
+            <a:ext cx="5992061" cy="3010320"/>
           </a:xfrm>
           <a:prstGeom prst="rect">
             <a:avLst/>
@@ -5627,10 +5479,10 @@
       </p:pic>
       <p:sp>
         <p:nvSpPr>
-          <p:cNvPr id="11" name="TextBox 10">
-            <a:extLst>
-              <a:ext uri="{FF2B5EF4-FFF2-40B4-BE49-F238E27FC236}">
-                <a16:creationId xmlns:a16="http://schemas.microsoft.com/office/drawing/2014/main" id="{54CB189A-A4D8-5872-2C61-6DF9B2D8023A}"/>
+          <p:cNvPr id="6" name="TextBox 5">
+            <a:extLst>
+              <a:ext uri="{FF2B5EF4-FFF2-40B4-BE49-F238E27FC236}">
+                <a16:creationId xmlns:a16="http://schemas.microsoft.com/office/drawing/2014/main" id="{1D41E811-7735-0284-F854-F5DC87672675}"/>
               </a:ext>
             </a:extLst>
           </p:cNvPr>
@@ -5639,8 +5491,8 @@
         </p:nvSpPr>
         <p:spPr>
           <a:xfrm>
-            <a:off x="3824572" y="4521805"/>
-            <a:ext cx="738909" cy="307777"/>
+            <a:off x="1456023" y="1182516"/>
+            <a:ext cx="3893899" cy="1754326"/>
           </a:xfrm>
           <a:prstGeom prst="rect">
             <a:avLst/>
@@ -5654,18 +5506,18 @@
           <a:lstStyle/>
           <a:p>
             <a:r>
-              <a:rPr lang="en-US" sz="1400" dirty="0"/>
-              <a:t>TRF</a:t>
-            </a:r>
-          </a:p>
-        </p:txBody>
-      </p:sp>
-      <p:sp>
-        <p:nvSpPr>
-          <p:cNvPr id="12" name="TextBox 11">
-            <a:extLst>
-              <a:ext uri="{FF2B5EF4-FFF2-40B4-BE49-F238E27FC236}">
-                <a16:creationId xmlns:a16="http://schemas.microsoft.com/office/drawing/2014/main" id="{82FAD950-890C-EFB5-ACD9-8DB8E9D78455}"/>
+              <a:rPr lang="en-US" dirty="0"/>
+              <a:t>Calculate if it is possible to reach a target number with a set of numbers, ensures we don’t do unnecessary calculations if the quantities in TRF can’t possibly add up the quantity in WB</a:t>
+            </a:r>
+          </a:p>
+        </p:txBody>
+      </p:sp>
+      <p:sp>
+        <p:nvSpPr>
+          <p:cNvPr id="8" name="TextBox 7">
+            <a:extLst>
+              <a:ext uri="{FF2B5EF4-FFF2-40B4-BE49-F238E27FC236}">
+                <a16:creationId xmlns:a16="http://schemas.microsoft.com/office/drawing/2014/main" id="{BB6003A1-0915-915D-7798-F8D6FD2A1A92}"/>
               </a:ext>
             </a:extLst>
           </p:cNvPr>
@@ -5674,8 +5526,8 @@
         </p:nvSpPr>
         <p:spPr>
           <a:xfrm>
-            <a:off x="8968072" y="4564584"/>
-            <a:ext cx="738909" cy="307777"/>
+            <a:off x="1456023" y="3330054"/>
+            <a:ext cx="4180502" cy="3416320"/>
           </a:xfrm>
           <a:prstGeom prst="rect">
             <a:avLst/>
@@ -5689,89 +5541,233 @@
           <a:lstStyle/>
           <a:p>
             <a:r>
-              <a:rPr lang="en-US" sz="1400" dirty="0"/>
-              <a:t>WB</a:t>
-            </a:r>
-          </a:p>
-        </p:txBody>
-      </p:sp>
-      <p:pic>
-        <p:nvPicPr>
-          <p:cNvPr id="15" name="Picture 14">
-            <a:extLst>
-              <a:ext uri="{FF2B5EF4-FFF2-40B4-BE49-F238E27FC236}">
-                <a16:creationId xmlns:a16="http://schemas.microsoft.com/office/drawing/2014/main" id="{21C71667-E4EA-E9D7-BA38-C893A84CF6CF}"/>
-              </a:ext>
-            </a:extLst>
-          </p:cNvPr>
-          <p:cNvPicPr>
-            <a:picLocks noChangeAspect="1"/>
-          </p:cNvPicPr>
-          <p:nvPr/>
-        </p:nvPicPr>
-        <p:blipFill>
-          <a:blip r:embed="rId10"/>
-          <a:stretch>
-            <a:fillRect/>
-          </a:stretch>
-        </p:blipFill>
-        <p:spPr>
-          <a:xfrm>
-            <a:off x="1820995" y="4988805"/>
-            <a:ext cx="4887007" cy="381053"/>
-          </a:xfrm>
-          <a:prstGeom prst="rect">
-            <a:avLst/>
-          </a:prstGeom>
-        </p:spPr>
-      </p:pic>
-      <p:pic>
-        <p:nvPicPr>
-          <p:cNvPr id="17" name="Picture 16">
-            <a:extLst>
-              <a:ext uri="{FF2B5EF4-FFF2-40B4-BE49-F238E27FC236}">
-                <a16:creationId xmlns:a16="http://schemas.microsoft.com/office/drawing/2014/main" id="{16AD8AB0-6876-31A0-CD5A-6D655A0A628A}"/>
-              </a:ext>
-            </a:extLst>
-          </p:cNvPr>
-          <p:cNvPicPr>
-            <a:picLocks noChangeAspect="1"/>
-          </p:cNvPicPr>
-          <p:nvPr/>
-        </p:nvPicPr>
-        <p:blipFill>
-          <a:blip r:embed="rId11"/>
-          <a:stretch>
-            <a:fillRect/>
-          </a:stretch>
-        </p:blipFill>
-        <p:spPr>
-          <a:xfrm>
-            <a:off x="7203628" y="4988805"/>
-            <a:ext cx="4267796" cy="381053"/>
-          </a:xfrm>
-          <a:prstGeom prst="rect">
-            <a:avLst/>
-          </a:prstGeom>
-        </p:spPr>
-      </p:pic>
+              <a:rPr lang="en-US" b="1" dirty="0"/>
+              <a:t>Simple example:</a:t>
+            </a:r>
+          </a:p>
+          <a:p>
+            <a:endParaRPr lang="en-US" b="1" dirty="0"/>
+          </a:p>
+          <a:p>
+            <a:r>
+              <a:rPr lang="en-US" dirty="0" err="1"/>
+              <a:t>nums</a:t>
+            </a:r>
+            <a:r>
+              <a:rPr lang="en-US" dirty="0"/>
+              <a:t> = [2,3,7]</a:t>
+            </a:r>
+          </a:p>
+          <a:p>
+            <a:r>
+              <a:rPr lang="en-US" dirty="0"/>
+              <a:t>target = 10</a:t>
+            </a:r>
+            <a:br>
+              <a:rPr lang="en-US" dirty="0"/>
+            </a:br>
+            <a:endParaRPr lang="en-US" dirty="0"/>
+          </a:p>
+          <a:p>
+            <a:r>
+              <a:rPr lang="en-US" dirty="0"/>
+              <a:t>First iteration:</a:t>
+            </a:r>
+          </a:p>
+          <a:p>
+            <a:r>
+              <a:rPr lang="en-US" dirty="0" err="1"/>
+              <a:t>possible_sums</a:t>
+            </a:r>
+            <a:r>
+              <a:rPr lang="en-US" dirty="0"/>
+              <a:t> = {0}</a:t>
+            </a:r>
+          </a:p>
+          <a:p>
+            <a:r>
+              <a:rPr lang="en-US" dirty="0"/>
+              <a:t>num = 2</a:t>
+            </a:r>
+          </a:p>
+          <a:p>
+            <a:r>
+              <a:rPr lang="en-US" dirty="0" err="1"/>
+              <a:t>new_sum</a:t>
+            </a:r>
+            <a:r>
+              <a:rPr lang="en-US" dirty="0"/>
+              <a:t> = {0,2}</a:t>
+            </a:r>
+          </a:p>
+          <a:p>
+            <a:endParaRPr lang="en-US" dirty="0"/>
+          </a:p>
+          <a:p>
+            <a:pPr marL="342900" indent="-342900">
+              <a:buAutoNum type="arabicParenR"/>
+            </a:pPr>
+            <a:endParaRPr lang="en-US" dirty="0"/>
+          </a:p>
+          <a:p>
+            <a:endParaRPr lang="en-US" b="1" dirty="0"/>
+          </a:p>
+        </p:txBody>
+      </p:sp>
+      <p:sp>
+        <p:nvSpPr>
+          <p:cNvPr id="9" name="TextBox 8">
+            <a:extLst>
+              <a:ext uri="{FF2B5EF4-FFF2-40B4-BE49-F238E27FC236}">
+                <a16:creationId xmlns:a16="http://schemas.microsoft.com/office/drawing/2014/main" id="{2A95D51D-BCCE-5352-849A-B32542AA2442}"/>
+              </a:ext>
+            </a:extLst>
+          </p:cNvPr>
+          <p:cNvSpPr txBox="1"/>
+          <p:nvPr/>
+        </p:nvSpPr>
+        <p:spPr>
+          <a:xfrm>
+            <a:off x="4526507" y="4738362"/>
+            <a:ext cx="3138985" cy="1477328"/>
+          </a:xfrm>
+          <a:prstGeom prst="rect">
+            <a:avLst/>
+          </a:prstGeom>
+          <a:noFill/>
+        </p:spPr>
+        <p:txBody>
+          <a:bodyPr wrap="square" rtlCol="0">
+            <a:spAutoFit/>
+          </a:bodyPr>
+          <a:lstStyle/>
+          <a:p>
+            <a:r>
+              <a:rPr lang="en-US" dirty="0"/>
+              <a:t>Second iteration:</a:t>
+            </a:r>
+          </a:p>
+          <a:p>
+            <a:r>
+              <a:rPr lang="en-US" dirty="0" err="1"/>
+              <a:t>Possible_sums</a:t>
+            </a:r>
+            <a:r>
+              <a:rPr lang="en-US" dirty="0"/>
+              <a:t> = {0,2}</a:t>
+            </a:r>
+          </a:p>
+          <a:p>
+            <a:r>
+              <a:rPr lang="en-US" dirty="0"/>
+              <a:t>num = 3</a:t>
+            </a:r>
+          </a:p>
+          <a:p>
+            <a:r>
+              <a:rPr lang="en-US" dirty="0" err="1"/>
+              <a:t>new_sum</a:t>
+            </a:r>
+            <a:r>
+              <a:rPr lang="en-US" dirty="0"/>
+              <a:t> = {0+3, 2+3} = {3,5}</a:t>
+            </a:r>
+          </a:p>
+          <a:p>
+            <a:endParaRPr lang="en-US" dirty="0"/>
+          </a:p>
+        </p:txBody>
+      </p:sp>
+      <p:sp>
+        <p:nvSpPr>
+          <p:cNvPr id="11" name="TextBox 10">
+            <a:extLst>
+              <a:ext uri="{FF2B5EF4-FFF2-40B4-BE49-F238E27FC236}">
+                <a16:creationId xmlns:a16="http://schemas.microsoft.com/office/drawing/2014/main" id="{A0919E19-72D7-4E7C-E173-356FE1EF0EA7}"/>
+              </a:ext>
+            </a:extLst>
+          </p:cNvPr>
+          <p:cNvSpPr txBox="1"/>
+          <p:nvPr/>
+        </p:nvSpPr>
+        <p:spPr>
+          <a:xfrm>
+            <a:off x="7912428" y="4738362"/>
+            <a:ext cx="3647318" cy="1754326"/>
+          </a:xfrm>
+          <a:prstGeom prst="rect">
+            <a:avLst/>
+          </a:prstGeom>
+          <a:noFill/>
+        </p:spPr>
+        <p:txBody>
+          <a:bodyPr wrap="square" rtlCol="0">
+            <a:spAutoFit/>
+          </a:bodyPr>
+          <a:lstStyle/>
+          <a:p>
+            <a:r>
+              <a:rPr lang="en-US" dirty="0"/>
+              <a:t>Third iteration:</a:t>
+            </a:r>
+          </a:p>
+          <a:p>
+            <a:r>
+              <a:rPr lang="en-US" dirty="0" err="1"/>
+              <a:t>Possible_sums</a:t>
+            </a:r>
+            <a:r>
+              <a:rPr lang="en-US" dirty="0"/>
+              <a:t> = {0,2,3,5}</a:t>
+            </a:r>
+          </a:p>
+          <a:p>
+            <a:r>
+              <a:rPr lang="en-US" dirty="0"/>
+              <a:t>num = 7</a:t>
+            </a:r>
+          </a:p>
+          <a:p>
+            <a:r>
+              <a:rPr lang="en-US" dirty="0" err="1"/>
+              <a:t>new_sum</a:t>
+            </a:r>
+            <a:r>
+              <a:rPr lang="en-US" dirty="0"/>
+              <a:t> = {0+7, 2+7, 3+7, 5+7}</a:t>
+            </a:r>
+          </a:p>
+          <a:p>
+            <a:r>
+              <a:rPr lang="en-US" dirty="0"/>
+              <a:t>= {7,9,10,12}</a:t>
+            </a:r>
+          </a:p>
+          <a:p>
+            <a:r>
+              <a:rPr lang="en-US" dirty="0"/>
+              <a:t>Since 3+7 == target, we return True</a:t>
+            </a:r>
+          </a:p>
+        </p:txBody>
+      </p:sp>
     </p:spTree>
     <p:extLst>
       <p:ext uri="{BB962C8B-B14F-4D97-AF65-F5344CB8AC3E}">
-        <p14:creationId xmlns:p14="http://schemas.microsoft.com/office/powerpoint/2010/main" val="3693234926"/>
+        <p14:creationId xmlns:p14="http://schemas.microsoft.com/office/powerpoint/2010/main" val="3479613201"/>
       </p:ext>
     </p:extLst>
   </p:cSld>
   <p:clrMapOvr>
     <a:masterClrMapping/>
   </p:clrMapOvr>
-  <mc:AlternateContent xmlns:mc="http://schemas.openxmlformats.org/markup-compatibility/2006" xmlns:p15="http://schemas.microsoft.com/office/powerpoint/2012/main">
-    <mc:Choice Requires="p15">
+  <mc:AlternateContent xmlns:mc="http://schemas.openxmlformats.org/markup-compatibility/2006">
+    <mc:Choice xmlns:p15="http://schemas.microsoft.com/office/powerpoint/2012/main" Requires="p15">
       <p:transition xmlns:p14="http://schemas.microsoft.com/office/powerpoint/2010/main" spd="slow" p14:dur="3250">
         <p15:prstTrans prst="origami"/>
       </p:transition>
     </mc:Choice>
-    <mc:Fallback xmlns="">
+    <mc:Fallback>
       <p:transition spd="slow">
         <p:fade/>
       </p:transition>
@@ -5844,11 +5840,14 @@
           <a:lstStyle/>
           <a:p>
             <a:r>
-              <a:rPr lang="en-US" b="1" dirty="0">
+              <a:rPr lang="en-US" b="1" dirty="0" err="1">
                 <a:cs typeface="Arial" panose="020B0604020202020204" pitchFamily="34" charset="0"/>
               </a:rPr>
-              <a:t>Summary </a:t>
-            </a:r>
+              <a:t>combination_sum</a:t>
+            </a:r>
+            <a:endParaRPr lang="en-US" b="1" dirty="0">
+              <a:cs typeface="Arial" panose="020B0604020202020204" pitchFamily="34" charset="0"/>
+            </a:endParaRPr>
           </a:p>
         </p:txBody>
       </p:sp>
@@ -5930,7 +5929,7 @@
         </p:blipFill>
         <p:spPr>
           <a:xfrm>
-            <a:off x="410969" y="1450905"/>
+            <a:off x="410969" y="1301736"/>
             <a:ext cx="914400" cy="914400"/>
           </a:xfrm>
           <a:prstGeom prst="rect">
@@ -5938,85 +5937,6 @@
           </a:prstGeom>
         </p:spPr>
       </p:pic>
-      <p:sp>
-        <p:nvSpPr>
-          <p:cNvPr id="6" name="TextBox 5">
-            <a:extLst>
-              <a:ext uri="{FF2B5EF4-FFF2-40B4-BE49-F238E27FC236}">
-                <a16:creationId xmlns:a16="http://schemas.microsoft.com/office/drawing/2014/main" id="{52602A6F-75C7-66B4-5D66-DFE71028C695}"/>
-              </a:ext>
-            </a:extLst>
-          </p:cNvPr>
-          <p:cNvSpPr txBox="1"/>
-          <p:nvPr/>
-        </p:nvSpPr>
-        <p:spPr>
-          <a:xfrm>
-            <a:off x="1494031" y="1488142"/>
-            <a:ext cx="10287000" cy="1138773"/>
-          </a:xfrm>
-          <a:prstGeom prst="rect">
-            <a:avLst/>
-          </a:prstGeom>
-          <a:noFill/>
-        </p:spPr>
-        <p:txBody>
-          <a:bodyPr wrap="square" lIns="91440" tIns="45720" rIns="91440" bIns="45720" rtlCol="0" anchor="t">
-            <a:spAutoFit/>
-          </a:bodyPr>
-          <a:lstStyle/>
-          <a:p>
-            <a:r>
-              <a:rPr lang="en-US" sz="3200" b="0" i="0" dirty="0">
-                <a:solidFill>
-                  <a:srgbClr val="000000"/>
-                </a:solidFill>
-                <a:effectLst/>
-              </a:rPr>
-              <a:t>Total Matching = ~ </a:t>
-            </a:r>
-            <a:r>
-              <a:rPr lang="en-US" sz="3200" dirty="0">
-                <a:solidFill>
-                  <a:srgbClr val="000000"/>
-                </a:solidFill>
-              </a:rPr>
-              <a:t>90</a:t>
-            </a:r>
-            <a:r>
-              <a:rPr lang="en-US" sz="3200" b="0" i="0" dirty="0">
-                <a:solidFill>
-                  <a:srgbClr val="000000"/>
-                </a:solidFill>
-                <a:effectLst/>
-              </a:rPr>
-              <a:t>% for </a:t>
-            </a:r>
-            <a:r>
-              <a:rPr lang="en-US" sz="3200" b="0" i="0" dirty="0" err="1">
-                <a:solidFill>
-                  <a:srgbClr val="000000"/>
-                </a:solidFill>
-                <a:effectLst/>
-              </a:rPr>
-              <a:t>Webull</a:t>
-            </a:r>
-            <a:r>
-              <a:rPr lang="en-US" sz="3200" b="0" i="0" dirty="0">
-                <a:solidFill>
-                  <a:srgbClr val="000000"/>
-                </a:solidFill>
-                <a:effectLst/>
-              </a:rPr>
-              <a:t> files, ~90% for TRF files</a:t>
-            </a:r>
-            <a:endParaRPr lang="en-US" sz="3200" dirty="0"/>
-          </a:p>
-          <a:p>
-            <a:endParaRPr lang="en-US" sz="3600" dirty="0"/>
-          </a:p>
-        </p:txBody>
-      </p:sp>
       <p:pic>
         <p:nvPicPr>
           <p:cNvPr id="7" name="Graphic 6" descr="Badge with solid fill">
@@ -6055,10 +5975,10 @@
       </p:pic>
       <p:sp>
         <p:nvSpPr>
-          <p:cNvPr id="8" name="TextBox 7">
-            <a:extLst>
-              <a:ext uri="{FF2B5EF4-FFF2-40B4-BE49-F238E27FC236}">
-                <a16:creationId xmlns:a16="http://schemas.microsoft.com/office/drawing/2014/main" id="{0AC5DFBB-8526-248D-B4EB-BEC2021AA40A}"/>
+          <p:cNvPr id="6" name="TextBox 5">
+            <a:extLst>
+              <a:ext uri="{FF2B5EF4-FFF2-40B4-BE49-F238E27FC236}">
+                <a16:creationId xmlns:a16="http://schemas.microsoft.com/office/drawing/2014/main" id="{1D41E811-7735-0284-F854-F5DC87672675}"/>
               </a:ext>
             </a:extLst>
           </p:cNvPr>
@@ -6067,46 +5987,8 @@
         </p:nvSpPr>
         <p:spPr>
           <a:xfrm>
-            <a:off x="1494031" y="2987398"/>
-            <a:ext cx="10287000" cy="1631216"/>
-          </a:xfrm>
-          <a:prstGeom prst="rect">
-            <a:avLst/>
-          </a:prstGeom>
-          <a:noFill/>
-        </p:spPr>
-        <p:txBody>
-          <a:bodyPr wrap="square" lIns="91440" tIns="45720" rIns="91440" bIns="45720" rtlCol="0" anchor="t">
-            <a:spAutoFit/>
-          </a:bodyPr>
-          <a:lstStyle/>
-          <a:p>
-            <a:r>
-              <a:rPr lang="en-US" sz="3200" dirty="0"/>
-              <a:t>Issues: runtime of round 5 is a bit long  and randomly matches orders</a:t>
-            </a:r>
-          </a:p>
-          <a:p>
-            <a:endParaRPr lang="en-US" sz="3600" dirty="0"/>
-          </a:p>
-        </p:txBody>
-      </p:sp>
-      <p:sp>
-        <p:nvSpPr>
-          <p:cNvPr id="3" name="TextBox 2">
-            <a:extLst>
-              <a:ext uri="{FF2B5EF4-FFF2-40B4-BE49-F238E27FC236}">
-                <a16:creationId xmlns:a16="http://schemas.microsoft.com/office/drawing/2014/main" id="{44AC52A0-3BF9-A9A3-DC6F-4935533AC599}"/>
-              </a:ext>
-            </a:extLst>
-          </p:cNvPr>
-          <p:cNvSpPr txBox="1"/>
-          <p:nvPr/>
-        </p:nvSpPr>
-        <p:spPr>
-          <a:xfrm>
-            <a:off x="2965307" y="4512285"/>
-            <a:ext cx="738909" cy="307777"/>
+            <a:off x="1372720" y="1182516"/>
+            <a:ext cx="3893899" cy="1138773"/>
           </a:xfrm>
           <a:prstGeom prst="rect">
             <a:avLst/>
@@ -6120,18 +6002,18 @@
           <a:lstStyle/>
           <a:p>
             <a:r>
-              <a:rPr lang="en-US" sz="1400" dirty="0"/>
-              <a:t>TRF</a:t>
-            </a:r>
-          </a:p>
-        </p:txBody>
-      </p:sp>
-      <p:sp>
-        <p:nvSpPr>
-          <p:cNvPr id="4" name="TextBox 3">
-            <a:extLst>
-              <a:ext uri="{FF2B5EF4-FFF2-40B4-BE49-F238E27FC236}">
-                <a16:creationId xmlns:a16="http://schemas.microsoft.com/office/drawing/2014/main" id="{89FEC1A5-AB29-239B-DB62-97DFADDD90AE}"/>
+              <a:rPr lang="en-US" sz="1700" dirty="0"/>
+              <a:t>Calculate a possible combination that can sum to our target quantity. The number of attempts is capped at 100,000 to prevent getting stuck</a:t>
+            </a:r>
+          </a:p>
+        </p:txBody>
+      </p:sp>
+      <p:sp>
+        <p:nvSpPr>
+          <p:cNvPr id="8" name="TextBox 7">
+            <a:extLst>
+              <a:ext uri="{FF2B5EF4-FFF2-40B4-BE49-F238E27FC236}">
+                <a16:creationId xmlns:a16="http://schemas.microsoft.com/office/drawing/2014/main" id="{BB6003A1-0915-915D-7798-F8D6FD2A1A92}"/>
               </a:ext>
             </a:extLst>
           </p:cNvPr>
@@ -6140,8 +6022,8 @@
         </p:nvSpPr>
         <p:spPr>
           <a:xfrm>
-            <a:off x="8558556" y="4512285"/>
-            <a:ext cx="738909" cy="307777"/>
+            <a:off x="1325369" y="2508269"/>
+            <a:ext cx="4311156" cy="5062924"/>
           </a:xfrm>
           <a:prstGeom prst="rect">
             <a:avLst/>
@@ -6155,18 +6037,87 @@
           <a:lstStyle/>
           <a:p>
             <a:r>
-              <a:rPr lang="en-US" sz="1400" dirty="0"/>
-              <a:t>WB</a:t>
-            </a:r>
+              <a:rPr lang="en-US" sz="1700" b="1" dirty="0"/>
+              <a:t>Summary:</a:t>
+            </a:r>
+          </a:p>
+          <a:p>
+            <a:pPr marL="342900" indent="-342900">
+              <a:buAutoNum type="arabicParenR"/>
+            </a:pPr>
+            <a:r>
+              <a:rPr lang="en-US" sz="1700" dirty="0"/>
+              <a:t>Sort candidates to make calculations easier</a:t>
+            </a:r>
+          </a:p>
+          <a:p>
+            <a:pPr marL="342900" indent="-342900">
+              <a:buAutoNum type="arabicParenR"/>
+            </a:pPr>
+            <a:r>
+              <a:rPr lang="en-US" sz="1700" dirty="0"/>
+              <a:t>While there are still values to explore:</a:t>
+            </a:r>
+          </a:p>
+          <a:p>
+            <a:pPr marL="800100" lvl="1" indent="-342900">
+              <a:buAutoNum type="arabicParenR"/>
+            </a:pPr>
+            <a:r>
+              <a:rPr lang="en-US" sz="1700" dirty="0"/>
+              <a:t>If the current sum = our target, return the combination that makes up our current sum</a:t>
+            </a:r>
+          </a:p>
+          <a:p>
+            <a:pPr marL="800100" lvl="1" indent="-342900">
+              <a:buAutoNum type="arabicParenR"/>
+            </a:pPr>
+            <a:r>
+              <a:rPr lang="en-US" sz="1700" dirty="0"/>
+              <a:t>If the number of iterations exceeds our maximum – assume no combination will be found and return </a:t>
+            </a:r>
+          </a:p>
+          <a:p>
+            <a:pPr marL="800100" lvl="1" indent="-342900">
+              <a:buAutoNum type="arabicParenR"/>
+            </a:pPr>
+            <a:r>
+              <a:rPr lang="en-US" sz="1700" dirty="0"/>
+              <a:t>If the current number equals the previous number, skip it to prevent duplicates</a:t>
+            </a:r>
+          </a:p>
+          <a:p>
+            <a:pPr marL="800100" lvl="1" indent="-342900">
+              <a:buAutoNum type="arabicParenR"/>
+            </a:pPr>
+            <a:r>
+              <a:rPr lang="en-US" sz="1700" dirty="0"/>
+              <a:t>Add the next number in candidates to our current number </a:t>
+            </a:r>
+          </a:p>
+          <a:p>
+            <a:pPr marL="800100" lvl="1" indent="-342900">
+              <a:buAutoNum type="arabicParenR"/>
+            </a:pPr>
+            <a:endParaRPr lang="en-US" sz="1700" dirty="0"/>
+          </a:p>
+          <a:p>
+            <a:pPr marL="342900" indent="-342900">
+              <a:buAutoNum type="arabicParenR"/>
+            </a:pPr>
+            <a:endParaRPr lang="en-US" sz="1700" dirty="0"/>
+          </a:p>
+          <a:p>
+            <a:endParaRPr lang="en-US" sz="1700" b="1" dirty="0"/>
           </a:p>
         </p:txBody>
       </p:sp>
       <p:pic>
         <p:nvPicPr>
-          <p:cNvPr id="10" name="Picture 9">
-            <a:extLst>
-              <a:ext uri="{FF2B5EF4-FFF2-40B4-BE49-F238E27FC236}">
-                <a16:creationId xmlns:a16="http://schemas.microsoft.com/office/drawing/2014/main" id="{1E72E8A1-7817-BFAE-0A9F-FFEA1F987E1E}"/>
+          <p:cNvPr id="13" name="Picture 12">
+            <a:extLst>
+              <a:ext uri="{FF2B5EF4-FFF2-40B4-BE49-F238E27FC236}">
+                <a16:creationId xmlns:a16="http://schemas.microsoft.com/office/drawing/2014/main" id="{97CDD366-3A36-4F27-A15C-AAAB43C1BD69}"/>
               </a:ext>
             </a:extLst>
           </p:cNvPr>
@@ -6176,140 +6127,27 @@
           <p:nvPr/>
         </p:nvPicPr>
         <p:blipFill>
-          <a:blip r:embed="rId8">
-            <a:extLst>
-              <a:ext uri="{28A0092B-C50C-407E-A947-70E740481C1C}">
-                <a14:useLocalDpi xmlns:a14="http://schemas.microsoft.com/office/drawing/2010/main" val="0"/>
-              </a:ext>
-            </a:extLst>
-          </a:blip>
+          <a:blip r:embed="rId8"/>
           <a:stretch>
             <a:fillRect/>
           </a:stretch>
         </p:blipFill>
         <p:spPr>
           <a:xfrm>
-            <a:off x="1241660" y="4967829"/>
-            <a:ext cx="4925112" cy="438211"/>
+            <a:off x="5683876" y="1182516"/>
+            <a:ext cx="5353797" cy="4191585"/>
           </a:xfrm>
           <a:prstGeom prst="rect">
             <a:avLst/>
           </a:prstGeom>
         </p:spPr>
       </p:pic>
-      <p:pic>
-        <p:nvPicPr>
-          <p:cNvPr id="13" name="Picture 12">
-            <a:extLst>
-              <a:ext uri="{FF2B5EF4-FFF2-40B4-BE49-F238E27FC236}">
-                <a16:creationId xmlns:a16="http://schemas.microsoft.com/office/drawing/2014/main" id="{7CFC2FCB-BE84-A0CC-0067-D1E2A7BC5AFE}"/>
-              </a:ext>
-            </a:extLst>
-          </p:cNvPr>
-          <p:cNvPicPr>
-            <a:picLocks noChangeAspect="1"/>
-          </p:cNvPicPr>
-          <p:nvPr/>
-        </p:nvPicPr>
-        <p:blipFill>
-          <a:blip r:embed="rId9">
-            <a:extLst>
-              <a:ext uri="{28A0092B-C50C-407E-A947-70E740481C1C}">
-                <a14:useLocalDpi xmlns:a14="http://schemas.microsoft.com/office/drawing/2010/main" val="0"/>
-              </a:ext>
-            </a:extLst>
-          </a:blip>
-          <a:stretch>
-            <a:fillRect/>
-          </a:stretch>
-        </p:blipFill>
-        <p:spPr>
-          <a:xfrm>
-            <a:off x="6784586" y="4996408"/>
-            <a:ext cx="4286848" cy="409632"/>
-          </a:xfrm>
-          <a:prstGeom prst="rect">
-            <a:avLst/>
-          </a:prstGeom>
-        </p:spPr>
-      </p:pic>
-      <p:pic>
-        <p:nvPicPr>
-          <p:cNvPr id="18" name="Picture 17">
-            <a:extLst>
-              <a:ext uri="{FF2B5EF4-FFF2-40B4-BE49-F238E27FC236}">
-                <a16:creationId xmlns:a16="http://schemas.microsoft.com/office/drawing/2014/main" id="{625DF1C7-31C2-BFF0-643C-CD111E12C757}"/>
-              </a:ext>
-            </a:extLst>
-          </p:cNvPr>
-          <p:cNvPicPr>
-            <a:picLocks noChangeAspect="1"/>
-          </p:cNvPicPr>
-          <p:nvPr/>
-        </p:nvPicPr>
-        <p:blipFill>
-          <a:blip r:embed="rId10">
-            <a:extLst>
-              <a:ext uri="{28A0092B-C50C-407E-A947-70E740481C1C}">
-                <a14:useLocalDpi xmlns:a14="http://schemas.microsoft.com/office/drawing/2010/main" val="0"/>
-              </a:ext>
-            </a:extLst>
-          </a:blip>
-          <a:stretch>
-            <a:fillRect/>
-          </a:stretch>
-        </p:blipFill>
-        <p:spPr>
-          <a:xfrm>
-            <a:off x="1232133" y="5800576"/>
-            <a:ext cx="4934639" cy="228632"/>
-          </a:xfrm>
-          <a:prstGeom prst="rect">
-            <a:avLst/>
-          </a:prstGeom>
-        </p:spPr>
-      </p:pic>
-      <p:pic>
-        <p:nvPicPr>
-          <p:cNvPr id="20" name="Picture 19">
-            <a:extLst>
-              <a:ext uri="{FF2B5EF4-FFF2-40B4-BE49-F238E27FC236}">
-                <a16:creationId xmlns:a16="http://schemas.microsoft.com/office/drawing/2014/main" id="{BDF0F840-3238-ED09-8D2B-F0105DFE85EA}"/>
-              </a:ext>
-            </a:extLst>
-          </p:cNvPr>
-          <p:cNvPicPr>
-            <a:picLocks noChangeAspect="1"/>
-          </p:cNvPicPr>
-          <p:nvPr/>
-        </p:nvPicPr>
-        <p:blipFill rotWithShape="1">
-          <a:blip r:embed="rId11">
-            <a:extLst>
-              <a:ext uri="{28A0092B-C50C-407E-A947-70E740481C1C}">
-                <a14:useLocalDpi xmlns:a14="http://schemas.microsoft.com/office/drawing/2010/main" val="0"/>
-              </a:ext>
-            </a:extLst>
-          </a:blip>
-          <a:srcRect r="13294"/>
-          <a:stretch/>
-        </p:blipFill>
-        <p:spPr>
-          <a:xfrm>
-            <a:off x="6784587" y="5800576"/>
-            <a:ext cx="4286848" cy="228632"/>
-          </a:xfrm>
-          <a:prstGeom prst="rect">
-            <a:avLst/>
-          </a:prstGeom>
-        </p:spPr>
-      </p:pic>
-      <p:sp>
-        <p:nvSpPr>
-          <p:cNvPr id="21" name="TextBox 20">
-            <a:extLst>
-              <a:ext uri="{FF2B5EF4-FFF2-40B4-BE49-F238E27FC236}">
-                <a16:creationId xmlns:a16="http://schemas.microsoft.com/office/drawing/2014/main" id="{8D941CD9-FF40-6F9D-7EC2-116B397C2775}"/>
+      <p:sp>
+        <p:nvSpPr>
+          <p:cNvPr id="14" name="TextBox 13">
+            <a:extLst>
+              <a:ext uri="{FF2B5EF4-FFF2-40B4-BE49-F238E27FC236}">
+                <a16:creationId xmlns:a16="http://schemas.microsoft.com/office/drawing/2014/main" id="{FC9B9D21-AB3F-0495-8E8C-9802EFFABF02}"/>
               </a:ext>
             </a:extLst>
           </p:cNvPr>
@@ -6318,8 +6156,8 @@
         </p:nvSpPr>
         <p:spPr>
           <a:xfrm>
-            <a:off x="78901" y="4996408"/>
-            <a:ext cx="914399" cy="307777"/>
+            <a:off x="5795493" y="5478113"/>
+            <a:ext cx="5390460" cy="1138773"/>
           </a:xfrm>
           <a:prstGeom prst="rect">
             <a:avLst/>
@@ -6333,43 +6171,14 @@
           <a:lstStyle/>
           <a:p>
             <a:r>
-              <a:rPr lang="en-US" sz="1400" dirty="0"/>
-              <a:t>Quantity</a:t>
-            </a:r>
-          </a:p>
-        </p:txBody>
-      </p:sp>
-      <p:sp>
-        <p:nvSpPr>
-          <p:cNvPr id="22" name="TextBox 21">
-            <a:extLst>
-              <a:ext uri="{FF2B5EF4-FFF2-40B4-BE49-F238E27FC236}">
-                <a16:creationId xmlns:a16="http://schemas.microsoft.com/office/drawing/2014/main" id="{0A789175-8E96-301E-81CA-7E90F48F5517}"/>
-              </a:ext>
-            </a:extLst>
-          </p:cNvPr>
-          <p:cNvSpPr txBox="1"/>
-          <p:nvPr/>
-        </p:nvSpPr>
-        <p:spPr>
-          <a:xfrm>
-            <a:off x="166645" y="5721431"/>
-            <a:ext cx="738909" cy="307777"/>
-          </a:xfrm>
-          <a:prstGeom prst="rect">
-            <a:avLst/>
-          </a:prstGeom>
-          <a:noFill/>
-        </p:spPr>
-        <p:txBody>
-          <a:bodyPr wrap="square" rtlCol="0">
-            <a:spAutoFit/>
-          </a:bodyPr>
-          <a:lstStyle/>
-          <a:p>
-            <a:r>
-              <a:rPr lang="en-US" sz="1400" dirty="0"/>
-              <a:t>Price</a:t>
+              <a:rPr lang="en-US" sz="1700" dirty="0"/>
+              <a:t>5) If the new total is greater than our target, exit from loop</a:t>
+            </a:r>
+          </a:p>
+          <a:p>
+            <a:r>
+              <a:rPr lang="en-US" sz="1700" dirty="0"/>
+              <a:t>6) Add the new sum, index, new path to the stack to continue exploring </a:t>
             </a:r>
           </a:p>
         </p:txBody>
@@ -6377,20 +6186,20 @@
     </p:spTree>
     <p:extLst>
       <p:ext uri="{BB962C8B-B14F-4D97-AF65-F5344CB8AC3E}">
-        <p14:creationId xmlns:p14="http://schemas.microsoft.com/office/powerpoint/2010/main" val="467652972"/>
+        <p14:creationId xmlns:p14="http://schemas.microsoft.com/office/powerpoint/2010/main" val="1508097806"/>
       </p:ext>
     </p:extLst>
   </p:cSld>
   <p:clrMapOvr>
     <a:masterClrMapping/>
   </p:clrMapOvr>
-  <mc:AlternateContent xmlns:mc="http://schemas.openxmlformats.org/markup-compatibility/2006" xmlns:p15="http://schemas.microsoft.com/office/powerpoint/2012/main">
-    <mc:Choice Requires="p15">
+  <mc:AlternateContent xmlns:mc="http://schemas.openxmlformats.org/markup-compatibility/2006">
+    <mc:Choice xmlns:p15="http://schemas.microsoft.com/office/powerpoint/2012/main" Requires="p15">
       <p:transition xmlns:p14="http://schemas.microsoft.com/office/powerpoint/2010/main" spd="slow" p14:dur="3250">
         <p15:prstTrans prst="origami"/>
       </p:transition>
     </mc:Choice>
-    <mc:Fallback xmlns="">
+    <mc:Fallback>
       <p:transition spd="slow">
         <p:fade/>
       </p:transition>
@@ -6466,6 +6275,625 @@
               <a:rPr lang="en-US" b="1" dirty="0">
                 <a:cs typeface="Arial" panose="020B0604020202020204" pitchFamily="34" charset="0"/>
               </a:rPr>
+              <a:t>Summary </a:t>
+            </a:r>
+          </a:p>
+        </p:txBody>
+      </p:sp>
+      <p:pic>
+        <p:nvPicPr>
+          <p:cNvPr id="2050" name="Picture 2" descr="Introduction to OpenAPI | Webull API">
+            <a:extLst>
+              <a:ext uri="{FF2B5EF4-FFF2-40B4-BE49-F238E27FC236}">
+                <a16:creationId xmlns:a16="http://schemas.microsoft.com/office/drawing/2014/main" id="{5D4D8DD1-C214-0790-8530-0AD19EBDA1EE}"/>
+              </a:ext>
+            </a:extLst>
+          </p:cNvPr>
+          <p:cNvPicPr>
+            <a:picLocks noChangeAspect="1" noChangeArrowheads="1"/>
+          </p:cNvPicPr>
+          <p:nvPr/>
+        </p:nvPicPr>
+        <p:blipFill>
+          <a:blip r:embed="rId3" cstate="print">
+            <a:extLst>
+              <a:ext uri="{28A0092B-C50C-407E-A947-70E740481C1C}">
+                <a14:useLocalDpi xmlns:a14="http://schemas.microsoft.com/office/drawing/2010/main" val="0"/>
+              </a:ext>
+            </a:extLst>
+          </a:blip>
+          <a:srcRect/>
+          <a:stretch>
+            <a:fillRect/>
+          </a:stretch>
+        </p:blipFill>
+        <p:spPr bwMode="auto">
+          <a:xfrm>
+            <a:off x="11037673" y="0"/>
+            <a:ext cx="1044147" cy="1002958"/>
+          </a:xfrm>
+          <a:prstGeom prst="rect">
+            <a:avLst/>
+          </a:prstGeom>
+          <a:noFill/>
+          <a:extLst>
+            <a:ext uri="{909E8E84-426E-40DD-AFC4-6F175D3DCCD1}">
+              <a14:hiddenFill xmlns:a14="http://schemas.microsoft.com/office/drawing/2010/main">
+                <a:solidFill>
+                  <a:srgbClr val="FFFFFF"/>
+                </a:solidFill>
+              </a14:hiddenFill>
+            </a:ext>
+          </a:extLst>
+        </p:spPr>
+      </p:pic>
+      <p:pic>
+        <p:nvPicPr>
+          <p:cNvPr id="5" name="Graphic 4" descr="Badge 1 with solid fill">
+            <a:extLst>
+              <a:ext uri="{FF2B5EF4-FFF2-40B4-BE49-F238E27FC236}">
+                <a16:creationId xmlns:a16="http://schemas.microsoft.com/office/drawing/2014/main" id="{601513C2-3A92-51BB-08E6-9AAFC39B91C7}"/>
+              </a:ext>
+            </a:extLst>
+          </p:cNvPr>
+          <p:cNvPicPr>
+            <a:picLocks noChangeAspect="1"/>
+          </p:cNvPicPr>
+          <p:nvPr/>
+        </p:nvPicPr>
+        <p:blipFill>
+          <a:blip r:embed="rId4">
+            <a:extLst>
+              <a:ext uri="{28A0092B-C50C-407E-A947-70E740481C1C}">
+                <a14:useLocalDpi xmlns:a14="http://schemas.microsoft.com/office/drawing/2010/main" val="0"/>
+              </a:ext>
+              <a:ext uri="{96DAC541-7B7A-43D3-8B79-37D633B846F1}">
+                <asvg:svgBlip xmlns:asvg="http://schemas.microsoft.com/office/drawing/2016/SVG/main" r:embed="rId5"/>
+              </a:ext>
+            </a:extLst>
+          </a:blip>
+          <a:stretch>
+            <a:fillRect/>
+          </a:stretch>
+        </p:blipFill>
+        <p:spPr>
+          <a:xfrm>
+            <a:off x="410969" y="1450905"/>
+            <a:ext cx="914400" cy="914400"/>
+          </a:xfrm>
+          <a:prstGeom prst="rect">
+            <a:avLst/>
+          </a:prstGeom>
+        </p:spPr>
+      </p:pic>
+      <p:sp>
+        <p:nvSpPr>
+          <p:cNvPr id="6" name="TextBox 5">
+            <a:extLst>
+              <a:ext uri="{FF2B5EF4-FFF2-40B4-BE49-F238E27FC236}">
+                <a16:creationId xmlns:a16="http://schemas.microsoft.com/office/drawing/2014/main" id="{52602A6F-75C7-66B4-5D66-DFE71028C695}"/>
+              </a:ext>
+            </a:extLst>
+          </p:cNvPr>
+          <p:cNvSpPr txBox="1"/>
+          <p:nvPr/>
+        </p:nvSpPr>
+        <p:spPr>
+          <a:xfrm>
+            <a:off x="1494031" y="1488142"/>
+            <a:ext cx="10287000" cy="1138773"/>
+          </a:xfrm>
+          <a:prstGeom prst="rect">
+            <a:avLst/>
+          </a:prstGeom>
+          <a:noFill/>
+        </p:spPr>
+        <p:txBody>
+          <a:bodyPr wrap="square" lIns="91440" tIns="45720" rIns="91440" bIns="45720" rtlCol="0" anchor="t">
+            <a:spAutoFit/>
+          </a:bodyPr>
+          <a:lstStyle/>
+          <a:p>
+            <a:r>
+              <a:rPr lang="en-US" sz="3200" b="0" i="0" dirty="0">
+                <a:solidFill>
+                  <a:srgbClr val="000000"/>
+                </a:solidFill>
+                <a:effectLst/>
+              </a:rPr>
+              <a:t>Total Matching = ~ </a:t>
+            </a:r>
+            <a:r>
+              <a:rPr lang="en-US" sz="3200" dirty="0">
+                <a:solidFill>
+                  <a:srgbClr val="000000"/>
+                </a:solidFill>
+              </a:rPr>
+              <a:t>90</a:t>
+            </a:r>
+            <a:r>
+              <a:rPr lang="en-US" sz="3200" b="0" i="0" dirty="0">
+                <a:solidFill>
+                  <a:srgbClr val="000000"/>
+                </a:solidFill>
+                <a:effectLst/>
+              </a:rPr>
+              <a:t>% for </a:t>
+            </a:r>
+            <a:r>
+              <a:rPr lang="en-US" sz="3200" b="0" i="0" dirty="0" err="1">
+                <a:solidFill>
+                  <a:srgbClr val="000000"/>
+                </a:solidFill>
+                <a:effectLst/>
+              </a:rPr>
+              <a:t>Webull</a:t>
+            </a:r>
+            <a:r>
+              <a:rPr lang="en-US" sz="3200" b="0" i="0" dirty="0">
+                <a:solidFill>
+                  <a:srgbClr val="000000"/>
+                </a:solidFill>
+                <a:effectLst/>
+              </a:rPr>
+              <a:t> files, ~90% for TRF files</a:t>
+            </a:r>
+            <a:endParaRPr lang="en-US" sz="3200" dirty="0"/>
+          </a:p>
+          <a:p>
+            <a:endParaRPr lang="en-US" sz="3600" dirty="0"/>
+          </a:p>
+        </p:txBody>
+      </p:sp>
+      <p:pic>
+        <p:nvPicPr>
+          <p:cNvPr id="7" name="Graphic 6" descr="Badge with solid fill">
+            <a:extLst>
+              <a:ext uri="{FF2B5EF4-FFF2-40B4-BE49-F238E27FC236}">
+                <a16:creationId xmlns:a16="http://schemas.microsoft.com/office/drawing/2014/main" id="{0F54D45B-9F7C-0AE9-F410-6B51FFD152E6}"/>
+              </a:ext>
+            </a:extLst>
+          </p:cNvPr>
+          <p:cNvPicPr>
+            <a:picLocks noChangeAspect="1"/>
+          </p:cNvPicPr>
+          <p:nvPr/>
+        </p:nvPicPr>
+        <p:blipFill>
+          <a:blip r:embed="rId6">
+            <a:extLst>
+              <a:ext uri="{96DAC541-7B7A-43D3-8B79-37D633B846F1}">
+                <asvg:svgBlip xmlns:asvg="http://schemas.microsoft.com/office/drawing/2016/SVG/main" r:embed="rId7"/>
+              </a:ext>
+            </a:extLst>
+          </a:blip>
+          <a:stretch>
+            <a:fillRect/>
+          </a:stretch>
+        </p:blipFill>
+        <p:spPr>
+          <a:xfrm>
+            <a:off x="410969" y="3084689"/>
+            <a:ext cx="914400" cy="914400"/>
+          </a:xfrm>
+          <a:prstGeom prst="rect">
+            <a:avLst/>
+          </a:prstGeom>
+        </p:spPr>
+      </p:pic>
+      <p:sp>
+        <p:nvSpPr>
+          <p:cNvPr id="8" name="TextBox 7">
+            <a:extLst>
+              <a:ext uri="{FF2B5EF4-FFF2-40B4-BE49-F238E27FC236}">
+                <a16:creationId xmlns:a16="http://schemas.microsoft.com/office/drawing/2014/main" id="{0AC5DFBB-8526-248D-B4EB-BEC2021AA40A}"/>
+              </a:ext>
+            </a:extLst>
+          </p:cNvPr>
+          <p:cNvSpPr txBox="1"/>
+          <p:nvPr/>
+        </p:nvSpPr>
+        <p:spPr>
+          <a:xfrm>
+            <a:off x="1494031" y="2987398"/>
+            <a:ext cx="10287000" cy="1631216"/>
+          </a:xfrm>
+          <a:prstGeom prst="rect">
+            <a:avLst/>
+          </a:prstGeom>
+          <a:noFill/>
+        </p:spPr>
+        <p:txBody>
+          <a:bodyPr wrap="square" lIns="91440" tIns="45720" rIns="91440" bIns="45720" rtlCol="0" anchor="t">
+            <a:spAutoFit/>
+          </a:bodyPr>
+          <a:lstStyle/>
+          <a:p>
+            <a:r>
+              <a:rPr lang="en-US" sz="3200" dirty="0"/>
+              <a:t>Issues: runtime of round 5 is a bit long  and randomly matches orders</a:t>
+            </a:r>
+          </a:p>
+          <a:p>
+            <a:endParaRPr lang="en-US" sz="3600" dirty="0"/>
+          </a:p>
+        </p:txBody>
+      </p:sp>
+      <p:sp>
+        <p:nvSpPr>
+          <p:cNvPr id="3" name="TextBox 2">
+            <a:extLst>
+              <a:ext uri="{FF2B5EF4-FFF2-40B4-BE49-F238E27FC236}">
+                <a16:creationId xmlns:a16="http://schemas.microsoft.com/office/drawing/2014/main" id="{44AC52A0-3BF9-A9A3-DC6F-4935533AC599}"/>
+              </a:ext>
+            </a:extLst>
+          </p:cNvPr>
+          <p:cNvSpPr txBox="1"/>
+          <p:nvPr/>
+        </p:nvSpPr>
+        <p:spPr>
+          <a:xfrm>
+            <a:off x="2965307" y="4512285"/>
+            <a:ext cx="738909" cy="307777"/>
+          </a:xfrm>
+          <a:prstGeom prst="rect">
+            <a:avLst/>
+          </a:prstGeom>
+          <a:noFill/>
+        </p:spPr>
+        <p:txBody>
+          <a:bodyPr wrap="square" rtlCol="0">
+            <a:spAutoFit/>
+          </a:bodyPr>
+          <a:lstStyle/>
+          <a:p>
+            <a:r>
+              <a:rPr lang="en-US" sz="1400" dirty="0"/>
+              <a:t>TRF</a:t>
+            </a:r>
+          </a:p>
+        </p:txBody>
+      </p:sp>
+      <p:sp>
+        <p:nvSpPr>
+          <p:cNvPr id="4" name="TextBox 3">
+            <a:extLst>
+              <a:ext uri="{FF2B5EF4-FFF2-40B4-BE49-F238E27FC236}">
+                <a16:creationId xmlns:a16="http://schemas.microsoft.com/office/drawing/2014/main" id="{89FEC1A5-AB29-239B-DB62-97DFADDD90AE}"/>
+              </a:ext>
+            </a:extLst>
+          </p:cNvPr>
+          <p:cNvSpPr txBox="1"/>
+          <p:nvPr/>
+        </p:nvSpPr>
+        <p:spPr>
+          <a:xfrm>
+            <a:off x="8558556" y="4512285"/>
+            <a:ext cx="738909" cy="307777"/>
+          </a:xfrm>
+          <a:prstGeom prst="rect">
+            <a:avLst/>
+          </a:prstGeom>
+          <a:noFill/>
+        </p:spPr>
+        <p:txBody>
+          <a:bodyPr wrap="square" rtlCol="0">
+            <a:spAutoFit/>
+          </a:bodyPr>
+          <a:lstStyle/>
+          <a:p>
+            <a:r>
+              <a:rPr lang="en-US" sz="1400" dirty="0"/>
+              <a:t>WB</a:t>
+            </a:r>
+          </a:p>
+        </p:txBody>
+      </p:sp>
+      <p:pic>
+        <p:nvPicPr>
+          <p:cNvPr id="10" name="Picture 9">
+            <a:extLst>
+              <a:ext uri="{FF2B5EF4-FFF2-40B4-BE49-F238E27FC236}">
+                <a16:creationId xmlns:a16="http://schemas.microsoft.com/office/drawing/2014/main" id="{1E72E8A1-7817-BFAE-0A9F-FFEA1F987E1E}"/>
+              </a:ext>
+            </a:extLst>
+          </p:cNvPr>
+          <p:cNvPicPr>
+            <a:picLocks noChangeAspect="1"/>
+          </p:cNvPicPr>
+          <p:nvPr/>
+        </p:nvPicPr>
+        <p:blipFill>
+          <a:blip r:embed="rId8">
+            <a:extLst>
+              <a:ext uri="{28A0092B-C50C-407E-A947-70E740481C1C}">
+                <a14:useLocalDpi xmlns:a14="http://schemas.microsoft.com/office/drawing/2010/main" val="0"/>
+              </a:ext>
+            </a:extLst>
+          </a:blip>
+          <a:stretch>
+            <a:fillRect/>
+          </a:stretch>
+        </p:blipFill>
+        <p:spPr>
+          <a:xfrm>
+            <a:off x="1241660" y="4967829"/>
+            <a:ext cx="4925112" cy="438211"/>
+          </a:xfrm>
+          <a:prstGeom prst="rect">
+            <a:avLst/>
+          </a:prstGeom>
+        </p:spPr>
+      </p:pic>
+      <p:pic>
+        <p:nvPicPr>
+          <p:cNvPr id="13" name="Picture 12">
+            <a:extLst>
+              <a:ext uri="{FF2B5EF4-FFF2-40B4-BE49-F238E27FC236}">
+                <a16:creationId xmlns:a16="http://schemas.microsoft.com/office/drawing/2014/main" id="{7CFC2FCB-BE84-A0CC-0067-D1E2A7BC5AFE}"/>
+              </a:ext>
+            </a:extLst>
+          </p:cNvPr>
+          <p:cNvPicPr>
+            <a:picLocks noChangeAspect="1"/>
+          </p:cNvPicPr>
+          <p:nvPr/>
+        </p:nvPicPr>
+        <p:blipFill>
+          <a:blip r:embed="rId9">
+            <a:extLst>
+              <a:ext uri="{28A0092B-C50C-407E-A947-70E740481C1C}">
+                <a14:useLocalDpi xmlns:a14="http://schemas.microsoft.com/office/drawing/2010/main" val="0"/>
+              </a:ext>
+            </a:extLst>
+          </a:blip>
+          <a:stretch>
+            <a:fillRect/>
+          </a:stretch>
+        </p:blipFill>
+        <p:spPr>
+          <a:xfrm>
+            <a:off x="6784586" y="4996408"/>
+            <a:ext cx="4286848" cy="409632"/>
+          </a:xfrm>
+          <a:prstGeom prst="rect">
+            <a:avLst/>
+          </a:prstGeom>
+        </p:spPr>
+      </p:pic>
+      <p:pic>
+        <p:nvPicPr>
+          <p:cNvPr id="18" name="Picture 17">
+            <a:extLst>
+              <a:ext uri="{FF2B5EF4-FFF2-40B4-BE49-F238E27FC236}">
+                <a16:creationId xmlns:a16="http://schemas.microsoft.com/office/drawing/2014/main" id="{625DF1C7-31C2-BFF0-643C-CD111E12C757}"/>
+              </a:ext>
+            </a:extLst>
+          </p:cNvPr>
+          <p:cNvPicPr>
+            <a:picLocks noChangeAspect="1"/>
+          </p:cNvPicPr>
+          <p:nvPr/>
+        </p:nvPicPr>
+        <p:blipFill>
+          <a:blip r:embed="rId10">
+            <a:extLst>
+              <a:ext uri="{28A0092B-C50C-407E-A947-70E740481C1C}">
+                <a14:useLocalDpi xmlns:a14="http://schemas.microsoft.com/office/drawing/2010/main" val="0"/>
+              </a:ext>
+            </a:extLst>
+          </a:blip>
+          <a:stretch>
+            <a:fillRect/>
+          </a:stretch>
+        </p:blipFill>
+        <p:spPr>
+          <a:xfrm>
+            <a:off x="1232133" y="5800576"/>
+            <a:ext cx="4934639" cy="228632"/>
+          </a:xfrm>
+          <a:prstGeom prst="rect">
+            <a:avLst/>
+          </a:prstGeom>
+        </p:spPr>
+      </p:pic>
+      <p:pic>
+        <p:nvPicPr>
+          <p:cNvPr id="20" name="Picture 19">
+            <a:extLst>
+              <a:ext uri="{FF2B5EF4-FFF2-40B4-BE49-F238E27FC236}">
+                <a16:creationId xmlns:a16="http://schemas.microsoft.com/office/drawing/2014/main" id="{BDF0F840-3238-ED09-8D2B-F0105DFE85EA}"/>
+              </a:ext>
+            </a:extLst>
+          </p:cNvPr>
+          <p:cNvPicPr>
+            <a:picLocks noChangeAspect="1"/>
+          </p:cNvPicPr>
+          <p:nvPr/>
+        </p:nvPicPr>
+        <p:blipFill rotWithShape="1">
+          <a:blip r:embed="rId11">
+            <a:extLst>
+              <a:ext uri="{28A0092B-C50C-407E-A947-70E740481C1C}">
+                <a14:useLocalDpi xmlns:a14="http://schemas.microsoft.com/office/drawing/2010/main" val="0"/>
+              </a:ext>
+            </a:extLst>
+          </a:blip>
+          <a:srcRect r="13294"/>
+          <a:stretch/>
+        </p:blipFill>
+        <p:spPr>
+          <a:xfrm>
+            <a:off x="6784587" y="5800576"/>
+            <a:ext cx="4286848" cy="228632"/>
+          </a:xfrm>
+          <a:prstGeom prst="rect">
+            <a:avLst/>
+          </a:prstGeom>
+        </p:spPr>
+      </p:pic>
+      <p:sp>
+        <p:nvSpPr>
+          <p:cNvPr id="21" name="TextBox 20">
+            <a:extLst>
+              <a:ext uri="{FF2B5EF4-FFF2-40B4-BE49-F238E27FC236}">
+                <a16:creationId xmlns:a16="http://schemas.microsoft.com/office/drawing/2014/main" id="{8D941CD9-FF40-6F9D-7EC2-116B397C2775}"/>
+              </a:ext>
+            </a:extLst>
+          </p:cNvPr>
+          <p:cNvSpPr txBox="1"/>
+          <p:nvPr/>
+        </p:nvSpPr>
+        <p:spPr>
+          <a:xfrm>
+            <a:off x="78901" y="4996408"/>
+            <a:ext cx="914399" cy="307777"/>
+          </a:xfrm>
+          <a:prstGeom prst="rect">
+            <a:avLst/>
+          </a:prstGeom>
+          <a:noFill/>
+        </p:spPr>
+        <p:txBody>
+          <a:bodyPr wrap="square" rtlCol="0">
+            <a:spAutoFit/>
+          </a:bodyPr>
+          <a:lstStyle/>
+          <a:p>
+            <a:r>
+              <a:rPr lang="en-US" sz="1400" dirty="0"/>
+              <a:t>Quantity</a:t>
+            </a:r>
+          </a:p>
+        </p:txBody>
+      </p:sp>
+      <p:sp>
+        <p:nvSpPr>
+          <p:cNvPr id="22" name="TextBox 21">
+            <a:extLst>
+              <a:ext uri="{FF2B5EF4-FFF2-40B4-BE49-F238E27FC236}">
+                <a16:creationId xmlns:a16="http://schemas.microsoft.com/office/drawing/2014/main" id="{0A789175-8E96-301E-81CA-7E90F48F5517}"/>
+              </a:ext>
+            </a:extLst>
+          </p:cNvPr>
+          <p:cNvSpPr txBox="1"/>
+          <p:nvPr/>
+        </p:nvSpPr>
+        <p:spPr>
+          <a:xfrm>
+            <a:off x="166645" y="5721431"/>
+            <a:ext cx="738909" cy="307777"/>
+          </a:xfrm>
+          <a:prstGeom prst="rect">
+            <a:avLst/>
+          </a:prstGeom>
+          <a:noFill/>
+        </p:spPr>
+        <p:txBody>
+          <a:bodyPr wrap="square" rtlCol="0">
+            <a:spAutoFit/>
+          </a:bodyPr>
+          <a:lstStyle/>
+          <a:p>
+            <a:r>
+              <a:rPr lang="en-US" sz="1400" dirty="0"/>
+              <a:t>Price</a:t>
+            </a:r>
+          </a:p>
+        </p:txBody>
+      </p:sp>
+    </p:spTree>
+    <p:extLst>
+      <p:ext uri="{BB962C8B-B14F-4D97-AF65-F5344CB8AC3E}">
+        <p14:creationId xmlns:p14="http://schemas.microsoft.com/office/powerpoint/2010/main" val="467652972"/>
+      </p:ext>
+    </p:extLst>
+  </p:cSld>
+  <p:clrMapOvr>
+    <a:masterClrMapping/>
+  </p:clrMapOvr>
+  <mc:AlternateContent xmlns:mc="http://schemas.openxmlformats.org/markup-compatibility/2006" xmlns:p15="http://schemas.microsoft.com/office/powerpoint/2012/main">
+    <mc:Choice Requires="p15">
+      <p:transition xmlns:p14="http://schemas.microsoft.com/office/powerpoint/2010/main" spd="slow" p14:dur="3250">
+        <p15:prstTrans prst="origami"/>
+      </p:transition>
+    </mc:Choice>
+    <mc:Fallback xmlns="">
+      <p:transition spd="slow">
+        <p:fade/>
+      </p:transition>
+    </mc:Fallback>
+  </mc:AlternateContent>
+</p:sld>
+</file>
+
+<file path=ppt/slides/slide14.xml><?xml version="1.0" encoding="utf-8"?>
+<p:sld xmlns:a="http://schemas.openxmlformats.org/drawingml/2006/main" xmlns:r="http://schemas.openxmlformats.org/officeDocument/2006/relationships" xmlns:p="http://schemas.openxmlformats.org/presentationml/2006/main">
+  <p:cSld>
+    <p:bg>
+      <p:bgPr>
+        <a:gradFill flip="none" rotWithShape="1">
+          <a:gsLst>
+            <a:gs pos="15000">
+              <a:schemeClr val="bg1"/>
+            </a:gs>
+            <a:gs pos="0">
+              <a:srgbClr val="0043E9">
+                <a:lumMod val="19000"/>
+                <a:lumOff val="81000"/>
+              </a:srgbClr>
+            </a:gs>
+          </a:gsLst>
+          <a:lin ang="5400000" scaled="1"/>
+          <a:tileRect/>
+        </a:gradFill>
+        <a:effectLst/>
+      </p:bgPr>
+    </p:bg>
+    <p:spTree>
+      <p:nvGrpSpPr>
+        <p:cNvPr id="1" name=""/>
+        <p:cNvGrpSpPr/>
+        <p:nvPr/>
+      </p:nvGrpSpPr>
+      <p:grpSpPr>
+        <a:xfrm>
+          <a:off x="0" y="0"/>
+          <a:ext cx="0" cy="0"/>
+          <a:chOff x="0" y="0"/>
+          <a:chExt cx="0" cy="0"/>
+        </a:xfrm>
+      </p:grpSpPr>
+      <p:sp>
+        <p:nvSpPr>
+          <p:cNvPr id="2" name="Title 1">
+            <a:extLst>
+              <a:ext uri="{FF2B5EF4-FFF2-40B4-BE49-F238E27FC236}">
+                <a16:creationId xmlns:a16="http://schemas.microsoft.com/office/drawing/2014/main" id="{DD079097-250B-1755-9E96-EA28080BDEAF}"/>
+              </a:ext>
+            </a:extLst>
+          </p:cNvPr>
+          <p:cNvSpPr>
+            <a:spLocks noGrp="1"/>
+          </p:cNvSpPr>
+          <p:nvPr>
+            <p:ph type="title"/>
+          </p:nvPr>
+        </p:nvSpPr>
+        <p:spPr>
+          <a:xfrm>
+            <a:off x="670353" y="179558"/>
+            <a:ext cx="10515600" cy="1002958"/>
+          </a:xfrm>
+        </p:spPr>
+        <p:txBody>
+          <a:bodyPr/>
+          <a:lstStyle/>
+          <a:p>
+            <a:r>
+              <a:rPr lang="en-US" b="1" dirty="0">
+                <a:cs typeface="Arial" panose="020B0604020202020204" pitchFamily="34" charset="0"/>
+              </a:rPr>
               <a:t>Potential Solutions </a:t>
             </a:r>
           </a:p>
@@ -6842,7 +7270,7 @@
 </p:sld>
 </file>
 
-<file path=ppt/slides/slide14.xml><?xml version="1.0" encoding="utf-8"?>
+<file path=ppt/slides/slide15.xml><?xml version="1.0" encoding="utf-8"?>
 <p:sld xmlns:a="http://schemas.openxmlformats.org/drawingml/2006/main" xmlns:r="http://schemas.openxmlformats.org/officeDocument/2006/relationships" xmlns:p="http://schemas.openxmlformats.org/presentationml/2006/main">
   <p:cSld>
     <p:spTree>
@@ -11462,8 +11890,8 @@
         </p:nvSpPr>
         <p:spPr>
           <a:xfrm>
-            <a:off x="1494031" y="1305342"/>
-            <a:ext cx="10287000" cy="2123658"/>
+            <a:off x="1494031" y="1270162"/>
+            <a:ext cx="10287000" cy="1631216"/>
           </a:xfrm>
           <a:prstGeom prst="rect">
             <a:avLst/>
@@ -11483,16 +11911,15 @@
                 </a:solidFill>
                 <a:effectLst/>
               </a:rPr>
-              <a:t>Repeat second round match – if an individual value in </a:t>
-            </a:r>
-            <a:r>
-              <a:rPr lang="en-US" sz="3200" b="0" i="0" dirty="0" err="1">
+              <a:t>Use </a:t>
+            </a:r>
+            <a:r>
+              <a:rPr lang="en-US" sz="3200" dirty="0">
                 <a:solidFill>
                   <a:srgbClr val="000000"/>
                 </a:solidFill>
-                <a:effectLst/>
               </a:rPr>
-              <a:t>wb</a:t>
+              <a:t>D</a:t>
             </a:r>
             <a:r>
               <a:rPr lang="en-US" sz="3200" b="0" i="0" dirty="0">
@@ -11501,7 +11928,25 @@
                 </a:solidFill>
                 <a:effectLst/>
               </a:rPr>
-              <a:t> = the cumulative value of a set of TRF values, then match together</a:t>
+              <a:t>P to calculate if it’s possible to sum up to a value, then append </a:t>
+            </a:r>
+            <a:r>
+              <a:rPr lang="en-US" sz="3200" b="1" i="0" dirty="0">
+                <a:solidFill>
+                  <a:srgbClr val="000000"/>
+                </a:solidFill>
+                <a:effectLst/>
+              </a:rPr>
+              <a:t>random</a:t>
+            </a:r>
+            <a:r>
+              <a:rPr lang="en-US" sz="3200" b="0" i="0" dirty="0">
+                <a:solidFill>
+                  <a:srgbClr val="000000"/>
+                </a:solidFill>
+                <a:effectLst/>
+              </a:rPr>
+              <a:t> combination to matching list</a:t>
             </a:r>
             <a:endParaRPr lang="en-US" sz="3200" dirty="0"/>
           </a:p>
@@ -11560,8 +12005,8 @@
         </p:nvSpPr>
         <p:spPr>
           <a:xfrm>
-            <a:off x="1494031" y="3188846"/>
-            <a:ext cx="10287000" cy="1138773"/>
+            <a:off x="1494031" y="2989024"/>
+            <a:ext cx="10287000" cy="1631216"/>
           </a:xfrm>
           <a:prstGeom prst="rect">
             <a:avLst/>
@@ -11576,7 +12021,7 @@
           <a:p>
             <a:r>
               <a:rPr lang="en-US" sz="3200" dirty="0"/>
-              <a:t>Fourth round match percentage = 1% for WB, 2% for TRF </a:t>
+              <a:t>Fourth round match percentage = 20% for WB, 25% for TRF</a:t>
             </a:r>
           </a:p>
           <a:p>
@@ -11634,7 +12079,7 @@
         </p:nvSpPr>
         <p:spPr>
           <a:xfrm>
-            <a:off x="3308694" y="4488793"/>
+            <a:off x="3308694" y="4506885"/>
             <a:ext cx="738909" cy="307777"/>
           </a:xfrm>
           <a:prstGeom prst="rect">
@@ -11669,7 +12114,7 @@
         </p:nvSpPr>
         <p:spPr>
           <a:xfrm>
-            <a:off x="8658786" y="4488793"/>
+            <a:off x="8809638" y="4506885"/>
             <a:ext cx="738909" cy="307777"/>
           </a:xfrm>
           <a:prstGeom prst="rect">
@@ -11692,10 +12137,10 @@
       </p:sp>
       <p:pic>
         <p:nvPicPr>
-          <p:cNvPr id="12" name="Picture 11" descr="A grid of numbers with black numbers&#10;&#10;Description automatically generated with medium confidence">
-            <a:extLst>
-              <a:ext uri="{FF2B5EF4-FFF2-40B4-BE49-F238E27FC236}">
-                <a16:creationId xmlns:a16="http://schemas.microsoft.com/office/drawing/2014/main" id="{F499EF57-4B73-0C89-EC69-AC74FC2045A4}"/>
+          <p:cNvPr id="13" name="Picture 12">
+            <a:extLst>
+              <a:ext uri="{FF2B5EF4-FFF2-40B4-BE49-F238E27FC236}">
+                <a16:creationId xmlns:a16="http://schemas.microsoft.com/office/drawing/2014/main" id="{89AB806C-0213-6595-EDF6-155AF378357C}"/>
               </a:ext>
             </a:extLst>
           </p:cNvPr>
@@ -11705,21 +12150,15 @@
           <p:nvPr/>
         </p:nvPicPr>
         <p:blipFill>
-          <a:blip r:embed="rId10">
-            <a:extLst>
-              <a:ext uri="{28A0092B-C50C-407E-A947-70E740481C1C}">
-                <a14:useLocalDpi xmlns:a14="http://schemas.microsoft.com/office/drawing/2010/main" val="0"/>
-              </a:ext>
-            </a:extLst>
-          </a:blip>
+          <a:blip r:embed="rId10"/>
           <a:stretch>
             <a:fillRect/>
           </a:stretch>
         </p:blipFill>
         <p:spPr>
           <a:xfrm>
-            <a:off x="1494031" y="4844291"/>
-            <a:ext cx="4896533" cy="638264"/>
+            <a:off x="1325369" y="4973229"/>
+            <a:ext cx="4858428" cy="1705213"/>
           </a:xfrm>
           <a:prstGeom prst="rect">
             <a:avLst/>
@@ -11728,10 +12167,10 @@
       </p:pic>
       <p:pic>
         <p:nvPicPr>
-          <p:cNvPr id="16" name="Picture 15">
-            <a:extLst>
-              <a:ext uri="{FF2B5EF4-FFF2-40B4-BE49-F238E27FC236}">
-                <a16:creationId xmlns:a16="http://schemas.microsoft.com/office/drawing/2014/main" id="{8CBD449B-140B-55CC-7A45-76B78ED8B9D3}"/>
+          <p:cNvPr id="17" name="Picture 16">
+            <a:extLst>
+              <a:ext uri="{FF2B5EF4-FFF2-40B4-BE49-F238E27FC236}">
+                <a16:creationId xmlns:a16="http://schemas.microsoft.com/office/drawing/2014/main" id="{65145A5E-7197-2464-0842-CF14A289D58B}"/>
               </a:ext>
             </a:extLst>
           </p:cNvPr>
@@ -11741,21 +12180,15 @@
           <p:nvPr/>
         </p:nvPicPr>
         <p:blipFill>
-          <a:blip r:embed="rId11">
-            <a:extLst>
-              <a:ext uri="{28A0092B-C50C-407E-A947-70E740481C1C}">
-                <a14:useLocalDpi xmlns:a14="http://schemas.microsoft.com/office/drawing/2010/main" val="0"/>
-              </a:ext>
-            </a:extLst>
-          </a:blip>
+          <a:blip r:embed="rId11"/>
           <a:stretch>
             <a:fillRect/>
           </a:stretch>
         </p:blipFill>
         <p:spPr>
           <a:xfrm>
-            <a:off x="6870526" y="4945054"/>
-            <a:ext cx="4315427" cy="419158"/>
+            <a:off x="7040431" y="5058513"/>
+            <a:ext cx="4277322" cy="581106"/>
           </a:xfrm>
           <a:prstGeom prst="rect">
             <a:avLst/>
@@ -11765,7 +12198,7 @@
     </p:spTree>
     <p:extLst>
       <p:ext uri="{BB962C8B-B14F-4D97-AF65-F5344CB8AC3E}">
-        <p14:creationId xmlns:p14="http://schemas.microsoft.com/office/powerpoint/2010/main" val="129318963"/>
+        <p14:creationId xmlns:p14="http://schemas.microsoft.com/office/powerpoint/2010/main" val="822355705"/>
       </p:ext>
     </p:extLst>
   </p:cSld>
@@ -12372,6 +12805,15 @@
 </file>
 
 <file path=customXml/item2.xml><?xml version="1.0" encoding="utf-8"?>
+<?mso-contentType ?>
+<FormTemplates xmlns="http://schemas.microsoft.com/sharepoint/v3/contenttype/forms">
+  <Display>DocumentLibraryForm</Display>
+  <Edit>DocumentLibraryForm</Edit>
+  <New>DocumentLibraryForm</New>
+</FormTemplates>
+</file>
+
+<file path=customXml/item3.xml><?xml version="1.0" encoding="utf-8"?>
 <ct:contentTypeSchema xmlns:ct="http://schemas.microsoft.com/office/2006/metadata/contentType" xmlns:ma="http://schemas.microsoft.com/office/2006/metadata/properties/metaAttributes" ct:_="" ma:_="" ma:contentTypeName="文档" ma:contentTypeID="0x01010091704C4F4458AD4799CA30A1424640A8" ma:contentTypeVersion="10" ma:contentTypeDescription="新建文档。" ma:contentTypeScope="" ma:versionID="603888007cbb681a3473a2397bc01e52">
   <xsd:schema xmlns:xsd="http://www.w3.org/2001/XMLSchema" xmlns:xs="http://www.w3.org/2001/XMLSchema" xmlns:p="http://schemas.microsoft.com/office/2006/metadata/properties" xmlns:ns3="04634fbf-cba0-4f2c-b64b-bfe5786ed74a" targetNamespace="http://schemas.microsoft.com/office/2006/metadata/properties" ma:root="true" ma:fieldsID="3e2da1342de8abc2c9ddcd8cd30c6802" ns3:_="">
     <xsd:import namespace="04634fbf-cba0-4f2c-b64b-bfe5786ed74a"/>
@@ -12553,15 +12995,6 @@
 </ct:contentTypeSchema>
 </file>
 
-<file path=customXml/item3.xml><?xml version="1.0" encoding="utf-8"?>
-<?mso-contentType ?>
-<FormTemplates xmlns="http://schemas.microsoft.com/sharepoint/v3/contenttype/forms">
-  <Display>DocumentLibraryForm</Display>
-  <Edit>DocumentLibraryForm</Edit>
-  <New>DocumentLibraryForm</New>
-</FormTemplates>
-</file>
-
 <file path=customXml/itemProps1.xml><?xml version="1.0" encoding="utf-8"?>
 <ds:datastoreItem xmlns:ds="http://schemas.openxmlformats.org/officeDocument/2006/customXml" ds:itemID="{943027CA-153C-43A2-9067-346C0FB0C7E1}">
   <ds:schemaRefs>
@@ -12579,6 +13012,14 @@
 </file>
 
 <file path=customXml/itemProps2.xml><?xml version="1.0" encoding="utf-8"?>
+<ds:datastoreItem xmlns:ds="http://schemas.openxmlformats.org/officeDocument/2006/customXml" ds:itemID="{C87C4A66-61EC-4D03-9A42-DCBF8752D11E}">
+  <ds:schemaRefs>
+    <ds:schemaRef ds:uri="http://schemas.microsoft.com/sharepoint/v3/contenttype/forms"/>
+  </ds:schemaRefs>
+</ds:datastoreItem>
+</file>
+
+<file path=customXml/itemProps3.xml><?xml version="1.0" encoding="utf-8"?>
 <ds:datastoreItem xmlns:ds="http://schemas.openxmlformats.org/officeDocument/2006/customXml" ds:itemID="{C71712F0-88DD-463B-AD23-6E1917D892F7}">
   <ds:schemaRefs>
     <ds:schemaRef ds:uri="http://schemas.microsoft.com/office/2006/metadata/contentType"/>
@@ -12594,12 +13035,4 @@
     <ds:schemaRef ds:uri="http://schemas.microsoft.com/internal/obd"/>
   </ds:schemaRefs>
 </ds:datastoreItem>
-</file>
-
-<file path=customXml/itemProps3.xml><?xml version="1.0" encoding="utf-8"?>
-<ds:datastoreItem xmlns:ds="http://schemas.openxmlformats.org/officeDocument/2006/customXml" ds:itemID="{C87C4A66-61EC-4D03-9A42-DCBF8752D11E}">
-  <ds:schemaRefs>
-    <ds:schemaRef ds:uri="http://schemas.microsoft.com/sharepoint/v3/contenttype/forms"/>
-  </ds:schemaRefs>
-</ds:datastoreItem>
 </file>
</xml_diff>

<commit_message>
Updated presentation to reflect new round 3
</commit_message>
<xml_diff>
--- a/Presentation_Matching.pptx
+++ b/Presentation_Matching.pptx
@@ -5235,13 +5235,13 @@
   <p:clrMapOvr>
     <a:masterClrMapping/>
   </p:clrMapOvr>
-  <mc:AlternateContent xmlns:mc="http://schemas.openxmlformats.org/markup-compatibility/2006">
-    <mc:Choice xmlns:p15="http://schemas.microsoft.com/office/powerpoint/2012/main" Requires="p15">
+  <mc:AlternateContent xmlns:mc="http://schemas.openxmlformats.org/markup-compatibility/2006" xmlns:p15="http://schemas.microsoft.com/office/powerpoint/2012/main">
+    <mc:Choice Requires="p15">
       <p:transition xmlns:p14="http://schemas.microsoft.com/office/powerpoint/2010/main" spd="slow" p14:dur="3250">
         <p15:prstTrans prst="origami"/>
       </p:transition>
     </mc:Choice>
-    <mc:Fallback>
+    <mc:Fallback xmlns="">
       <p:transition spd="slow">
         <p:fade/>
       </p:transition>
@@ -5761,13 +5761,13 @@
   <p:clrMapOvr>
     <a:masterClrMapping/>
   </p:clrMapOvr>
-  <mc:AlternateContent xmlns:mc="http://schemas.openxmlformats.org/markup-compatibility/2006">
-    <mc:Choice xmlns:p15="http://schemas.microsoft.com/office/powerpoint/2012/main" Requires="p15">
+  <mc:AlternateContent xmlns:mc="http://schemas.openxmlformats.org/markup-compatibility/2006" xmlns:p15="http://schemas.microsoft.com/office/powerpoint/2012/main">
+    <mc:Choice Requires="p15">
       <p:transition xmlns:p14="http://schemas.microsoft.com/office/powerpoint/2010/main" spd="slow" p14:dur="3250">
         <p15:prstTrans prst="origami"/>
       </p:transition>
     </mc:Choice>
-    <mc:Fallback>
+    <mc:Fallback xmlns="">
       <p:transition spd="slow">
         <p:fade/>
       </p:transition>
@@ -6193,13 +6193,13 @@
   <p:clrMapOvr>
     <a:masterClrMapping/>
   </p:clrMapOvr>
-  <mc:AlternateContent xmlns:mc="http://schemas.openxmlformats.org/markup-compatibility/2006">
-    <mc:Choice xmlns:p15="http://schemas.microsoft.com/office/powerpoint/2012/main" Requires="p15">
+  <mc:AlternateContent xmlns:mc="http://schemas.openxmlformats.org/markup-compatibility/2006" xmlns:p15="http://schemas.microsoft.com/office/powerpoint/2012/main">
+    <mc:Choice Requires="p15">
       <p:transition xmlns:p14="http://schemas.microsoft.com/office/powerpoint/2010/main" spd="slow" p14:dur="3250">
         <p15:prstTrans prst="origami"/>
       </p:transition>
     </mc:Choice>
-    <mc:Fallback>
+    <mc:Fallback xmlns="">
       <p:transition spd="slow">
         <p:fade/>
       </p:transition>
@@ -11291,7 +11291,7 @@
         </p:nvSpPr>
         <p:spPr>
           <a:xfrm>
-            <a:off x="1494031" y="1488142"/>
+            <a:off x="1494031" y="1383645"/>
             <a:ext cx="10287000" cy="2123658"/>
           </a:xfrm>
           <a:prstGeom prst="rect">
@@ -11306,13 +11306,12 @@
           <a:lstStyle/>
           <a:p>
             <a:r>
-              <a:rPr lang="en-US" sz="3200" b="0" i="0" dirty="0">
+              <a:rPr lang="en-US" sz="3200" dirty="0">
                 <a:solidFill>
                   <a:srgbClr val="000000"/>
                 </a:solidFill>
-                <a:effectLst/>
               </a:rPr>
-              <a:t>Find subset of numbers that add up to cumulative trade total between not matching files based on broker, symbol, average price </a:t>
+              <a:t>For every symbol in each broker, calculate the sum of price*qty, if the sum between WB and TRF are within $5 of each other, count it as a match </a:t>
             </a:r>
             <a:endParaRPr lang="en-US" sz="3200" dirty="0"/>
           </a:p>
@@ -11387,7 +11386,7 @@
           <a:p>
             <a:r>
               <a:rPr lang="en-US" sz="3200" dirty="0"/>
-              <a:t>Third round match percentage = 4% for WB, 9% for TRF</a:t>
+              <a:t>Third round match percentage = 1% for WB, 5% for TRF</a:t>
             </a:r>
           </a:p>
           <a:p>
@@ -11503,10 +11502,10 @@
       </p:sp>
       <p:pic>
         <p:nvPicPr>
-          <p:cNvPr id="10" name="Picture 9">
-            <a:extLst>
-              <a:ext uri="{FF2B5EF4-FFF2-40B4-BE49-F238E27FC236}">
-                <a16:creationId xmlns:a16="http://schemas.microsoft.com/office/drawing/2014/main" id="{A1E4ADB0-013F-AC25-791E-787796BFAEC8}"/>
+          <p:cNvPr id="11" name="Picture 10">
+            <a:extLst>
+              <a:ext uri="{FF2B5EF4-FFF2-40B4-BE49-F238E27FC236}">
+                <a16:creationId xmlns:a16="http://schemas.microsoft.com/office/drawing/2014/main" id="{D7C99D7F-AD85-BEBD-CF6F-B97942D4DD8E}"/>
               </a:ext>
             </a:extLst>
           </p:cNvPr>
@@ -11523,8 +11522,8 @@
         </p:blipFill>
         <p:spPr>
           <a:xfrm>
-            <a:off x="1325369" y="4923397"/>
-            <a:ext cx="4896533" cy="1552792"/>
+            <a:off x="1494031" y="4961267"/>
+            <a:ext cx="4867954" cy="1343212"/>
           </a:xfrm>
           <a:prstGeom prst="rect">
             <a:avLst/>
@@ -11533,10 +11532,10 @@
       </p:pic>
       <p:pic>
         <p:nvPicPr>
-          <p:cNvPr id="13" name="Picture 12">
-            <a:extLst>
-              <a:ext uri="{FF2B5EF4-FFF2-40B4-BE49-F238E27FC236}">
-                <a16:creationId xmlns:a16="http://schemas.microsoft.com/office/drawing/2014/main" id="{700D93BB-F8C0-A8E1-00E5-0308EFF50A63}"/>
+          <p:cNvPr id="15" name="Picture 14">
+            <a:extLst>
+              <a:ext uri="{FF2B5EF4-FFF2-40B4-BE49-F238E27FC236}">
+                <a16:creationId xmlns:a16="http://schemas.microsoft.com/office/drawing/2014/main" id="{0F1B6A38-E766-4681-48F7-5F242238CA3F}"/>
               </a:ext>
             </a:extLst>
           </p:cNvPr>
@@ -11553,146 +11552,122 @@
         </p:blipFill>
         <p:spPr>
           <a:xfrm>
-            <a:off x="6966802" y="5085660"/>
-            <a:ext cx="4769593" cy="596199"/>
+            <a:off x="7212936" y="5175673"/>
+            <a:ext cx="4277322" cy="409632"/>
           </a:xfrm>
           <a:prstGeom prst="rect">
             <a:avLst/>
           </a:prstGeom>
         </p:spPr>
       </p:pic>
-      <p:cxnSp>
-        <p:nvCxnSpPr>
-          <p:cNvPr id="17" name="Straight Arrow Connector 16">
-            <a:extLst>
-              <a:ext uri="{FF2B5EF4-FFF2-40B4-BE49-F238E27FC236}">
-                <a16:creationId xmlns:a16="http://schemas.microsoft.com/office/drawing/2014/main" id="{90A25897-8478-2494-ACA8-E978039AB024}"/>
-              </a:ext>
-            </a:extLst>
-          </p:cNvPr>
-          <p:cNvCxnSpPr>
-            <a:cxnSpLocks/>
-          </p:cNvCxnSpPr>
-          <p:nvPr/>
-        </p:nvCxnSpPr>
-        <p:spPr>
-          <a:xfrm flipV="1">
-            <a:off x="2644726" y="5275385"/>
-            <a:ext cx="4501662" cy="180921"/>
-          </a:xfrm>
-          <a:prstGeom prst="straightConnector1">
-            <a:avLst/>
-          </a:prstGeom>
-          <a:ln>
-            <a:solidFill>
-              <a:srgbClr val="FF0000"/>
-            </a:solidFill>
-            <a:tailEnd type="triangle"/>
-          </a:ln>
-        </p:spPr>
-        <p:style>
-          <a:lnRef idx="2">
-            <a:schemeClr val="accent2"/>
-          </a:lnRef>
-          <a:fillRef idx="0">
-            <a:schemeClr val="accent2"/>
-          </a:fillRef>
-          <a:effectRef idx="1">
-            <a:schemeClr val="accent2"/>
-          </a:effectRef>
-          <a:fontRef idx="minor">
-            <a:schemeClr val="tx1"/>
-          </a:fontRef>
-        </p:style>
-      </p:cxnSp>
-      <p:cxnSp>
-        <p:nvCxnSpPr>
-          <p:cNvPr id="18" name="Straight Arrow Connector 17">
-            <a:extLst>
-              <a:ext uri="{FF2B5EF4-FFF2-40B4-BE49-F238E27FC236}">
-                <a16:creationId xmlns:a16="http://schemas.microsoft.com/office/drawing/2014/main" id="{75FDDB67-CF73-32B6-ED34-FB9687FB1AA1}"/>
-              </a:ext>
-            </a:extLst>
-          </p:cNvPr>
-          <p:cNvCxnSpPr>
-            <a:cxnSpLocks/>
-          </p:cNvCxnSpPr>
-          <p:nvPr/>
-        </p:nvCxnSpPr>
-        <p:spPr>
-          <a:xfrm flipV="1">
-            <a:off x="2644726" y="5329572"/>
-            <a:ext cx="4491576" cy="252125"/>
-          </a:xfrm>
-          <a:prstGeom prst="straightConnector1">
-            <a:avLst/>
-          </a:prstGeom>
-          <a:ln>
-            <a:solidFill>
-              <a:srgbClr val="FF0000"/>
-            </a:solidFill>
-            <a:tailEnd type="triangle"/>
-          </a:ln>
-        </p:spPr>
-        <p:style>
-          <a:lnRef idx="2">
-            <a:schemeClr val="accent2"/>
-          </a:lnRef>
-          <a:fillRef idx="0">
-            <a:schemeClr val="accent2"/>
-          </a:fillRef>
-          <a:effectRef idx="1">
-            <a:schemeClr val="accent2"/>
-          </a:effectRef>
-          <a:fontRef idx="minor">
-            <a:schemeClr val="tx1"/>
-          </a:fontRef>
-        </p:style>
-      </p:cxnSp>
-      <p:cxnSp>
-        <p:nvCxnSpPr>
-          <p:cNvPr id="21" name="Straight Arrow Connector 20">
-            <a:extLst>
-              <a:ext uri="{FF2B5EF4-FFF2-40B4-BE49-F238E27FC236}">
-                <a16:creationId xmlns:a16="http://schemas.microsoft.com/office/drawing/2014/main" id="{96AA015D-C271-99BD-3069-1329497C2FAC}"/>
-              </a:ext>
-            </a:extLst>
-          </p:cNvPr>
-          <p:cNvCxnSpPr>
-            <a:cxnSpLocks/>
-          </p:cNvCxnSpPr>
-          <p:nvPr/>
-        </p:nvCxnSpPr>
-        <p:spPr>
-          <a:xfrm flipV="1">
-            <a:off x="2644726" y="5275385"/>
-            <a:ext cx="4491576" cy="509451"/>
-          </a:xfrm>
-          <a:prstGeom prst="straightConnector1">
-            <a:avLst/>
-          </a:prstGeom>
-          <a:ln>
-            <a:solidFill>
-              <a:srgbClr val="FF0000"/>
-            </a:solidFill>
-            <a:tailEnd type="triangle"/>
-          </a:ln>
-        </p:spPr>
-        <p:style>
-          <a:lnRef idx="2">
-            <a:schemeClr val="accent2"/>
-          </a:lnRef>
-          <a:fillRef idx="0">
-            <a:schemeClr val="accent2"/>
-          </a:fillRef>
-          <a:effectRef idx="1">
-            <a:schemeClr val="accent2"/>
-          </a:effectRef>
-          <a:fontRef idx="minor">
-            <a:schemeClr val="tx1"/>
-          </a:fontRef>
-        </p:style>
-      </p:cxnSp>
+      <p:sp>
+        <p:nvSpPr>
+          <p:cNvPr id="19" name="TextBox 18">
+            <a:extLst>
+              <a:ext uri="{FF2B5EF4-FFF2-40B4-BE49-F238E27FC236}">
+                <a16:creationId xmlns:a16="http://schemas.microsoft.com/office/drawing/2014/main" id="{96A68EA1-E150-E930-61EC-67ADF5D7F182}"/>
+              </a:ext>
+            </a:extLst>
+          </p:cNvPr>
+          <p:cNvSpPr txBox="1"/>
+          <p:nvPr/>
+        </p:nvSpPr>
+        <p:spPr>
+          <a:xfrm>
+            <a:off x="8174165" y="5888617"/>
+            <a:ext cx="2354864" cy="369332"/>
+          </a:xfrm>
+          <a:prstGeom prst="rect">
+            <a:avLst/>
+          </a:prstGeom>
+          <a:noFill/>
+        </p:spPr>
+        <p:txBody>
+          <a:bodyPr wrap="square">
+            <a:spAutoFit/>
+          </a:bodyPr>
+          <a:lstStyle/>
+          <a:p>
+            <a:r>
+              <a:rPr lang="en-US" dirty="0">
+                <a:solidFill>
+                  <a:srgbClr val="000000"/>
+                </a:solidFill>
+                <a:latin typeface="Aptos Narrow" panose="020B0004020202020204" pitchFamily="34" charset="0"/>
+              </a:rPr>
+              <a:t>Price*Qty = </a:t>
+            </a:r>
+            <a:r>
+              <a:rPr lang="en-US" sz="1800" b="0" i="0" u="none" strike="noStrike" dirty="0">
+                <a:solidFill>
+                  <a:srgbClr val="000000"/>
+                </a:solidFill>
+                <a:effectLst/>
+                <a:latin typeface="Aptos Narrow" panose="020B0004020202020204" pitchFamily="34" charset="0"/>
+              </a:rPr>
+              <a:t>104.284</a:t>
+            </a:r>
+            <a:r>
+              <a:rPr lang="en-US" dirty="0"/>
+              <a:t> </a:t>
+            </a:r>
+          </a:p>
+        </p:txBody>
+      </p:sp>
+      <p:sp>
+        <p:nvSpPr>
+          <p:cNvPr id="20" name="TextBox 19">
+            <a:extLst>
+              <a:ext uri="{FF2B5EF4-FFF2-40B4-BE49-F238E27FC236}">
+                <a16:creationId xmlns:a16="http://schemas.microsoft.com/office/drawing/2014/main" id="{353312F8-45F3-9637-7B49-5B226B9CAB71}"/>
+              </a:ext>
+            </a:extLst>
+          </p:cNvPr>
+          <p:cNvSpPr txBox="1"/>
+          <p:nvPr/>
+        </p:nvSpPr>
+        <p:spPr>
+          <a:xfrm>
+            <a:off x="2834242" y="6381064"/>
+            <a:ext cx="2354864" cy="369332"/>
+          </a:xfrm>
+          <a:prstGeom prst="rect">
+            <a:avLst/>
+          </a:prstGeom>
+          <a:noFill/>
+        </p:spPr>
+        <p:txBody>
+          <a:bodyPr wrap="square">
+            <a:spAutoFit/>
+          </a:bodyPr>
+          <a:lstStyle/>
+          <a:p>
+            <a:r>
+              <a:rPr lang="en-US" dirty="0">
+                <a:solidFill>
+                  <a:srgbClr val="000000"/>
+                </a:solidFill>
+                <a:latin typeface="Aptos Narrow" panose="020B0004020202020204" pitchFamily="34" charset="0"/>
+              </a:rPr>
+              <a:t>Price*Qty = </a:t>
+            </a:r>
+            <a:r>
+              <a:rPr lang="en-US" sz="1800" b="0" i="0" u="none" strike="noStrike" dirty="0">
+                <a:solidFill>
+                  <a:srgbClr val="000000"/>
+                </a:solidFill>
+                <a:effectLst/>
+                <a:latin typeface="Aptos Narrow" panose="020B0004020202020204" pitchFamily="34" charset="0"/>
+              </a:rPr>
+              <a:t>104.2839</a:t>
+            </a:r>
+            <a:r>
+              <a:rPr lang="en-US" dirty="0"/>
+              <a:t>  </a:t>
+            </a:r>
+          </a:p>
+        </p:txBody>
+      </p:sp>
     </p:spTree>
     <p:extLst>
       <p:ext uri="{BB962C8B-B14F-4D97-AF65-F5344CB8AC3E}">
@@ -12805,15 +12780,6 @@
 </file>
 
 <file path=customXml/item2.xml><?xml version="1.0" encoding="utf-8"?>
-<?mso-contentType ?>
-<FormTemplates xmlns="http://schemas.microsoft.com/sharepoint/v3/contenttype/forms">
-  <Display>DocumentLibraryForm</Display>
-  <Edit>DocumentLibraryForm</Edit>
-  <New>DocumentLibraryForm</New>
-</FormTemplates>
-</file>
-
-<file path=customXml/item3.xml><?xml version="1.0" encoding="utf-8"?>
 <ct:contentTypeSchema xmlns:ct="http://schemas.microsoft.com/office/2006/metadata/contentType" xmlns:ma="http://schemas.microsoft.com/office/2006/metadata/properties/metaAttributes" ct:_="" ma:_="" ma:contentTypeName="文档" ma:contentTypeID="0x01010091704C4F4458AD4799CA30A1424640A8" ma:contentTypeVersion="10" ma:contentTypeDescription="新建文档。" ma:contentTypeScope="" ma:versionID="603888007cbb681a3473a2397bc01e52">
   <xsd:schema xmlns:xsd="http://www.w3.org/2001/XMLSchema" xmlns:xs="http://www.w3.org/2001/XMLSchema" xmlns:p="http://schemas.microsoft.com/office/2006/metadata/properties" xmlns:ns3="04634fbf-cba0-4f2c-b64b-bfe5786ed74a" targetNamespace="http://schemas.microsoft.com/office/2006/metadata/properties" ma:root="true" ma:fieldsID="3e2da1342de8abc2c9ddcd8cd30c6802" ns3:_="">
     <xsd:import namespace="04634fbf-cba0-4f2c-b64b-bfe5786ed74a"/>
@@ -12995,6 +12961,15 @@
 </ct:contentTypeSchema>
 </file>
 
+<file path=customXml/item3.xml><?xml version="1.0" encoding="utf-8"?>
+<?mso-contentType ?>
+<FormTemplates xmlns="http://schemas.microsoft.com/sharepoint/v3/contenttype/forms">
+  <Display>DocumentLibraryForm</Display>
+  <Edit>DocumentLibraryForm</Edit>
+  <New>DocumentLibraryForm</New>
+</FormTemplates>
+</file>
+
 <file path=customXml/itemProps1.xml><?xml version="1.0" encoding="utf-8"?>
 <ds:datastoreItem xmlns:ds="http://schemas.openxmlformats.org/officeDocument/2006/customXml" ds:itemID="{943027CA-153C-43A2-9067-346C0FB0C7E1}">
   <ds:schemaRefs>
@@ -13012,14 +12987,6 @@
 </file>
 
 <file path=customXml/itemProps2.xml><?xml version="1.0" encoding="utf-8"?>
-<ds:datastoreItem xmlns:ds="http://schemas.openxmlformats.org/officeDocument/2006/customXml" ds:itemID="{C87C4A66-61EC-4D03-9A42-DCBF8752D11E}">
-  <ds:schemaRefs>
-    <ds:schemaRef ds:uri="http://schemas.microsoft.com/sharepoint/v3/contenttype/forms"/>
-  </ds:schemaRefs>
-</ds:datastoreItem>
-</file>
-
-<file path=customXml/itemProps3.xml><?xml version="1.0" encoding="utf-8"?>
 <ds:datastoreItem xmlns:ds="http://schemas.openxmlformats.org/officeDocument/2006/customXml" ds:itemID="{C71712F0-88DD-463B-AD23-6E1917D892F7}">
   <ds:schemaRefs>
     <ds:schemaRef ds:uri="http://schemas.microsoft.com/office/2006/metadata/contentType"/>
@@ -13035,4 +13002,12 @@
     <ds:schemaRef ds:uri="http://schemas.microsoft.com/internal/obd"/>
   </ds:schemaRefs>
 </ds:datastoreItem>
+</file>
+
+<file path=customXml/itemProps3.xml><?xml version="1.0" encoding="utf-8"?>
+<ds:datastoreItem xmlns:ds="http://schemas.openxmlformats.org/officeDocument/2006/customXml" ds:itemID="{C87C4A66-61EC-4D03-9A42-DCBF8752D11E}">
+  <ds:schemaRefs>
+    <ds:schemaRef ds:uri="http://schemas.microsoft.com/sharepoint/v3/contenttype/forms"/>
+  </ds:schemaRefs>
+</ds:datastoreItem>
 </file>
</xml_diff>